<commit_message>
Reorder slides to align with verbal flow
Reordered the slides to tell a story that flows from historical returns
to simulated returns to conclusion.
</commit_message>
<xml_diff>
--- a/presentation/P1- Challening the Status Quo.pptx
+++ b/presentation/P1- Challening the Status Quo.pptx
@@ -13,17 +13,17 @@
   <p:sldIdLst>
     <p:sldId id="262" r:id="rId2"/>
     <p:sldId id="280" r:id="rId3"/>
-    <p:sldId id="281" r:id="rId4"/>
-    <p:sldId id="263" r:id="rId5"/>
-    <p:sldId id="272" r:id="rId6"/>
-    <p:sldId id="273" r:id="rId7"/>
-    <p:sldId id="274" r:id="rId8"/>
-    <p:sldId id="275" r:id="rId9"/>
-    <p:sldId id="276" r:id="rId10"/>
-    <p:sldId id="282" r:id="rId11"/>
-    <p:sldId id="284" r:id="rId12"/>
-    <p:sldId id="277" r:id="rId13"/>
-    <p:sldId id="278" r:id="rId14"/>
+    <p:sldId id="285" r:id="rId4"/>
+    <p:sldId id="278" r:id="rId5"/>
+    <p:sldId id="277" r:id="rId6"/>
+    <p:sldId id="281" r:id="rId7"/>
+    <p:sldId id="263" r:id="rId8"/>
+    <p:sldId id="272" r:id="rId9"/>
+    <p:sldId id="273" r:id="rId10"/>
+    <p:sldId id="274" r:id="rId11"/>
+    <p:sldId id="275" r:id="rId12"/>
+    <p:sldId id="276" r:id="rId13"/>
+    <p:sldId id="282" r:id="rId14"/>
     <p:sldId id="283" r:id="rId15"/>
     <p:sldId id="279" r:id="rId16"/>
   </p:sldIdLst>
@@ -156,7 +156,7 @@
   </p:defaultTextStyle>
   <p:extLst>
     <p:ext uri="{EFAFB233-063F-42B5-8137-9DF3F51BA10A}">
-      <p15:sldGuideLst xmlns="" xmlns:p15="http://schemas.microsoft.com/office/powerpoint/2012/main">
+      <p15:sldGuideLst xmlns:p15="http://schemas.microsoft.com/office/powerpoint/2012/main">
         <p15:guide id="1" orient="horz" pos="2160">
           <p15:clr>
             <a:srgbClr val="A4A3A4"/>
@@ -168,6 +168,9 @@
           </p15:clr>
         </p15:guide>
       </p15:sldGuideLst>
+    </p:ext>
+    <p:ext uri="{2D200454-40CA-4A62-9FC3-DE9A4176ACB9}">
+      <p15:notesGuideLst xmlns:p15="http://schemas.microsoft.com/office/powerpoint/2012/main"/>
     </p:ext>
   </p:extLst>
 </p:presentation>
@@ -223,14 +226,14 @@
           <a:effectLst/>
           <a:extLst>
             <a:ext uri="{909E8E84-426E-40DD-AFC4-6F175D3DCCD1}">
-              <a14:hiddenFill xmlns="" xmlns:a14="http://schemas.microsoft.com/office/drawing/2010/main">
+              <a14:hiddenFill xmlns:a14="http://schemas.microsoft.com/office/drawing/2010/main">
                 <a:solidFill>
                   <a:schemeClr val="accent1"/>
                 </a:solidFill>
               </a14:hiddenFill>
             </a:ext>
             <a:ext uri="{91240B29-F687-4F45-9708-019B960494DF}">
-              <a14:hiddenLine xmlns="" xmlns:a14="http://schemas.microsoft.com/office/drawing/2010/main" w="9525">
+              <a14:hiddenLine xmlns:a14="http://schemas.microsoft.com/office/drawing/2010/main" w="9525">
                 <a:solidFill>
                   <a:schemeClr val="tx1"/>
                 </a:solidFill>
@@ -240,7 +243,7 @@
               </a14:hiddenLine>
             </a:ext>
             <a:ext uri="{AF507438-7753-43E0-B8FC-AC1667EBCBE1}">
-              <a14:hiddenEffects xmlns="" xmlns:a14="http://schemas.microsoft.com/office/drawing/2010/main">
+              <a14:hiddenEffects xmlns:a14="http://schemas.microsoft.com/office/drawing/2010/main">
                 <a:effectLst>
                   <a:outerShdw dist="35921" dir="2700000" algn="ctr" rotWithShape="0">
                     <a:schemeClr val="bg2"/>
@@ -294,14 +297,14 @@
           <a:effectLst/>
           <a:extLst>
             <a:ext uri="{909E8E84-426E-40DD-AFC4-6F175D3DCCD1}">
-              <a14:hiddenFill xmlns="" xmlns:a14="http://schemas.microsoft.com/office/drawing/2010/main">
+              <a14:hiddenFill xmlns:a14="http://schemas.microsoft.com/office/drawing/2010/main">
                 <a:solidFill>
                   <a:schemeClr val="accent1"/>
                 </a:solidFill>
               </a14:hiddenFill>
             </a:ext>
             <a:ext uri="{91240B29-F687-4F45-9708-019B960494DF}">
-              <a14:hiddenLine xmlns="" xmlns:a14="http://schemas.microsoft.com/office/drawing/2010/main" w="9525">
+              <a14:hiddenLine xmlns:a14="http://schemas.microsoft.com/office/drawing/2010/main" w="9525">
                 <a:solidFill>
                   <a:schemeClr val="tx1"/>
                 </a:solidFill>
@@ -311,7 +314,7 @@
               </a14:hiddenLine>
             </a:ext>
             <a:ext uri="{AF507438-7753-43E0-B8FC-AC1667EBCBE1}">
-              <a14:hiddenEffects xmlns="" xmlns:a14="http://schemas.microsoft.com/office/drawing/2010/main">
+              <a14:hiddenEffects xmlns:a14="http://schemas.microsoft.com/office/drawing/2010/main">
                 <a:effectLst>
                   <a:outerShdw dist="35921" dir="2700000" algn="ctr" rotWithShape="0">
                     <a:schemeClr val="bg2"/>
@@ -365,14 +368,14 @@
           <a:effectLst/>
           <a:extLst>
             <a:ext uri="{909E8E84-426E-40DD-AFC4-6F175D3DCCD1}">
-              <a14:hiddenFill xmlns="" xmlns:a14="http://schemas.microsoft.com/office/drawing/2010/main">
+              <a14:hiddenFill xmlns:a14="http://schemas.microsoft.com/office/drawing/2010/main">
                 <a:solidFill>
                   <a:schemeClr val="accent1"/>
                 </a:solidFill>
               </a14:hiddenFill>
             </a:ext>
             <a:ext uri="{91240B29-F687-4F45-9708-019B960494DF}">
-              <a14:hiddenLine xmlns="" xmlns:a14="http://schemas.microsoft.com/office/drawing/2010/main" w="9525">
+              <a14:hiddenLine xmlns:a14="http://schemas.microsoft.com/office/drawing/2010/main" w="9525">
                 <a:solidFill>
                   <a:schemeClr val="tx1"/>
                 </a:solidFill>
@@ -382,7 +385,7 @@
               </a14:hiddenLine>
             </a:ext>
             <a:ext uri="{AF507438-7753-43E0-B8FC-AC1667EBCBE1}">
-              <a14:hiddenEffects xmlns="" xmlns:a14="http://schemas.microsoft.com/office/drawing/2010/main">
+              <a14:hiddenEffects xmlns:a14="http://schemas.microsoft.com/office/drawing/2010/main">
                 <a:effectLst>
                   <a:outerShdw dist="35921" dir="2700000" algn="ctr" rotWithShape="0">
                     <a:schemeClr val="bg2"/>
@@ -436,14 +439,14 @@
           <a:effectLst/>
           <a:extLst>
             <a:ext uri="{909E8E84-426E-40DD-AFC4-6F175D3DCCD1}">
-              <a14:hiddenFill xmlns="" xmlns:a14="http://schemas.microsoft.com/office/drawing/2010/main">
+              <a14:hiddenFill xmlns:a14="http://schemas.microsoft.com/office/drawing/2010/main">
                 <a:solidFill>
                   <a:schemeClr val="accent1"/>
                 </a:solidFill>
               </a14:hiddenFill>
             </a:ext>
             <a:ext uri="{91240B29-F687-4F45-9708-019B960494DF}">
-              <a14:hiddenLine xmlns="" xmlns:a14="http://schemas.microsoft.com/office/drawing/2010/main" w="9525">
+              <a14:hiddenLine xmlns:a14="http://schemas.microsoft.com/office/drawing/2010/main" w="9525">
                 <a:solidFill>
                   <a:schemeClr val="tx1"/>
                 </a:solidFill>
@@ -453,7 +456,7 @@
               </a14:hiddenLine>
             </a:ext>
             <a:ext uri="{AF507438-7753-43E0-B8FC-AC1667EBCBE1}">
-              <a14:hiddenEffects xmlns="" xmlns:a14="http://schemas.microsoft.com/office/drawing/2010/main">
+              <a14:hiddenEffects xmlns:a14="http://schemas.microsoft.com/office/drawing/2010/main">
                 <a:effectLst>
                   <a:outerShdw dist="35921" dir="2700000" algn="ctr" rotWithShape="0">
                     <a:schemeClr val="bg2"/>
@@ -492,7 +495,7 @@
     </p:spTree>
     <p:extLst>
       <p:ext uri="{BB962C8B-B14F-4D97-AF65-F5344CB8AC3E}">
-        <p14:creationId xmlns="" xmlns:p14="http://schemas.microsoft.com/office/powerpoint/2010/main" val="1079346047"/>
+        <p14:creationId xmlns:p14="http://schemas.microsoft.com/office/powerpoint/2010/main" val="1079346047"/>
       </p:ext>
     </p:extLst>
   </p:cSld>
@@ -550,14 +553,14 @@
           <a:effectLst/>
           <a:extLst>
             <a:ext uri="{909E8E84-426E-40DD-AFC4-6F175D3DCCD1}">
-              <a14:hiddenFill xmlns="" xmlns:a14="http://schemas.microsoft.com/office/drawing/2010/main">
+              <a14:hiddenFill xmlns:a14="http://schemas.microsoft.com/office/drawing/2010/main">
                 <a:solidFill>
                   <a:schemeClr val="accent1"/>
                 </a:solidFill>
               </a14:hiddenFill>
             </a:ext>
             <a:ext uri="{91240B29-F687-4F45-9708-019B960494DF}">
-              <a14:hiddenLine xmlns="" xmlns:a14="http://schemas.microsoft.com/office/drawing/2010/main" w="9525">
+              <a14:hiddenLine xmlns:a14="http://schemas.microsoft.com/office/drawing/2010/main" w="9525">
                 <a:solidFill>
                   <a:schemeClr val="tx1"/>
                 </a:solidFill>
@@ -567,7 +570,7 @@
               </a14:hiddenLine>
             </a:ext>
             <a:ext uri="{AF507438-7753-43E0-B8FC-AC1667EBCBE1}">
-              <a14:hiddenEffects xmlns="" xmlns:a14="http://schemas.microsoft.com/office/drawing/2010/main">
+              <a14:hiddenEffects xmlns:a14="http://schemas.microsoft.com/office/drawing/2010/main">
                 <a:effectLst>
                   <a:outerShdw dist="35921" dir="2700000" algn="ctr" rotWithShape="0">
                     <a:schemeClr val="bg2"/>
@@ -621,14 +624,14 @@
           <a:effectLst/>
           <a:extLst>
             <a:ext uri="{909E8E84-426E-40DD-AFC4-6F175D3DCCD1}">
-              <a14:hiddenFill xmlns="" xmlns:a14="http://schemas.microsoft.com/office/drawing/2010/main">
+              <a14:hiddenFill xmlns:a14="http://schemas.microsoft.com/office/drawing/2010/main">
                 <a:solidFill>
                   <a:schemeClr val="accent1"/>
                 </a:solidFill>
               </a14:hiddenFill>
             </a:ext>
             <a:ext uri="{91240B29-F687-4F45-9708-019B960494DF}">
-              <a14:hiddenLine xmlns="" xmlns:a14="http://schemas.microsoft.com/office/drawing/2010/main" w="9525">
+              <a14:hiddenLine xmlns:a14="http://schemas.microsoft.com/office/drawing/2010/main" w="9525">
                 <a:solidFill>
                   <a:schemeClr val="tx1"/>
                 </a:solidFill>
@@ -638,7 +641,7 @@
               </a14:hiddenLine>
             </a:ext>
             <a:ext uri="{AF507438-7753-43E0-B8FC-AC1667EBCBE1}">
-              <a14:hiddenEffects xmlns="" xmlns:a14="http://schemas.microsoft.com/office/drawing/2010/main">
+              <a14:hiddenEffects xmlns:a14="http://schemas.microsoft.com/office/drawing/2010/main">
                 <a:effectLst>
                   <a:outerShdw dist="35921" dir="2700000" algn="ctr" rotWithShape="0">
                     <a:schemeClr val="bg2"/>
@@ -697,14 +700,14 @@
           <a:effectLst/>
           <a:extLst>
             <a:ext uri="{909E8E84-426E-40DD-AFC4-6F175D3DCCD1}">
-              <a14:hiddenFill xmlns="" xmlns:a14="http://schemas.microsoft.com/office/drawing/2010/main">
+              <a14:hiddenFill xmlns:a14="http://schemas.microsoft.com/office/drawing/2010/main">
                 <a:solidFill>
                   <a:srgbClr val="FFFFFF"/>
                 </a:solidFill>
               </a14:hiddenFill>
             </a:ext>
             <a:ext uri="{AF507438-7753-43E0-B8FC-AC1667EBCBE1}">
-              <a14:hiddenEffects xmlns="" xmlns:a14="http://schemas.microsoft.com/office/drawing/2010/main">
+              <a14:hiddenEffects xmlns:a14="http://schemas.microsoft.com/office/drawing/2010/main">
                 <a:effectLst>
                   <a:outerShdw dist="35921" dir="2700000" algn="ctr" rotWithShape="0">
                     <a:srgbClr val="808080"/>
@@ -713,7 +716,7 @@
               </a14:hiddenEffects>
             </a:ext>
             <a:ext uri="{53640926-AAD7-44D8-BBD7-CCE9431645EC}">
-              <a14:shadowObscured xmlns="" xmlns:a14="http://schemas.microsoft.com/office/drawing/2010/main" val="1"/>
+              <a14:shadowObscured xmlns:a14="http://schemas.microsoft.com/office/drawing/2010/main" val="1"/>
             </a:ext>
           </a:extLst>
         </p:spPr>
@@ -743,14 +746,14 @@
           <a:effectLst/>
           <a:extLst>
             <a:ext uri="{909E8E84-426E-40DD-AFC4-6F175D3DCCD1}">
-              <a14:hiddenFill xmlns="" xmlns:a14="http://schemas.microsoft.com/office/drawing/2010/main">
+              <a14:hiddenFill xmlns:a14="http://schemas.microsoft.com/office/drawing/2010/main">
                 <a:solidFill>
                   <a:schemeClr val="accent1"/>
                 </a:solidFill>
               </a14:hiddenFill>
             </a:ext>
             <a:ext uri="{91240B29-F687-4F45-9708-019B960494DF}">
-              <a14:hiddenLine xmlns="" xmlns:a14="http://schemas.microsoft.com/office/drawing/2010/main" w="9525">
+              <a14:hiddenLine xmlns:a14="http://schemas.microsoft.com/office/drawing/2010/main" w="9525">
                 <a:solidFill>
                   <a:schemeClr val="tx1"/>
                 </a:solidFill>
@@ -760,7 +763,7 @@
               </a14:hiddenLine>
             </a:ext>
             <a:ext uri="{AF507438-7753-43E0-B8FC-AC1667EBCBE1}">
-              <a14:hiddenEffects xmlns="" xmlns:a14="http://schemas.microsoft.com/office/drawing/2010/main">
+              <a14:hiddenEffects xmlns:a14="http://schemas.microsoft.com/office/drawing/2010/main">
                 <a:effectLst>
                   <a:outerShdw dist="35921" dir="2700000" algn="ctr" rotWithShape="0">
                     <a:schemeClr val="bg2"/>
@@ -839,14 +842,14 @@
           <a:effectLst/>
           <a:extLst>
             <a:ext uri="{909E8E84-426E-40DD-AFC4-6F175D3DCCD1}">
-              <a14:hiddenFill xmlns="" xmlns:a14="http://schemas.microsoft.com/office/drawing/2010/main">
+              <a14:hiddenFill xmlns:a14="http://schemas.microsoft.com/office/drawing/2010/main">
                 <a:solidFill>
                   <a:schemeClr val="accent1"/>
                 </a:solidFill>
               </a14:hiddenFill>
             </a:ext>
             <a:ext uri="{91240B29-F687-4F45-9708-019B960494DF}">
-              <a14:hiddenLine xmlns="" xmlns:a14="http://schemas.microsoft.com/office/drawing/2010/main" w="9525">
+              <a14:hiddenLine xmlns:a14="http://schemas.microsoft.com/office/drawing/2010/main" w="9525">
                 <a:solidFill>
                   <a:schemeClr val="tx1"/>
                 </a:solidFill>
@@ -856,7 +859,7 @@
               </a14:hiddenLine>
             </a:ext>
             <a:ext uri="{AF507438-7753-43E0-B8FC-AC1667EBCBE1}">
-              <a14:hiddenEffects xmlns="" xmlns:a14="http://schemas.microsoft.com/office/drawing/2010/main">
+              <a14:hiddenEffects xmlns:a14="http://schemas.microsoft.com/office/drawing/2010/main">
                 <a:effectLst>
                   <a:outerShdw dist="35921" dir="2700000" algn="ctr" rotWithShape="0">
                     <a:schemeClr val="bg2"/>
@@ -910,14 +913,14 @@
           <a:effectLst/>
           <a:extLst>
             <a:ext uri="{909E8E84-426E-40DD-AFC4-6F175D3DCCD1}">
-              <a14:hiddenFill xmlns="" xmlns:a14="http://schemas.microsoft.com/office/drawing/2010/main">
+              <a14:hiddenFill xmlns:a14="http://schemas.microsoft.com/office/drawing/2010/main">
                 <a:solidFill>
                   <a:schemeClr val="accent1"/>
                 </a:solidFill>
               </a14:hiddenFill>
             </a:ext>
             <a:ext uri="{91240B29-F687-4F45-9708-019B960494DF}">
-              <a14:hiddenLine xmlns="" xmlns:a14="http://schemas.microsoft.com/office/drawing/2010/main" w="9525">
+              <a14:hiddenLine xmlns:a14="http://schemas.microsoft.com/office/drawing/2010/main" w="9525">
                 <a:solidFill>
                   <a:schemeClr val="tx1"/>
                 </a:solidFill>
@@ -927,7 +930,7 @@
               </a14:hiddenLine>
             </a:ext>
             <a:ext uri="{AF507438-7753-43E0-B8FC-AC1667EBCBE1}">
-              <a14:hiddenEffects xmlns="" xmlns:a14="http://schemas.microsoft.com/office/drawing/2010/main">
+              <a14:hiddenEffects xmlns:a14="http://schemas.microsoft.com/office/drawing/2010/main">
                 <a:effectLst>
                   <a:outerShdw dist="35921" dir="2700000" algn="ctr" rotWithShape="0">
                     <a:schemeClr val="bg2"/>
@@ -966,7 +969,7 @@
     </p:spTree>
     <p:extLst>
       <p:ext uri="{BB962C8B-B14F-4D97-AF65-F5344CB8AC3E}">
-        <p14:creationId xmlns="" xmlns:p14="http://schemas.microsoft.com/office/powerpoint/2010/main" val="1711053471"/>
+        <p14:creationId xmlns:p14="http://schemas.microsoft.com/office/powerpoint/2010/main" val="1711053471"/>
       </p:ext>
     </p:extLst>
   </p:cSld>
@@ -1284,7 +1287,7 @@
     </p:spTree>
     <p:extLst>
       <p:ext uri="{BB962C8B-B14F-4D97-AF65-F5344CB8AC3E}">
-        <p14:creationId xmlns="" xmlns:p14="http://schemas.microsoft.com/office/powerpoint/2010/main" val="2433924881"/>
+        <p14:creationId xmlns:p14="http://schemas.microsoft.com/office/powerpoint/2010/main" val="2433924881"/>
       </p:ext>
     </p:extLst>
   </p:cSld>
@@ -1482,7 +1485,7 @@
     </p:spTree>
     <p:extLst>
       <p:ext uri="{BB962C8B-B14F-4D97-AF65-F5344CB8AC3E}">
-        <p14:creationId xmlns="" xmlns:p14="http://schemas.microsoft.com/office/powerpoint/2010/main" val="1680665394"/>
+        <p14:creationId xmlns:p14="http://schemas.microsoft.com/office/powerpoint/2010/main" val="1680665394"/>
       </p:ext>
     </p:extLst>
   </p:cSld>
@@ -1680,7 +1683,7 @@
     </p:spTree>
     <p:extLst>
       <p:ext uri="{BB962C8B-B14F-4D97-AF65-F5344CB8AC3E}">
-        <p14:creationId xmlns="" xmlns:p14="http://schemas.microsoft.com/office/powerpoint/2010/main" val="1680665394"/>
+        <p14:creationId xmlns:p14="http://schemas.microsoft.com/office/powerpoint/2010/main" val="1680665394"/>
       </p:ext>
     </p:extLst>
   </p:cSld>
@@ -1878,7 +1881,7 @@
     </p:spTree>
     <p:extLst>
       <p:ext uri="{BB962C8B-B14F-4D97-AF65-F5344CB8AC3E}">
-        <p14:creationId xmlns="" xmlns:p14="http://schemas.microsoft.com/office/powerpoint/2010/main" val="1680665394"/>
+        <p14:creationId xmlns:p14="http://schemas.microsoft.com/office/powerpoint/2010/main" val="1680665394"/>
       </p:ext>
     </p:extLst>
   </p:cSld>
@@ -2031,7 +2034,7 @@
             <a:fld id="{ABDE8FA8-F260-4748-B4B1-2AE857DBB852}" type="slidenum">
               <a:rPr lang="en-GB" altLang="en-US"/>
               <a:pPr/>
-              <a:t>6</a:t>
+              <a:t>7</a:t>
             </a:fld>
             <a:endParaRPr lang="en-GB" altLang="en-US"/>
           </a:p>
@@ -2076,7 +2079,7 @@
     </p:spTree>
     <p:extLst>
       <p:ext uri="{BB962C8B-B14F-4D97-AF65-F5344CB8AC3E}">
-        <p14:creationId xmlns="" xmlns:p14="http://schemas.microsoft.com/office/powerpoint/2010/main" val="1680665394"/>
+        <p14:creationId xmlns:p14="http://schemas.microsoft.com/office/powerpoint/2010/main" val="1680665394"/>
       </p:ext>
     </p:extLst>
   </p:cSld>
@@ -2229,7 +2232,7 @@
             <a:fld id="{ABDE8FA8-F260-4748-B4B1-2AE857DBB852}" type="slidenum">
               <a:rPr lang="en-GB" altLang="en-US"/>
               <a:pPr/>
-              <a:t>7</a:t>
+              <a:t>8</a:t>
             </a:fld>
             <a:endParaRPr lang="en-GB" altLang="en-US"/>
           </a:p>
@@ -2274,7 +2277,7 @@
     </p:spTree>
     <p:extLst>
       <p:ext uri="{BB962C8B-B14F-4D97-AF65-F5344CB8AC3E}">
-        <p14:creationId xmlns="" xmlns:p14="http://schemas.microsoft.com/office/powerpoint/2010/main" val="1680665394"/>
+        <p14:creationId xmlns:p14="http://schemas.microsoft.com/office/powerpoint/2010/main" val="1680665394"/>
       </p:ext>
     </p:extLst>
   </p:cSld>
@@ -2427,7 +2430,7 @@
             <a:fld id="{ABDE8FA8-F260-4748-B4B1-2AE857DBB852}" type="slidenum">
               <a:rPr lang="en-GB" altLang="en-US"/>
               <a:pPr/>
-              <a:t>8</a:t>
+              <a:t>9</a:t>
             </a:fld>
             <a:endParaRPr lang="en-GB" altLang="en-US"/>
           </a:p>
@@ -2472,7 +2475,7 @@
     </p:spTree>
     <p:extLst>
       <p:ext uri="{BB962C8B-B14F-4D97-AF65-F5344CB8AC3E}">
-        <p14:creationId xmlns="" xmlns:p14="http://schemas.microsoft.com/office/powerpoint/2010/main" val="1680665394"/>
+        <p14:creationId xmlns:p14="http://schemas.microsoft.com/office/powerpoint/2010/main" val="1680665394"/>
       </p:ext>
     </p:extLst>
   </p:cSld>
@@ -2625,7 +2628,7 @@
             <a:fld id="{ABDE8FA8-F260-4748-B4B1-2AE857DBB852}" type="slidenum">
               <a:rPr lang="en-GB" altLang="en-US"/>
               <a:pPr/>
-              <a:t>9</a:t>
+              <a:t>10</a:t>
             </a:fld>
             <a:endParaRPr lang="en-GB" altLang="en-US"/>
           </a:p>
@@ -2670,7 +2673,7 @@
     </p:spTree>
     <p:extLst>
       <p:ext uri="{BB962C8B-B14F-4D97-AF65-F5344CB8AC3E}">
-        <p14:creationId xmlns="" xmlns:p14="http://schemas.microsoft.com/office/powerpoint/2010/main" val="1680665394"/>
+        <p14:creationId xmlns:p14="http://schemas.microsoft.com/office/powerpoint/2010/main" val="1680665394"/>
       </p:ext>
     </p:extLst>
   </p:cSld>
@@ -2823,7 +2826,7 @@
             <a:fld id="{ABDE8FA8-F260-4748-B4B1-2AE857DBB852}" type="slidenum">
               <a:rPr lang="en-GB" altLang="en-US"/>
               <a:pPr/>
-              <a:t>12</a:t>
+              <a:t>11</a:t>
             </a:fld>
             <a:endParaRPr lang="en-GB" altLang="en-US"/>
           </a:p>
@@ -2868,7 +2871,7 @@
     </p:spTree>
     <p:extLst>
       <p:ext uri="{BB962C8B-B14F-4D97-AF65-F5344CB8AC3E}">
-        <p14:creationId xmlns="" xmlns:p14="http://schemas.microsoft.com/office/powerpoint/2010/main" val="1680665394"/>
+        <p14:creationId xmlns:p14="http://schemas.microsoft.com/office/powerpoint/2010/main" val="1680665394"/>
       </p:ext>
     </p:extLst>
   </p:cSld>
@@ -3021,7 +3024,7 @@
             <a:fld id="{ABDE8FA8-F260-4748-B4B1-2AE857DBB852}" type="slidenum">
               <a:rPr lang="en-GB" altLang="en-US"/>
               <a:pPr/>
-              <a:t>13</a:t>
+              <a:t>12</a:t>
             </a:fld>
             <a:endParaRPr lang="en-GB" altLang="en-US"/>
           </a:p>
@@ -3066,7 +3069,7 @@
     </p:spTree>
     <p:extLst>
       <p:ext uri="{BB962C8B-B14F-4D97-AF65-F5344CB8AC3E}">
-        <p14:creationId xmlns="" xmlns:p14="http://schemas.microsoft.com/office/powerpoint/2010/main" val="1680665394"/>
+        <p14:creationId xmlns:p14="http://schemas.microsoft.com/office/powerpoint/2010/main" val="1680665394"/>
       </p:ext>
     </p:extLst>
   </p:cSld>
@@ -3123,7 +3126,7 @@
           <a:effectLst/>
           <a:extLst>
             <a:ext uri="{AF507438-7753-43E0-B8FC-AC1667EBCBE1}">
-              <a14:hiddenEffects xmlns="" xmlns:a14="http://schemas.microsoft.com/office/drawing/2010/main">
+              <a14:hiddenEffects xmlns:a14="http://schemas.microsoft.com/office/drawing/2010/main">
                 <a:effectLst>
                   <a:outerShdw dist="35921" dir="2700000" algn="ctr" rotWithShape="0">
                     <a:schemeClr val="bg2"/>
@@ -3319,7 +3322,7 @@
           </a:ln>
           <a:extLst>
             <a:ext uri="{91240B29-F687-4F45-9708-019B960494DF}">
-              <a14:hiddenLine xmlns="" xmlns:a14="http://schemas.microsoft.com/office/drawing/2010/main" w="9525">
+              <a14:hiddenLine xmlns:a14="http://schemas.microsoft.com/office/drawing/2010/main" w="9525">
                 <a:solidFill>
                   <a:srgbClr val="000000"/>
                 </a:solidFill>
@@ -3459,14 +3462,14 @@
           </a:prstGeom>
           <a:extLst>
             <a:ext uri="{909E8E84-426E-40DD-AFC4-6F175D3DCCD1}">
-              <a14:hiddenFill xmlns="" xmlns:a14="http://schemas.microsoft.com/office/drawing/2010/main">
+              <a14:hiddenFill xmlns:a14="http://schemas.microsoft.com/office/drawing/2010/main">
                 <a:solidFill>
                   <a:schemeClr val="accent1"/>
                 </a:solidFill>
               </a14:hiddenFill>
             </a:ext>
             <a:ext uri="{91240B29-F687-4F45-9708-019B960494DF}">
-              <a14:hiddenLine xmlns="" xmlns:a14="http://schemas.microsoft.com/office/drawing/2010/main" w="9525">
+              <a14:hiddenLine xmlns:a14="http://schemas.microsoft.com/office/drawing/2010/main" w="9525">
                 <a:solidFill>
                   <a:schemeClr val="tx1"/>
                 </a:solidFill>
@@ -3476,7 +3479,7 @@
               </a14:hiddenLine>
             </a:ext>
             <a:ext uri="{AF507438-7753-43E0-B8FC-AC1667EBCBE1}">
-              <a14:hiddenEffects xmlns="" xmlns:a14="http://schemas.microsoft.com/office/drawing/2010/main">
+              <a14:hiddenEffects xmlns:a14="http://schemas.microsoft.com/office/drawing/2010/main">
                 <a:effectLst>
                   <a:outerShdw dist="35921" dir="2700000" algn="ctr" rotWithShape="0">
                     <a:schemeClr val="bg2"/>
@@ -3546,7 +3549,7 @@
     </p:spTree>
     <p:extLst>
       <p:ext uri="{BB962C8B-B14F-4D97-AF65-F5344CB8AC3E}">
-        <p14:creationId xmlns="" xmlns:p14="http://schemas.microsoft.com/office/powerpoint/2010/main" val="3862339717"/>
+        <p14:creationId xmlns:p14="http://schemas.microsoft.com/office/powerpoint/2010/main" val="3862339717"/>
       </p:ext>
     </p:extLst>
   </p:cSld>
@@ -3717,7 +3720,7 @@
     </p:spTree>
     <p:extLst>
       <p:ext uri="{BB962C8B-B14F-4D97-AF65-F5344CB8AC3E}">
-        <p14:creationId xmlns="" xmlns:p14="http://schemas.microsoft.com/office/powerpoint/2010/main" val="3616501732"/>
+        <p14:creationId xmlns:p14="http://schemas.microsoft.com/office/powerpoint/2010/main" val="3616501732"/>
       </p:ext>
     </p:extLst>
   </p:cSld>
@@ -3898,7 +3901,7 @@
     </p:spTree>
     <p:extLst>
       <p:ext uri="{BB962C8B-B14F-4D97-AF65-F5344CB8AC3E}">
-        <p14:creationId xmlns="" xmlns:p14="http://schemas.microsoft.com/office/powerpoint/2010/main" val="4183861666"/>
+        <p14:creationId xmlns:p14="http://schemas.microsoft.com/office/powerpoint/2010/main" val="4183861666"/>
       </p:ext>
     </p:extLst>
   </p:cSld>
@@ -4047,7 +4050,7 @@
     </p:spTree>
     <p:extLst>
       <p:ext uri="{BB962C8B-B14F-4D97-AF65-F5344CB8AC3E}">
-        <p14:creationId xmlns="" xmlns:p14="http://schemas.microsoft.com/office/powerpoint/2010/main" val="1998572866"/>
+        <p14:creationId xmlns:p14="http://schemas.microsoft.com/office/powerpoint/2010/main" val="1998572866"/>
       </p:ext>
     </p:extLst>
   </p:cSld>
@@ -4196,7 +4199,7 @@
     </p:spTree>
     <p:extLst>
       <p:ext uri="{BB962C8B-B14F-4D97-AF65-F5344CB8AC3E}">
-        <p14:creationId xmlns="" xmlns:p14="http://schemas.microsoft.com/office/powerpoint/2010/main" val="4186681241"/>
+        <p14:creationId xmlns:p14="http://schemas.microsoft.com/office/powerpoint/2010/main" val="4186681241"/>
       </p:ext>
     </p:extLst>
   </p:cSld>
@@ -4434,7 +4437,7 @@
     </p:spTree>
     <p:extLst>
       <p:ext uri="{BB962C8B-B14F-4D97-AF65-F5344CB8AC3E}">
-        <p14:creationId xmlns="" xmlns:p14="http://schemas.microsoft.com/office/powerpoint/2010/main" val="2973065096"/>
+        <p14:creationId xmlns:p14="http://schemas.microsoft.com/office/powerpoint/2010/main" val="2973065096"/>
       </p:ext>
     </p:extLst>
   </p:cSld>
@@ -4605,7 +4608,7 @@
     </p:spTree>
     <p:extLst>
       <p:ext uri="{BB962C8B-B14F-4D97-AF65-F5344CB8AC3E}">
-        <p14:creationId xmlns="" xmlns:p14="http://schemas.microsoft.com/office/powerpoint/2010/main" val="2023945706"/>
+        <p14:creationId xmlns:p14="http://schemas.microsoft.com/office/powerpoint/2010/main" val="2023945706"/>
       </p:ext>
     </p:extLst>
   </p:cSld>
@@ -4798,7 +4801,7 @@
     </p:spTree>
     <p:extLst>
       <p:ext uri="{BB962C8B-B14F-4D97-AF65-F5344CB8AC3E}">
-        <p14:creationId xmlns="" xmlns:p14="http://schemas.microsoft.com/office/powerpoint/2010/main" val="3910440067"/>
+        <p14:creationId xmlns:p14="http://schemas.microsoft.com/office/powerpoint/2010/main" val="3910440067"/>
       </p:ext>
     </p:extLst>
   </p:cSld>
@@ -5031,7 +5034,7 @@
     </p:spTree>
     <p:extLst>
       <p:ext uri="{BB962C8B-B14F-4D97-AF65-F5344CB8AC3E}">
-        <p14:creationId xmlns="" xmlns:p14="http://schemas.microsoft.com/office/powerpoint/2010/main" val="2263429059"/>
+        <p14:creationId xmlns:p14="http://schemas.microsoft.com/office/powerpoint/2010/main" val="2263429059"/>
       </p:ext>
     </p:extLst>
   </p:cSld>
@@ -5399,7 +5402,7 @@
     </p:spTree>
     <p:extLst>
       <p:ext uri="{BB962C8B-B14F-4D97-AF65-F5344CB8AC3E}">
-        <p14:creationId xmlns="" xmlns:p14="http://schemas.microsoft.com/office/powerpoint/2010/main" val="1912727455"/>
+        <p14:creationId xmlns:p14="http://schemas.microsoft.com/office/powerpoint/2010/main" val="1912727455"/>
       </p:ext>
     </p:extLst>
   </p:cSld>
@@ -5518,7 +5521,7 @@
     </p:spTree>
     <p:extLst>
       <p:ext uri="{BB962C8B-B14F-4D97-AF65-F5344CB8AC3E}">
-        <p14:creationId xmlns="" xmlns:p14="http://schemas.microsoft.com/office/powerpoint/2010/main" val="4269111437"/>
+        <p14:creationId xmlns:p14="http://schemas.microsoft.com/office/powerpoint/2010/main" val="4269111437"/>
       </p:ext>
     </p:extLst>
   </p:cSld>
@@ -5614,7 +5617,7 @@
     </p:spTree>
     <p:extLst>
       <p:ext uri="{BB962C8B-B14F-4D97-AF65-F5344CB8AC3E}">
-        <p14:creationId xmlns="" xmlns:p14="http://schemas.microsoft.com/office/powerpoint/2010/main" val="292276621"/>
+        <p14:creationId xmlns:p14="http://schemas.microsoft.com/office/powerpoint/2010/main" val="292276621"/>
       </p:ext>
     </p:extLst>
   </p:cSld>
@@ -5892,7 +5895,7 @@
     </p:spTree>
     <p:extLst>
       <p:ext uri="{BB962C8B-B14F-4D97-AF65-F5344CB8AC3E}">
-        <p14:creationId xmlns="" xmlns:p14="http://schemas.microsoft.com/office/powerpoint/2010/main" val="570490551"/>
+        <p14:creationId xmlns:p14="http://schemas.microsoft.com/office/powerpoint/2010/main" val="570490551"/>
       </p:ext>
     </p:extLst>
   </p:cSld>
@@ -6147,7 +6150,7 @@
     </p:spTree>
     <p:extLst>
       <p:ext uri="{BB962C8B-B14F-4D97-AF65-F5344CB8AC3E}">
-        <p14:creationId xmlns="" xmlns:p14="http://schemas.microsoft.com/office/powerpoint/2010/main" val="2425261388"/>
+        <p14:creationId xmlns:p14="http://schemas.microsoft.com/office/powerpoint/2010/main" val="2425261388"/>
       </p:ext>
     </p:extLst>
   </p:cSld>
@@ -6215,7 +6218,7 @@
           <a:effectLst/>
           <a:extLst>
             <a:ext uri="{AF507438-7753-43E0-B8FC-AC1667EBCBE1}">
-              <a14:hiddenEffects xmlns="" xmlns:a14="http://schemas.microsoft.com/office/drawing/2010/main">
+              <a14:hiddenEffects xmlns:a14="http://schemas.microsoft.com/office/drawing/2010/main">
                 <a:effectLst>
                   <a:outerShdw dist="35921" dir="2700000" algn="ctr" rotWithShape="0">
                     <a:schemeClr val="bg2"/>
@@ -6365,14 +6368,14 @@
           <a:effectLst/>
           <a:extLst>
             <a:ext uri="{909E8E84-426E-40DD-AFC4-6F175D3DCCD1}">
-              <a14:hiddenFill xmlns="" xmlns:a14="http://schemas.microsoft.com/office/drawing/2010/main">
+              <a14:hiddenFill xmlns:a14="http://schemas.microsoft.com/office/drawing/2010/main">
                 <a:solidFill>
                   <a:schemeClr val="accent1"/>
                 </a:solidFill>
               </a14:hiddenFill>
             </a:ext>
             <a:ext uri="{91240B29-F687-4F45-9708-019B960494DF}">
-              <a14:hiddenLine xmlns="" xmlns:a14="http://schemas.microsoft.com/office/drawing/2010/main" w="9525">
+              <a14:hiddenLine xmlns:a14="http://schemas.microsoft.com/office/drawing/2010/main" w="9525">
                 <a:solidFill>
                   <a:schemeClr val="tx1"/>
                 </a:solidFill>
@@ -6382,7 +6385,7 @@
               </a14:hiddenLine>
             </a:ext>
             <a:ext uri="{AF507438-7753-43E0-B8FC-AC1667EBCBE1}">
-              <a14:hiddenEffects xmlns="" xmlns:a14="http://schemas.microsoft.com/office/drawing/2010/main">
+              <a14:hiddenEffects xmlns:a14="http://schemas.microsoft.com/office/drawing/2010/main">
                 <a:effectLst>
                   <a:outerShdw dist="35921" dir="2700000" algn="ctr" rotWithShape="0">
                     <a:schemeClr val="bg2"/>
@@ -6461,14 +6464,14 @@
           <a:effectLst/>
           <a:extLst>
             <a:ext uri="{909E8E84-426E-40DD-AFC4-6F175D3DCCD1}">
-              <a14:hiddenFill xmlns="" xmlns:a14="http://schemas.microsoft.com/office/drawing/2010/main">
+              <a14:hiddenFill xmlns:a14="http://schemas.microsoft.com/office/drawing/2010/main">
                 <a:solidFill>
                   <a:schemeClr val="accent1"/>
                 </a:solidFill>
               </a14:hiddenFill>
             </a:ext>
             <a:ext uri="{91240B29-F687-4F45-9708-019B960494DF}">
-              <a14:hiddenLine xmlns="" xmlns:a14="http://schemas.microsoft.com/office/drawing/2010/main" w="9525">
+              <a14:hiddenLine xmlns:a14="http://schemas.microsoft.com/office/drawing/2010/main" w="9525">
                 <a:solidFill>
                   <a:schemeClr val="tx1"/>
                 </a:solidFill>
@@ -6478,7 +6481,7 @@
               </a14:hiddenLine>
             </a:ext>
             <a:ext uri="{AF507438-7753-43E0-B8FC-AC1667EBCBE1}">
-              <a14:hiddenEffects xmlns="" xmlns:a14="http://schemas.microsoft.com/office/drawing/2010/main">
+              <a14:hiddenEffects xmlns:a14="http://schemas.microsoft.com/office/drawing/2010/main">
                 <a:effectLst>
                   <a:outerShdw dist="35921" dir="2700000" algn="ctr" rotWithShape="0">
                     <a:schemeClr val="bg2"/>
@@ -6529,14 +6532,14 @@
           <a:effectLst/>
           <a:extLst>
             <a:ext uri="{909E8E84-426E-40DD-AFC4-6F175D3DCCD1}">
-              <a14:hiddenFill xmlns="" xmlns:a14="http://schemas.microsoft.com/office/drawing/2010/main">
+              <a14:hiddenFill xmlns:a14="http://schemas.microsoft.com/office/drawing/2010/main">
                 <a:solidFill>
                   <a:schemeClr val="accent1"/>
                 </a:solidFill>
               </a14:hiddenFill>
             </a:ext>
             <a:ext uri="{91240B29-F687-4F45-9708-019B960494DF}">
-              <a14:hiddenLine xmlns="" xmlns:a14="http://schemas.microsoft.com/office/drawing/2010/main" w="9525">
+              <a14:hiddenLine xmlns:a14="http://schemas.microsoft.com/office/drawing/2010/main" w="9525">
                 <a:solidFill>
                   <a:schemeClr val="tx1"/>
                 </a:solidFill>
@@ -6546,7 +6549,7 @@
               </a14:hiddenLine>
             </a:ext>
             <a:ext uri="{AF507438-7753-43E0-B8FC-AC1667EBCBE1}">
-              <a14:hiddenEffects xmlns="" xmlns:a14="http://schemas.microsoft.com/office/drawing/2010/main">
+              <a14:hiddenEffects xmlns:a14="http://schemas.microsoft.com/office/drawing/2010/main">
                 <a:effectLst>
                   <a:outerShdw dist="35921" dir="2700000" algn="ctr" rotWithShape="0">
                     <a:schemeClr val="bg2"/>
@@ -6600,14 +6603,14 @@
           <a:effectLst/>
           <a:extLst>
             <a:ext uri="{909E8E84-426E-40DD-AFC4-6F175D3DCCD1}">
-              <a14:hiddenFill xmlns="" xmlns:a14="http://schemas.microsoft.com/office/drawing/2010/main">
+              <a14:hiddenFill xmlns:a14="http://schemas.microsoft.com/office/drawing/2010/main">
                 <a:solidFill>
                   <a:schemeClr val="accent1"/>
                 </a:solidFill>
               </a14:hiddenFill>
             </a:ext>
             <a:ext uri="{91240B29-F687-4F45-9708-019B960494DF}">
-              <a14:hiddenLine xmlns="" xmlns:a14="http://schemas.microsoft.com/office/drawing/2010/main" w="9525">
+              <a14:hiddenLine xmlns:a14="http://schemas.microsoft.com/office/drawing/2010/main" w="9525">
                 <a:solidFill>
                   <a:schemeClr val="tx1"/>
                 </a:solidFill>
@@ -6617,7 +6620,7 @@
               </a14:hiddenLine>
             </a:ext>
             <a:ext uri="{AF507438-7753-43E0-B8FC-AC1667EBCBE1}">
-              <a14:hiddenEffects xmlns="" xmlns:a14="http://schemas.microsoft.com/office/drawing/2010/main">
+              <a14:hiddenEffects xmlns:a14="http://schemas.microsoft.com/office/drawing/2010/main">
                 <a:effectLst>
                   <a:outerShdw dist="35921" dir="2700000" algn="ctr" rotWithShape="0">
                     <a:schemeClr val="bg2"/>
@@ -7241,6 +7244,596 @@
 </file>
 
 <file path=ppt/slides/slide10.xml><?xml version="1.0" encoding="utf-8"?>
+<p:sld xmlns:a="http://schemas.openxmlformats.org/drawingml/2006/main" xmlns:r="http://schemas.openxmlformats.org/officeDocument/2006/relationships" xmlns:p="http://schemas.openxmlformats.org/presentationml/2006/main">
+  <p:cSld>
+    <p:spTree>
+      <p:nvGrpSpPr>
+        <p:cNvPr id="1" name=""/>
+        <p:cNvGrpSpPr/>
+        <p:nvPr/>
+      </p:nvGrpSpPr>
+      <p:grpSpPr>
+        <a:xfrm>
+          <a:off x="0" y="0"/>
+          <a:ext cx="0" cy="0"/>
+          <a:chOff x="0" y="0"/>
+          <a:chExt cx="0" cy="0"/>
+        </a:xfrm>
+      </p:grpSpPr>
+      <p:sp>
+        <p:nvSpPr>
+          <p:cNvPr id="7170" name="Rectangle 2"/>
+          <p:cNvSpPr>
+            <a:spLocks noGrp="1" noChangeArrowheads="1"/>
+          </p:cNvSpPr>
+          <p:nvPr>
+            <p:ph type="title"/>
+          </p:nvPr>
+        </p:nvSpPr>
+        <p:spPr>
+          <a:xfrm>
+            <a:off x="971600" y="224644"/>
+            <a:ext cx="2880320" cy="764704"/>
+          </a:xfrm>
+        </p:spPr>
+        <p:txBody>
+          <a:bodyPr/>
+          <a:lstStyle/>
+          <a:p>
+            <a:pPr algn="ctr" eaLnBrk="1" hangingPunct="1"/>
+            <a:r>
+              <a:rPr lang="en-US" altLang="en-US" sz="4500" b="1" dirty="0" smtClean="0">
+                <a:solidFill>
+                  <a:schemeClr val="bg1">
+                    <a:lumMod val="10000"/>
+                  </a:schemeClr>
+                </a:solidFill>
+              </a:rPr>
+              <a:t>STOCKS</a:t>
+            </a:r>
+          </a:p>
+        </p:txBody>
+      </p:sp>
+      <p:sp>
+        <p:nvSpPr>
+          <p:cNvPr id="5" name="TextBox 4"/>
+          <p:cNvSpPr txBox="1"/>
+          <p:nvPr/>
+        </p:nvSpPr>
+        <p:spPr>
+          <a:xfrm>
+            <a:off x="3167844" y="5697252"/>
+            <a:ext cx="2844316" cy="923330"/>
+          </a:xfrm>
+          <a:prstGeom prst="rect">
+            <a:avLst/>
+          </a:prstGeom>
+          <a:noFill/>
+        </p:spPr>
+        <p:txBody>
+          <a:bodyPr wrap="square" rtlCol="0">
+            <a:spAutoFit/>
+          </a:bodyPr>
+          <a:lstStyle/>
+          <a:p>
+            <a:pPr algn="ctr"/>
+            <a:r>
+              <a:rPr lang="en-US" b="1" dirty="0" smtClean="0">
+                <a:solidFill>
+                  <a:schemeClr val="bg1">
+                    <a:lumMod val="10000"/>
+                  </a:schemeClr>
+                </a:solidFill>
+              </a:rPr>
+              <a:t>Monte Carlo Simulation </a:t>
+            </a:r>
+            <a:r>
+              <a:rPr lang="en-US" b="1" i="1" dirty="0" smtClean="0">
+                <a:solidFill>
+                  <a:schemeClr val="bg1">
+                    <a:lumMod val="10000"/>
+                  </a:schemeClr>
+                </a:solidFill>
+              </a:rPr>
+              <a:t>10 Years</a:t>
+            </a:r>
+          </a:p>
+          <a:p>
+            <a:endParaRPr lang="en-US" dirty="0"/>
+          </a:p>
+        </p:txBody>
+      </p:sp>
+      <p:sp>
+        <p:nvSpPr>
+          <p:cNvPr id="11" name="TextBox 10"/>
+          <p:cNvSpPr txBox="1"/>
+          <p:nvPr/>
+        </p:nvSpPr>
+        <p:spPr>
+          <a:xfrm>
+            <a:off x="3815916" y="440668"/>
+            <a:ext cx="5328084" cy="1015663"/>
+          </a:xfrm>
+          <a:prstGeom prst="rect">
+            <a:avLst/>
+          </a:prstGeom>
+          <a:noFill/>
+        </p:spPr>
+        <p:txBody>
+          <a:bodyPr wrap="square" rtlCol="0">
+            <a:spAutoFit/>
+          </a:bodyPr>
+          <a:lstStyle/>
+          <a:p>
+            <a:pPr algn="ctr"/>
+            <a:r>
+              <a:rPr lang="en-US" sz="2000" dirty="0" smtClean="0">
+                <a:solidFill>
+                  <a:schemeClr val="bg1">
+                    <a:lumMod val="10000"/>
+                  </a:schemeClr>
+                </a:solidFill>
+              </a:rPr>
+              <a:t>•  FB  •  AMZN  •  AAPL  •  XOM  •  JPM  •</a:t>
+            </a:r>
+          </a:p>
+          <a:p>
+            <a:pPr algn="ctr"/>
+            <a:r>
+              <a:rPr lang="en-US" sz="2000" dirty="0" smtClean="0">
+                <a:solidFill>
+                  <a:schemeClr val="bg1">
+                    <a:lumMod val="10000"/>
+                  </a:schemeClr>
+                </a:solidFill>
+              </a:rPr>
+              <a:t>•  JNJ  •  HON  •  LIN  •  AMT  •  PG  •  NEE •</a:t>
+            </a:r>
+          </a:p>
+          <a:p>
+            <a:endParaRPr lang="en-US" sz="2000" dirty="0">
+              <a:solidFill>
+                <a:schemeClr val="bg1">
+                  <a:lumMod val="10000"/>
+                </a:schemeClr>
+              </a:solidFill>
+            </a:endParaRPr>
+          </a:p>
+        </p:txBody>
+      </p:sp>
+      <p:pic>
+        <p:nvPicPr>
+          <p:cNvPr id="58370" name="Picture 2" descr="mc_10_cum_return_dist_stocks.png"/>
+          <p:cNvPicPr>
+            <a:picLocks noChangeAspect="1" noChangeArrowheads="1"/>
+          </p:cNvPicPr>
+          <p:nvPr/>
+        </p:nvPicPr>
+        <p:blipFill>
+          <a:blip r:embed="rId3" cstate="print"/>
+          <a:srcRect/>
+          <a:stretch>
+            <a:fillRect/>
+          </a:stretch>
+        </p:blipFill>
+        <p:spPr bwMode="auto">
+          <a:xfrm>
+            <a:off x="1472184" y="1664208"/>
+            <a:ext cx="6200775" cy="3771900"/>
+          </a:xfrm>
+          <a:prstGeom prst="rect">
+            <a:avLst/>
+          </a:prstGeom>
+          <a:noFill/>
+        </p:spPr>
+      </p:pic>
+    </p:spTree>
+  </p:cSld>
+  <p:clrMapOvr>
+    <a:masterClrMapping/>
+  </p:clrMapOvr>
+  <p:transition>
+    <p:wipe dir="r"/>
+  </p:transition>
+  <p:timing>
+    <p:tnLst>
+      <p:par>
+        <p:cTn id="1" dur="indefinite" restart="never" nodeType="tmRoot"/>
+      </p:par>
+    </p:tnLst>
+  </p:timing>
+</p:sld>
+</file>
+
+<file path=ppt/slides/slide11.xml><?xml version="1.0" encoding="utf-8"?>
+<p:sld xmlns:a="http://schemas.openxmlformats.org/drawingml/2006/main" xmlns:r="http://schemas.openxmlformats.org/officeDocument/2006/relationships" xmlns:p="http://schemas.openxmlformats.org/presentationml/2006/main">
+  <p:cSld>
+    <p:spTree>
+      <p:nvGrpSpPr>
+        <p:cNvPr id="1" name=""/>
+        <p:cNvGrpSpPr/>
+        <p:nvPr/>
+      </p:nvGrpSpPr>
+      <p:grpSpPr>
+        <a:xfrm>
+          <a:off x="0" y="0"/>
+          <a:ext cx="0" cy="0"/>
+          <a:chOff x="0" y="0"/>
+          <a:chExt cx="0" cy="0"/>
+        </a:xfrm>
+      </p:grpSpPr>
+      <p:sp>
+        <p:nvSpPr>
+          <p:cNvPr id="7170" name="Rectangle 2"/>
+          <p:cNvSpPr>
+            <a:spLocks noGrp="1" noChangeArrowheads="1"/>
+          </p:cNvSpPr>
+          <p:nvPr>
+            <p:ph type="title"/>
+          </p:nvPr>
+        </p:nvSpPr>
+        <p:spPr>
+          <a:xfrm>
+            <a:off x="1115616" y="224644"/>
+            <a:ext cx="2880320" cy="764704"/>
+          </a:xfrm>
+        </p:spPr>
+        <p:txBody>
+          <a:bodyPr/>
+          <a:lstStyle/>
+          <a:p>
+            <a:pPr algn="ctr" eaLnBrk="1" hangingPunct="1"/>
+            <a:r>
+              <a:rPr lang="en-US" altLang="en-US" sz="4500" b="1" dirty="0" smtClean="0">
+                <a:solidFill>
+                  <a:schemeClr val="bg1">
+                    <a:lumMod val="10000"/>
+                  </a:schemeClr>
+                </a:solidFill>
+              </a:rPr>
+              <a:t>CRYPTO</a:t>
+            </a:r>
+          </a:p>
+        </p:txBody>
+      </p:sp>
+      <p:sp>
+        <p:nvSpPr>
+          <p:cNvPr id="5" name="TextBox 4"/>
+          <p:cNvSpPr txBox="1"/>
+          <p:nvPr/>
+        </p:nvSpPr>
+        <p:spPr>
+          <a:xfrm>
+            <a:off x="3167844" y="5697252"/>
+            <a:ext cx="2844316" cy="923330"/>
+          </a:xfrm>
+          <a:prstGeom prst="rect">
+            <a:avLst/>
+          </a:prstGeom>
+          <a:noFill/>
+        </p:spPr>
+        <p:txBody>
+          <a:bodyPr wrap="square" rtlCol="0">
+            <a:spAutoFit/>
+          </a:bodyPr>
+          <a:lstStyle/>
+          <a:p>
+            <a:pPr algn="ctr"/>
+            <a:r>
+              <a:rPr lang="en-US" b="1" dirty="0" smtClean="0">
+                <a:solidFill>
+                  <a:schemeClr val="bg1">
+                    <a:lumMod val="10000"/>
+                  </a:schemeClr>
+                </a:solidFill>
+              </a:rPr>
+              <a:t>Monte Carlo Simulation </a:t>
+            </a:r>
+            <a:r>
+              <a:rPr lang="en-US" b="1" i="1" dirty="0" smtClean="0">
+                <a:solidFill>
+                  <a:schemeClr val="bg1">
+                    <a:lumMod val="10000"/>
+                  </a:schemeClr>
+                </a:solidFill>
+              </a:rPr>
+              <a:t>10 Years</a:t>
+            </a:r>
+          </a:p>
+          <a:p>
+            <a:endParaRPr lang="en-US" dirty="0"/>
+          </a:p>
+        </p:txBody>
+      </p:sp>
+      <p:sp>
+        <p:nvSpPr>
+          <p:cNvPr id="11" name="TextBox 10"/>
+          <p:cNvSpPr txBox="1"/>
+          <p:nvPr/>
+        </p:nvSpPr>
+        <p:spPr>
+          <a:xfrm>
+            <a:off x="3815916" y="656692"/>
+            <a:ext cx="5112568" cy="400110"/>
+          </a:xfrm>
+          <a:prstGeom prst="rect">
+            <a:avLst/>
+          </a:prstGeom>
+          <a:noFill/>
+        </p:spPr>
+        <p:txBody>
+          <a:bodyPr wrap="square" rtlCol="0">
+            <a:spAutoFit/>
+          </a:bodyPr>
+          <a:lstStyle/>
+          <a:p>
+            <a:r>
+              <a:rPr lang="en-US" sz="2000" dirty="0" smtClean="0">
+                <a:solidFill>
+                  <a:schemeClr val="bg1">
+                    <a:lumMod val="10000"/>
+                  </a:schemeClr>
+                </a:solidFill>
+              </a:rPr>
+              <a:t>•  BTC  •  ETH  •  BNB  •  DASH  •  LTC  •</a:t>
+            </a:r>
+            <a:endParaRPr lang="en-US" sz="2000" dirty="0">
+              <a:solidFill>
+                <a:schemeClr val="bg1">
+                  <a:lumMod val="10000"/>
+                </a:schemeClr>
+              </a:solidFill>
+            </a:endParaRPr>
+          </a:p>
+        </p:txBody>
+      </p:sp>
+      <p:pic>
+        <p:nvPicPr>
+          <p:cNvPr id="60418" name="Picture 2" descr="mc_10_cum_return_dist_cryptocurrency.png"/>
+          <p:cNvPicPr>
+            <a:picLocks noChangeAspect="1" noChangeArrowheads="1"/>
+          </p:cNvPicPr>
+          <p:nvPr/>
+        </p:nvPicPr>
+        <p:blipFill>
+          <a:blip r:embed="rId3" cstate="print"/>
+          <a:srcRect/>
+          <a:stretch>
+            <a:fillRect/>
+          </a:stretch>
+        </p:blipFill>
+        <p:spPr bwMode="auto">
+          <a:xfrm>
+            <a:off x="1472184" y="1664208"/>
+            <a:ext cx="6386513" cy="3771900"/>
+          </a:xfrm>
+          <a:prstGeom prst="rect">
+            <a:avLst/>
+          </a:prstGeom>
+          <a:noFill/>
+        </p:spPr>
+      </p:pic>
+    </p:spTree>
+  </p:cSld>
+  <p:clrMapOvr>
+    <a:masterClrMapping/>
+  </p:clrMapOvr>
+  <p:transition>
+    <p:wipe dir="r"/>
+  </p:transition>
+  <p:timing>
+    <p:tnLst>
+      <p:par>
+        <p:cTn id="1" dur="indefinite" restart="never" nodeType="tmRoot"/>
+      </p:par>
+    </p:tnLst>
+  </p:timing>
+</p:sld>
+</file>
+
+<file path=ppt/slides/slide12.xml><?xml version="1.0" encoding="utf-8"?>
+<p:sld xmlns:a="http://schemas.openxmlformats.org/drawingml/2006/main" xmlns:r="http://schemas.openxmlformats.org/officeDocument/2006/relationships" xmlns:p="http://schemas.openxmlformats.org/presentationml/2006/main">
+  <p:cSld>
+    <p:spTree>
+      <p:nvGrpSpPr>
+        <p:cNvPr id="1" name=""/>
+        <p:cNvGrpSpPr/>
+        <p:nvPr/>
+      </p:nvGrpSpPr>
+      <p:grpSpPr>
+        <a:xfrm>
+          <a:off x="0" y="0"/>
+          <a:ext cx="0" cy="0"/>
+          <a:chOff x="0" y="0"/>
+          <a:chExt cx="0" cy="0"/>
+        </a:xfrm>
+      </p:grpSpPr>
+      <p:sp>
+        <p:nvSpPr>
+          <p:cNvPr id="7170" name="Rectangle 2"/>
+          <p:cNvSpPr>
+            <a:spLocks noGrp="1" noChangeArrowheads="1"/>
+          </p:cNvSpPr>
+          <p:nvPr>
+            <p:ph type="title"/>
+          </p:nvPr>
+        </p:nvSpPr>
+        <p:spPr>
+          <a:xfrm>
+            <a:off x="0" y="224644"/>
+            <a:ext cx="3959932" cy="764704"/>
+          </a:xfrm>
+        </p:spPr>
+        <p:txBody>
+          <a:bodyPr/>
+          <a:lstStyle/>
+          <a:p>
+            <a:pPr algn="ctr" eaLnBrk="1" hangingPunct="1"/>
+            <a:r>
+              <a:rPr lang="en-US" altLang="en-US" sz="4500" b="1" dirty="0" smtClean="0">
+                <a:solidFill>
+                  <a:schemeClr val="bg1">
+                    <a:lumMod val="10000"/>
+                  </a:schemeClr>
+                </a:solidFill>
+              </a:rPr>
+              <a:t>DIVERSIFIED</a:t>
+            </a:r>
+          </a:p>
+        </p:txBody>
+      </p:sp>
+      <p:sp>
+        <p:nvSpPr>
+          <p:cNvPr id="5" name="TextBox 4"/>
+          <p:cNvSpPr txBox="1"/>
+          <p:nvPr/>
+        </p:nvSpPr>
+        <p:spPr>
+          <a:xfrm>
+            <a:off x="3167844" y="5697252"/>
+            <a:ext cx="2844316" cy="923330"/>
+          </a:xfrm>
+          <a:prstGeom prst="rect">
+            <a:avLst/>
+          </a:prstGeom>
+          <a:noFill/>
+        </p:spPr>
+        <p:txBody>
+          <a:bodyPr wrap="square" rtlCol="0">
+            <a:spAutoFit/>
+          </a:bodyPr>
+          <a:lstStyle/>
+          <a:p>
+            <a:pPr algn="ctr"/>
+            <a:r>
+              <a:rPr lang="en-US" b="1" dirty="0" smtClean="0">
+                <a:solidFill>
+                  <a:schemeClr val="bg1">
+                    <a:lumMod val="10000"/>
+                  </a:schemeClr>
+                </a:solidFill>
+              </a:rPr>
+              <a:t>Monte Carlo Simulation </a:t>
+            </a:r>
+            <a:r>
+              <a:rPr lang="en-US" b="1" i="1" dirty="0" smtClean="0">
+                <a:solidFill>
+                  <a:schemeClr val="bg1">
+                    <a:lumMod val="10000"/>
+                  </a:schemeClr>
+                </a:solidFill>
+              </a:rPr>
+              <a:t>10 Years</a:t>
+            </a:r>
+          </a:p>
+          <a:p>
+            <a:endParaRPr lang="en-US" dirty="0"/>
+          </a:p>
+        </p:txBody>
+      </p:sp>
+      <p:sp>
+        <p:nvSpPr>
+          <p:cNvPr id="11" name="TextBox 10"/>
+          <p:cNvSpPr txBox="1"/>
+          <p:nvPr/>
+        </p:nvSpPr>
+        <p:spPr>
+          <a:xfrm>
+            <a:off x="3815916" y="440668"/>
+            <a:ext cx="5328084" cy="1015663"/>
+          </a:xfrm>
+          <a:prstGeom prst="rect">
+            <a:avLst/>
+          </a:prstGeom>
+          <a:noFill/>
+        </p:spPr>
+        <p:txBody>
+          <a:bodyPr wrap="square" rtlCol="0">
+            <a:spAutoFit/>
+          </a:bodyPr>
+          <a:lstStyle/>
+          <a:p>
+            <a:pPr algn="ctr"/>
+            <a:r>
+              <a:rPr lang="en-US" sz="2000" dirty="0" smtClean="0">
+                <a:solidFill>
+                  <a:schemeClr val="bg1">
+                    <a:lumMod val="10000"/>
+                  </a:schemeClr>
+                </a:solidFill>
+              </a:rPr>
+              <a:t>•  VOO  •  MSFT  •  AAPL  •  BND  •  AMT  •</a:t>
+            </a:r>
+          </a:p>
+          <a:p>
+            <a:pPr algn="ctr"/>
+            <a:r>
+              <a:rPr lang="en-US" sz="2000" dirty="0" smtClean="0">
+                <a:solidFill>
+                  <a:schemeClr val="bg1">
+                    <a:lumMod val="10000"/>
+                  </a:schemeClr>
+                </a:solidFill>
+              </a:rPr>
+              <a:t>•  VUG  •  TSLA  •  AMZN  •  EDV  •  PLD  •</a:t>
+            </a:r>
+          </a:p>
+          <a:p>
+            <a:endParaRPr lang="en-US" sz="2000" dirty="0">
+              <a:solidFill>
+                <a:schemeClr val="bg1">
+                  <a:lumMod val="10000"/>
+                </a:schemeClr>
+              </a:solidFill>
+            </a:endParaRPr>
+          </a:p>
+        </p:txBody>
+      </p:sp>
+      <p:pic>
+        <p:nvPicPr>
+          <p:cNvPr id="62466" name="Picture 2" descr="mc_10_cum_return_dist_diversified.png"/>
+          <p:cNvPicPr>
+            <a:picLocks noChangeAspect="1" noChangeArrowheads="1"/>
+          </p:cNvPicPr>
+          <p:nvPr/>
+        </p:nvPicPr>
+        <p:blipFill>
+          <a:blip r:embed="rId3" cstate="print"/>
+          <a:srcRect/>
+          <a:stretch>
+            <a:fillRect/>
+          </a:stretch>
+        </p:blipFill>
+        <p:spPr bwMode="auto">
+          <a:xfrm>
+            <a:off x="1472184" y="1664208"/>
+            <a:ext cx="6200775" cy="3771900"/>
+          </a:xfrm>
+          <a:prstGeom prst="rect">
+            <a:avLst/>
+          </a:prstGeom>
+          <a:noFill/>
+        </p:spPr>
+      </p:pic>
+    </p:spTree>
+  </p:cSld>
+  <p:clrMapOvr>
+    <a:masterClrMapping/>
+  </p:clrMapOvr>
+  <p:transition>
+    <p:wipe dir="r"/>
+  </p:transition>
+  <p:timing>
+    <p:tnLst>
+      <p:par>
+        <p:cTn id="1" dur="indefinite" restart="never" nodeType="tmRoot"/>
+      </p:par>
+    </p:tnLst>
+  </p:timing>
+</p:sld>
+</file>
+
+<file path=ppt/slides/slide13.xml><?xml version="1.0" encoding="utf-8"?>
 <p:sld xmlns:a="http://schemas.openxmlformats.org/drawingml/2006/main" xmlns:r="http://schemas.openxmlformats.org/officeDocument/2006/relationships" xmlns:p="http://schemas.openxmlformats.org/presentationml/2006/main">
   <p:cSld>
     <p:spTree>
@@ -8540,456 +9133,6 @@
 </p:sld>
 </file>
 
-<file path=ppt/slides/slide11.xml><?xml version="1.0" encoding="utf-8"?>
-<p:sld xmlns:a="http://schemas.openxmlformats.org/drawingml/2006/main" xmlns:r="http://schemas.openxmlformats.org/officeDocument/2006/relationships" xmlns:p="http://schemas.openxmlformats.org/presentationml/2006/main">
-  <p:cSld>
-    <p:spTree>
-      <p:nvGrpSpPr>
-        <p:cNvPr id="1" name=""/>
-        <p:cNvGrpSpPr/>
-        <p:nvPr/>
-      </p:nvGrpSpPr>
-      <p:grpSpPr>
-        <a:xfrm>
-          <a:off x="0" y="0"/>
-          <a:ext cx="0" cy="0"/>
-          <a:chOff x="0" y="0"/>
-          <a:chExt cx="0" cy="0"/>
-        </a:xfrm>
-      </p:grpSpPr>
-      <p:sp>
-        <p:nvSpPr>
-          <p:cNvPr id="6" name="Title 5"/>
-          <p:cNvSpPr>
-            <a:spLocks noGrp="1"/>
-          </p:cNvSpPr>
-          <p:nvPr>
-            <p:ph type="title"/>
-          </p:nvPr>
-        </p:nvSpPr>
-        <p:spPr>
-          <a:xfrm>
-            <a:off x="359532" y="188640"/>
-            <a:ext cx="8110538" cy="792162"/>
-          </a:xfrm>
-        </p:spPr>
-        <p:txBody>
-          <a:bodyPr/>
-          <a:lstStyle/>
-          <a:p>
-            <a:pPr algn="ctr"/>
-            <a:r>
-              <a:rPr lang="en-US" sz="4200" b="1" dirty="0" smtClean="0">
-                <a:solidFill>
-                  <a:schemeClr val="bg1">
-                    <a:lumMod val="10000"/>
-                  </a:schemeClr>
-                </a:solidFill>
-              </a:rPr>
-              <a:t>TEST # 2</a:t>
-            </a:r>
-            <a:endParaRPr lang="en-US" sz="4200" b="1" dirty="0">
-              <a:solidFill>
-                <a:schemeClr val="bg1">
-                  <a:lumMod val="10000"/>
-                </a:schemeClr>
-              </a:solidFill>
-            </a:endParaRPr>
-          </a:p>
-        </p:txBody>
-      </p:sp>
-      <p:sp>
-        <p:nvSpPr>
-          <p:cNvPr id="7" name="Content Placeholder 6"/>
-          <p:cNvSpPr>
-            <a:spLocks noGrp="1"/>
-          </p:cNvSpPr>
-          <p:nvPr>
-            <p:ph idx="1"/>
-          </p:nvPr>
-        </p:nvSpPr>
-        <p:spPr>
-          <a:xfrm>
-            <a:off x="1835696" y="3176972"/>
-            <a:ext cx="4824536" cy="936104"/>
-          </a:xfrm>
-        </p:spPr>
-        <p:txBody>
-          <a:bodyPr/>
-          <a:lstStyle/>
-          <a:p>
-            <a:r>
-              <a:rPr lang="en-US" sz="2200" dirty="0" smtClean="0">
-                <a:solidFill>
-                  <a:schemeClr val="bg1">
-                    <a:lumMod val="10000"/>
-                  </a:schemeClr>
-                </a:solidFill>
-              </a:rPr>
-              <a:t>Average Annualized Returns</a:t>
-            </a:r>
-          </a:p>
-          <a:p>
-            <a:r>
-              <a:rPr lang="en-US" sz="2200" dirty="0" smtClean="0">
-                <a:solidFill>
-                  <a:schemeClr val="bg1">
-                    <a:lumMod val="10000"/>
-                  </a:schemeClr>
-                </a:solidFill>
-              </a:rPr>
-              <a:t>Cumulative Returns</a:t>
-            </a:r>
-            <a:endParaRPr lang="en-US" sz="2200" dirty="0">
-              <a:solidFill>
-                <a:schemeClr val="bg1">
-                  <a:lumMod val="10000"/>
-                </a:schemeClr>
-              </a:solidFill>
-            </a:endParaRPr>
-          </a:p>
-        </p:txBody>
-      </p:sp>
-      <p:sp>
-        <p:nvSpPr>
-          <p:cNvPr id="9" name="TextBox 8"/>
-          <p:cNvSpPr txBox="1"/>
-          <p:nvPr/>
-        </p:nvSpPr>
-        <p:spPr>
-          <a:xfrm>
-            <a:off x="1367644" y="2024844"/>
-            <a:ext cx="6768752" cy="677108"/>
-          </a:xfrm>
-          <a:prstGeom prst="rect">
-            <a:avLst/>
-          </a:prstGeom>
-          <a:noFill/>
-        </p:spPr>
-        <p:txBody>
-          <a:bodyPr wrap="square" rtlCol="0">
-            <a:spAutoFit/>
-          </a:bodyPr>
-          <a:lstStyle/>
-          <a:p>
-            <a:r>
-              <a:rPr lang="en-US" sz="3800" dirty="0" smtClean="0">
-                <a:solidFill>
-                  <a:schemeClr val="bg1">
-                    <a:lumMod val="10000"/>
-                  </a:schemeClr>
-                </a:solidFill>
-              </a:rPr>
-              <a:t>Historical Returns Comparison</a:t>
-            </a:r>
-            <a:endParaRPr lang="en-US" sz="3800" dirty="0">
-              <a:solidFill>
-                <a:schemeClr val="bg1">
-                  <a:lumMod val="10000"/>
-                </a:schemeClr>
-              </a:solidFill>
-            </a:endParaRPr>
-          </a:p>
-        </p:txBody>
-      </p:sp>
-    </p:spTree>
-  </p:cSld>
-  <p:clrMapOvr>
-    <a:masterClrMapping/>
-  </p:clrMapOvr>
-  <p:transition>
-    <p:wipe dir="r"/>
-  </p:transition>
-  <p:timing>
-    <p:tnLst>
-      <p:par>
-        <p:cTn id="1" dur="indefinite" restart="never" nodeType="tmRoot"/>
-      </p:par>
-    </p:tnLst>
-  </p:timing>
-</p:sld>
-</file>
-
-<file path=ppt/slides/slide12.xml><?xml version="1.0" encoding="utf-8"?>
-<p:sld xmlns:a="http://schemas.openxmlformats.org/drawingml/2006/main" xmlns:r="http://schemas.openxmlformats.org/officeDocument/2006/relationships" xmlns:p="http://schemas.openxmlformats.org/presentationml/2006/main">
-  <p:cSld>
-    <p:spTree>
-      <p:nvGrpSpPr>
-        <p:cNvPr id="1" name=""/>
-        <p:cNvGrpSpPr/>
-        <p:nvPr/>
-      </p:nvGrpSpPr>
-      <p:grpSpPr>
-        <a:xfrm>
-          <a:off x="0" y="0"/>
-          <a:ext cx="0" cy="0"/>
-          <a:chOff x="0" y="0"/>
-          <a:chExt cx="0" cy="0"/>
-        </a:xfrm>
-      </p:grpSpPr>
-      <p:sp>
-        <p:nvSpPr>
-          <p:cNvPr id="7170" name="Rectangle 2"/>
-          <p:cNvSpPr>
-            <a:spLocks noGrp="1" noChangeArrowheads="1"/>
-          </p:cNvSpPr>
-          <p:nvPr>
-            <p:ph type="title"/>
-          </p:nvPr>
-        </p:nvSpPr>
-        <p:spPr>
-          <a:xfrm>
-            <a:off x="0" y="0"/>
-            <a:ext cx="7020780" cy="764704"/>
-          </a:xfrm>
-        </p:spPr>
-        <p:txBody>
-          <a:bodyPr/>
-          <a:lstStyle/>
-          <a:p>
-            <a:pPr eaLnBrk="1" hangingPunct="1"/>
-            <a:r>
-              <a:rPr lang="en-US" altLang="en-US" sz="4200" b="1" dirty="0" smtClean="0">
-                <a:solidFill>
-                  <a:schemeClr val="bg1">
-                    <a:lumMod val="10000"/>
-                  </a:schemeClr>
-                </a:solidFill>
-              </a:rPr>
-              <a:t>ANNUALIZED RETURNS</a:t>
-            </a:r>
-          </a:p>
-        </p:txBody>
-      </p:sp>
-      <p:sp>
-        <p:nvSpPr>
-          <p:cNvPr id="11" name="TextBox 10"/>
-          <p:cNvSpPr txBox="1"/>
-          <p:nvPr/>
-        </p:nvSpPr>
-        <p:spPr>
-          <a:xfrm>
-            <a:off x="4319464" y="764704"/>
-            <a:ext cx="4824536" cy="738664"/>
-          </a:xfrm>
-          <a:prstGeom prst="rect">
-            <a:avLst/>
-          </a:prstGeom>
-          <a:noFill/>
-        </p:spPr>
-        <p:txBody>
-          <a:bodyPr wrap="square" rtlCol="0">
-            <a:spAutoFit/>
-          </a:bodyPr>
-          <a:lstStyle/>
-          <a:p>
-            <a:pPr algn="ctr"/>
-            <a:r>
-              <a:rPr lang="en-US" sz="2200" dirty="0" smtClean="0">
-                <a:solidFill>
-                  <a:schemeClr val="bg1">
-                    <a:lumMod val="10000"/>
-                  </a:schemeClr>
-                </a:solidFill>
-              </a:rPr>
-              <a:t>•  Comparison Across Portfolios  •</a:t>
-            </a:r>
-          </a:p>
-          <a:p>
-            <a:endParaRPr lang="en-US" sz="2000" dirty="0">
-              <a:solidFill>
-                <a:schemeClr val="bg1">
-                  <a:lumMod val="10000"/>
-                </a:schemeClr>
-              </a:solidFill>
-            </a:endParaRPr>
-          </a:p>
-        </p:txBody>
-      </p:sp>
-      <p:pic>
-        <p:nvPicPr>
-          <p:cNvPr id="64514" name="Picture 2" descr="historical_avg_annual_return_consolidated.png"/>
-          <p:cNvPicPr>
-            <a:picLocks noChangeAspect="1" noChangeArrowheads="1"/>
-          </p:cNvPicPr>
-          <p:nvPr/>
-        </p:nvPicPr>
-        <p:blipFill>
-          <a:blip r:embed="rId3" cstate="print"/>
-          <a:srcRect/>
-          <a:stretch>
-            <a:fillRect/>
-          </a:stretch>
-        </p:blipFill>
-        <p:spPr bwMode="auto">
-          <a:xfrm>
-            <a:off x="287524" y="1563624"/>
-            <a:ext cx="8579765" cy="5229982"/>
-          </a:xfrm>
-          <a:prstGeom prst="rect">
-            <a:avLst/>
-          </a:prstGeom>
-          <a:noFill/>
-        </p:spPr>
-      </p:pic>
-    </p:spTree>
-  </p:cSld>
-  <p:clrMapOvr>
-    <a:masterClrMapping/>
-  </p:clrMapOvr>
-  <p:transition>
-    <p:wipe dir="r"/>
-  </p:transition>
-  <p:timing>
-    <p:tnLst>
-      <p:par>
-        <p:cTn id="1" dur="indefinite" restart="never" nodeType="tmRoot"/>
-      </p:par>
-    </p:tnLst>
-  </p:timing>
-</p:sld>
-</file>
-
-<file path=ppt/slides/slide13.xml><?xml version="1.0" encoding="utf-8"?>
-<p:sld xmlns:a="http://schemas.openxmlformats.org/drawingml/2006/main" xmlns:r="http://schemas.openxmlformats.org/officeDocument/2006/relationships" xmlns:p="http://schemas.openxmlformats.org/presentationml/2006/main">
-  <p:cSld>
-    <p:spTree>
-      <p:nvGrpSpPr>
-        <p:cNvPr id="1" name=""/>
-        <p:cNvGrpSpPr/>
-        <p:nvPr/>
-      </p:nvGrpSpPr>
-      <p:grpSpPr>
-        <a:xfrm>
-          <a:off x="0" y="0"/>
-          <a:ext cx="0" cy="0"/>
-          <a:chOff x="0" y="0"/>
-          <a:chExt cx="0" cy="0"/>
-        </a:xfrm>
-      </p:grpSpPr>
-      <p:sp>
-        <p:nvSpPr>
-          <p:cNvPr id="7170" name="Rectangle 2"/>
-          <p:cNvSpPr>
-            <a:spLocks noGrp="1" noChangeArrowheads="1"/>
-          </p:cNvSpPr>
-          <p:nvPr>
-            <p:ph type="title"/>
-          </p:nvPr>
-        </p:nvSpPr>
-        <p:spPr>
-          <a:xfrm>
-            <a:off x="0" y="0"/>
-            <a:ext cx="7020780" cy="764704"/>
-          </a:xfrm>
-        </p:spPr>
-        <p:txBody>
-          <a:bodyPr/>
-          <a:lstStyle/>
-          <a:p>
-            <a:pPr eaLnBrk="1" hangingPunct="1"/>
-            <a:r>
-              <a:rPr lang="en-US" altLang="en-US" sz="4200" b="1" dirty="0" smtClean="0">
-                <a:solidFill>
-                  <a:schemeClr val="bg1">
-                    <a:lumMod val="10000"/>
-                  </a:schemeClr>
-                </a:solidFill>
-              </a:rPr>
-              <a:t>CUMULATIVE RETURNS</a:t>
-            </a:r>
-          </a:p>
-        </p:txBody>
-      </p:sp>
-      <p:sp>
-        <p:nvSpPr>
-          <p:cNvPr id="11" name="TextBox 10"/>
-          <p:cNvSpPr txBox="1"/>
-          <p:nvPr/>
-        </p:nvSpPr>
-        <p:spPr>
-          <a:xfrm>
-            <a:off x="4319464" y="764704"/>
-            <a:ext cx="4824536" cy="738664"/>
-          </a:xfrm>
-          <a:prstGeom prst="rect">
-            <a:avLst/>
-          </a:prstGeom>
-          <a:noFill/>
-        </p:spPr>
-        <p:txBody>
-          <a:bodyPr wrap="square" rtlCol="0">
-            <a:spAutoFit/>
-          </a:bodyPr>
-          <a:lstStyle/>
-          <a:p>
-            <a:pPr algn="ctr"/>
-            <a:r>
-              <a:rPr lang="en-US" sz="2200" dirty="0" smtClean="0">
-                <a:solidFill>
-                  <a:schemeClr val="bg1">
-                    <a:lumMod val="10000"/>
-                  </a:schemeClr>
-                </a:solidFill>
-              </a:rPr>
-              <a:t>•  Comparison Across Portfolios  •</a:t>
-            </a:r>
-          </a:p>
-          <a:p>
-            <a:endParaRPr lang="en-US" sz="2000" dirty="0">
-              <a:solidFill>
-                <a:schemeClr val="bg1">
-                  <a:lumMod val="10000"/>
-                </a:schemeClr>
-              </a:solidFill>
-            </a:endParaRPr>
-          </a:p>
-        </p:txBody>
-      </p:sp>
-      <p:pic>
-        <p:nvPicPr>
-          <p:cNvPr id="66562" name="Picture 2" descr="consolidated_cumulative_returns.png"/>
-          <p:cNvPicPr>
-            <a:picLocks noChangeAspect="1" noChangeArrowheads="1"/>
-          </p:cNvPicPr>
-          <p:nvPr/>
-        </p:nvPicPr>
-        <p:blipFill>
-          <a:blip r:embed="rId3" cstate="print"/>
-          <a:srcRect/>
-          <a:stretch>
-            <a:fillRect/>
-          </a:stretch>
-        </p:blipFill>
-        <p:spPr bwMode="auto">
-          <a:xfrm>
-            <a:off x="283464" y="1563624"/>
-            <a:ext cx="8577072" cy="4651390"/>
-          </a:xfrm>
-          <a:prstGeom prst="rect">
-            <a:avLst/>
-          </a:prstGeom>
-          <a:noFill/>
-        </p:spPr>
-      </p:pic>
-    </p:spTree>
-  </p:cSld>
-  <p:clrMapOvr>
-    <a:masterClrMapping/>
-  </p:clrMapOvr>
-  <p:transition>
-    <p:wipe dir="r"/>
-  </p:transition>
-  <p:timing>
-    <p:tnLst>
-      <p:par>
-        <p:cTn id="1" dur="indefinite" restart="never" nodeType="tmRoot"/>
-      </p:par>
-    </p:tnLst>
-  </p:timing>
-</p:sld>
-</file>
-
 <file path=ppt/slides/slide14.xml><?xml version="1.0" encoding="utf-8"?>
 <p:sld xmlns:a="http://schemas.openxmlformats.org/drawingml/2006/main" xmlns:r="http://schemas.openxmlformats.org/officeDocument/2006/relationships" xmlns:p="http://schemas.openxmlformats.org/presentationml/2006/main">
   <p:cSld>
@@ -9036,7 +9179,7 @@
                   </a:schemeClr>
                 </a:solidFill>
               </a:rPr>
-              <a:t>TEST # 3</a:t>
+              <a:t>What about Risk?</a:t>
             </a:r>
             <a:endParaRPr lang="en-US" sz="4200" b="1" dirty="0">
               <a:solidFill>
@@ -10644,7 +10787,7 @@
                   </a:schemeClr>
                 </a:solidFill>
               </a:rPr>
-              <a:t>TEST # 1</a:t>
+              <a:t>Historical Analysis</a:t>
             </a:r>
             <a:endParaRPr lang="en-US" sz="4200" b="1" dirty="0">
               <a:solidFill>
@@ -10668,7 +10811,7 @@
         </p:nvSpPr>
         <p:spPr>
           <a:xfrm>
-            <a:off x="1871700" y="3104964"/>
+            <a:off x="1871700" y="2060848"/>
             <a:ext cx="6408712" cy="2160240"/>
           </a:xfrm>
         </p:spPr>
@@ -10696,7 +10839,7 @@
                   </a:schemeClr>
                 </a:solidFill>
               </a:rPr>
-              <a:t>Historical data: Jan 1, 2018 – Nov 5, 2021</a:t>
+              <a:t>Cumulative Returns</a:t>
             </a:r>
           </a:p>
           <a:p>
@@ -10708,19 +10851,7 @@
                   </a:schemeClr>
                 </a:solidFill>
               </a:rPr>
-              <a:t>10 Year Forecast</a:t>
-            </a:r>
-          </a:p>
-          <a:p>
-            <a:r>
-              <a:rPr lang="en-US" sz="2200" dirty="0" smtClean="0">
-                <a:solidFill>
-                  <a:schemeClr val="bg1">
-                    <a:lumMod val="10000"/>
-                  </a:schemeClr>
-                </a:solidFill>
-              </a:rPr>
-              <a:t>1000 Simulation Analysis</a:t>
+              <a:t>Average Annual Returns</a:t>
             </a:r>
             <a:endParaRPr lang="en-US" sz="2200" dirty="0">
               <a:solidFill>
@@ -10734,14 +10865,14 @@
       </p:sp>
       <p:sp>
         <p:nvSpPr>
-          <p:cNvPr id="9" name="TextBox 8"/>
+          <p:cNvPr id="5" name="TextBox 4"/>
           <p:cNvSpPr txBox="1"/>
           <p:nvPr/>
         </p:nvSpPr>
         <p:spPr>
           <a:xfrm>
-            <a:off x="1835696" y="2024844"/>
-            <a:ext cx="5472608" cy="677108"/>
+            <a:off x="4526406" y="782297"/>
+            <a:ext cx="4824536" cy="738664"/>
           </a:xfrm>
           <a:prstGeom prst="rect">
             <a:avLst/>
@@ -10754,17 +10885,28 @@
           </a:bodyPr>
           <a:lstStyle/>
           <a:p>
-            <a:r>
-              <a:rPr lang="en-US" sz="3800" dirty="0" smtClean="0">
+            <a:pPr algn="ctr"/>
+            <a:r>
+              <a:rPr lang="en-US" sz="2200" dirty="0" smtClean="0">
                 <a:solidFill>
                   <a:schemeClr val="bg1">
                     <a:lumMod val="10000"/>
                   </a:schemeClr>
                 </a:solidFill>
               </a:rPr>
-              <a:t>Monte Carlo Simulations</a:t>
-            </a:r>
-            <a:endParaRPr lang="en-US" sz="3800" dirty="0">
+              <a:t>•  </a:t>
+            </a:r>
+            <a:r>
+              <a:rPr lang="en-US" sz="2200" dirty="0" smtClean="0">
+                <a:solidFill>
+                  <a:schemeClr val="bg1">
+                    <a:lumMod val="10000"/>
+                  </a:schemeClr>
+                </a:solidFill>
+              </a:rPr>
+              <a:t>Jan 1 2018 – Nov 5 2021•</a:t>
+            </a:r>
+            <a:endParaRPr lang="en-US" sz="2200" dirty="0" smtClean="0">
               <a:solidFill>
                 <a:schemeClr val="bg1">
                   <a:lumMod val="10000"/>
@@ -10772,9 +10914,23 @@
               </a:solidFill>
             </a:endParaRPr>
           </a:p>
+          <a:p>
+            <a:endParaRPr lang="en-US" sz="2000" dirty="0">
+              <a:solidFill>
+                <a:schemeClr val="bg1">
+                  <a:lumMod val="10000"/>
+                </a:schemeClr>
+              </a:solidFill>
+            </a:endParaRPr>
+          </a:p>
         </p:txBody>
       </p:sp>
     </p:spTree>
+    <p:extLst>
+      <p:ext uri="{BB962C8B-B14F-4D97-AF65-F5344CB8AC3E}">
+        <p14:creationId xmlns:p14="http://schemas.microsoft.com/office/powerpoint/2010/main" val="3204545569"/>
+      </p:ext>
+    </p:extLst>
   </p:cSld>
   <p:clrMapOvr>
     <a:masterClrMapping/>
@@ -10821,31 +10977,76 @@
         </p:nvSpPr>
         <p:spPr>
           <a:xfrm>
-            <a:off x="1115616" y="224644"/>
-            <a:ext cx="2880320" cy="764704"/>
+            <a:off x="0" y="0"/>
+            <a:ext cx="7020780" cy="764704"/>
           </a:xfrm>
         </p:spPr>
         <p:txBody>
           <a:bodyPr/>
           <a:lstStyle/>
           <a:p>
-            <a:pPr algn="ctr" eaLnBrk="1" hangingPunct="1"/>
-            <a:r>
-              <a:rPr lang="en-US" altLang="en-US" sz="4500" b="1" dirty="0" smtClean="0">
+            <a:pPr eaLnBrk="1" hangingPunct="1"/>
+            <a:r>
+              <a:rPr lang="en-US" altLang="en-US" sz="4200" b="1" dirty="0" smtClean="0">
                 <a:solidFill>
                   <a:schemeClr val="bg1">
                     <a:lumMod val="10000"/>
                   </a:schemeClr>
                 </a:solidFill>
               </a:rPr>
-              <a:t>BONDS</a:t>
-            </a:r>
+              <a:t>CUMULATIVE RETURNS</a:t>
+            </a:r>
+          </a:p>
+        </p:txBody>
+      </p:sp>
+      <p:sp>
+        <p:nvSpPr>
+          <p:cNvPr id="11" name="TextBox 10"/>
+          <p:cNvSpPr txBox="1"/>
+          <p:nvPr/>
+        </p:nvSpPr>
+        <p:spPr>
+          <a:xfrm>
+            <a:off x="4319464" y="764704"/>
+            <a:ext cx="4824536" cy="738664"/>
+          </a:xfrm>
+          <a:prstGeom prst="rect">
+            <a:avLst/>
+          </a:prstGeom>
+          <a:noFill/>
+        </p:spPr>
+        <p:txBody>
+          <a:bodyPr wrap="square" rtlCol="0">
+            <a:spAutoFit/>
+          </a:bodyPr>
+          <a:lstStyle/>
+          <a:p>
+            <a:pPr algn="ctr"/>
+            <a:r>
+              <a:rPr lang="en-US" sz="2200" dirty="0" smtClean="0">
+                <a:solidFill>
+                  <a:schemeClr val="bg1">
+                    <a:lumMod val="10000"/>
+                  </a:schemeClr>
+                </a:solidFill>
+              </a:rPr>
+              <a:t>•  Comparison Across Portfolios  •</a:t>
+            </a:r>
+          </a:p>
+          <a:p>
+            <a:endParaRPr lang="en-US" sz="2000" dirty="0">
+              <a:solidFill>
+                <a:schemeClr val="bg1">
+                  <a:lumMod val="10000"/>
+                </a:schemeClr>
+              </a:solidFill>
+            </a:endParaRPr>
           </a:p>
         </p:txBody>
       </p:sp>
       <p:pic>
         <p:nvPicPr>
-          <p:cNvPr id="19458" name="Picture 2" descr="mc_10_cum_return_dist_bonds.png"/>
+          <p:cNvPr id="66562" name="Picture 2" descr="consolidated_cumulative_returns.png"/>
           <p:cNvPicPr>
             <a:picLocks noChangeAspect="1" noChangeArrowheads="1"/>
           </p:cNvPicPr>
@@ -10860,8 +11061,8 @@
         </p:blipFill>
         <p:spPr bwMode="auto">
           <a:xfrm>
-            <a:off x="1475656" y="1664804"/>
-            <a:ext cx="6186488" cy="3771902"/>
+            <a:off x="283464" y="1563624"/>
+            <a:ext cx="8577072" cy="4651390"/>
           </a:xfrm>
           <a:prstGeom prst="rect">
             <a:avLst/>
@@ -10869,97 +11070,6 @@
           <a:noFill/>
         </p:spPr>
       </p:pic>
-      <p:sp>
-        <p:nvSpPr>
-          <p:cNvPr id="5" name="TextBox 4"/>
-          <p:cNvSpPr txBox="1"/>
-          <p:nvPr/>
-        </p:nvSpPr>
-        <p:spPr>
-          <a:xfrm>
-            <a:off x="3167844" y="5697252"/>
-            <a:ext cx="2844316" cy="923330"/>
-          </a:xfrm>
-          <a:prstGeom prst="rect">
-            <a:avLst/>
-          </a:prstGeom>
-          <a:noFill/>
-        </p:spPr>
-        <p:txBody>
-          <a:bodyPr wrap="square" rtlCol="0">
-            <a:spAutoFit/>
-          </a:bodyPr>
-          <a:lstStyle/>
-          <a:p>
-            <a:pPr algn="ctr"/>
-            <a:r>
-              <a:rPr lang="en-US" b="1" dirty="0" smtClean="0">
-                <a:solidFill>
-                  <a:schemeClr val="bg1">
-                    <a:lumMod val="10000"/>
-                  </a:schemeClr>
-                </a:solidFill>
-              </a:rPr>
-              <a:t>Monte Carlo Simulation </a:t>
-            </a:r>
-            <a:r>
-              <a:rPr lang="en-US" b="1" i="1" dirty="0" smtClean="0">
-                <a:solidFill>
-                  <a:schemeClr val="bg1">
-                    <a:lumMod val="10000"/>
-                  </a:schemeClr>
-                </a:solidFill>
-              </a:rPr>
-              <a:t>10 Years</a:t>
-            </a:r>
-          </a:p>
-          <a:p>
-            <a:endParaRPr lang="en-US" dirty="0"/>
-          </a:p>
-        </p:txBody>
-      </p:sp>
-      <p:sp>
-        <p:nvSpPr>
-          <p:cNvPr id="11" name="TextBox 10"/>
-          <p:cNvSpPr txBox="1"/>
-          <p:nvPr/>
-        </p:nvSpPr>
-        <p:spPr>
-          <a:xfrm>
-            <a:off x="3815916" y="656692"/>
-            <a:ext cx="5112568" cy="400110"/>
-          </a:xfrm>
-          <a:prstGeom prst="rect">
-            <a:avLst/>
-          </a:prstGeom>
-          <a:noFill/>
-        </p:spPr>
-        <p:txBody>
-          <a:bodyPr wrap="square" rtlCol="0">
-            <a:spAutoFit/>
-          </a:bodyPr>
-          <a:lstStyle/>
-          <a:p>
-            <a:r>
-              <a:rPr lang="en-US" sz="2000" dirty="0" smtClean="0">
-                <a:solidFill>
-                  <a:schemeClr val="bg1">
-                    <a:lumMod val="10000"/>
-                  </a:schemeClr>
-                </a:solidFill>
-              </a:rPr>
-              <a:t>•  BLV  •  BND  •  EDV  •  VCLT  •   VGLT  •</a:t>
-            </a:r>
-            <a:endParaRPr lang="en-US" sz="2000" dirty="0">
-              <a:solidFill>
-                <a:schemeClr val="bg1">
-                  <a:lumMod val="10000"/>
-                </a:schemeClr>
-              </a:solidFill>
-            </a:endParaRPr>
-          </a:p>
-        </p:txBody>
-      </p:sp>
     </p:spTree>
   </p:cSld>
   <p:clrMapOvr>
@@ -11007,38 +11117,38 @@
         </p:nvSpPr>
         <p:spPr>
           <a:xfrm>
-            <a:off x="1115616" y="224644"/>
-            <a:ext cx="2880320" cy="764704"/>
+            <a:off x="0" y="0"/>
+            <a:ext cx="7020780" cy="764704"/>
           </a:xfrm>
         </p:spPr>
         <p:txBody>
           <a:bodyPr/>
           <a:lstStyle/>
           <a:p>
-            <a:pPr algn="ctr" eaLnBrk="1" hangingPunct="1"/>
-            <a:r>
-              <a:rPr lang="en-US" altLang="en-US" sz="4500" b="1" dirty="0" smtClean="0">
+            <a:pPr eaLnBrk="1" hangingPunct="1"/>
+            <a:r>
+              <a:rPr lang="en-US" altLang="en-US" sz="4200" b="1" dirty="0" smtClean="0">
                 <a:solidFill>
                   <a:schemeClr val="bg1">
                     <a:lumMod val="10000"/>
                   </a:schemeClr>
                 </a:solidFill>
               </a:rPr>
-              <a:t>ETF</a:t>
-            </a:r>
-          </a:p>
-        </p:txBody>
-      </p:sp>
-      <p:sp>
-        <p:nvSpPr>
-          <p:cNvPr id="5" name="TextBox 4"/>
+              <a:t>ANNUALIZED RETURNS</a:t>
+            </a:r>
+          </a:p>
+        </p:txBody>
+      </p:sp>
+      <p:sp>
+        <p:nvSpPr>
+          <p:cNvPr id="11" name="TextBox 10"/>
           <p:cNvSpPr txBox="1"/>
           <p:nvPr/>
         </p:nvSpPr>
         <p:spPr>
           <a:xfrm>
-            <a:off x="3167844" y="5697252"/>
-            <a:ext cx="2844316" cy="923330"/>
+            <a:off x="4319464" y="764704"/>
+            <a:ext cx="4824536" cy="738664"/>
           </a:xfrm>
           <a:prstGeom prst="rect">
             <a:avLst/>
@@ -11053,63 +11163,17 @@
           <a:p>
             <a:pPr algn="ctr"/>
             <a:r>
-              <a:rPr lang="en-US" b="1" dirty="0" smtClean="0">
+              <a:rPr lang="en-US" sz="2200" dirty="0" smtClean="0">
                 <a:solidFill>
                   <a:schemeClr val="bg1">
                     <a:lumMod val="10000"/>
                   </a:schemeClr>
                 </a:solidFill>
               </a:rPr>
-              <a:t>Monte Carlo Simulation </a:t>
-            </a:r>
-            <a:r>
-              <a:rPr lang="en-US" b="1" i="1" dirty="0" smtClean="0">
-                <a:solidFill>
-                  <a:schemeClr val="bg1">
-                    <a:lumMod val="10000"/>
-                  </a:schemeClr>
-                </a:solidFill>
-              </a:rPr>
-              <a:t>10 Years</a:t>
-            </a:r>
-          </a:p>
-          <a:p>
-            <a:endParaRPr lang="en-US" dirty="0"/>
-          </a:p>
-        </p:txBody>
-      </p:sp>
-      <p:sp>
-        <p:nvSpPr>
-          <p:cNvPr id="11" name="TextBox 10"/>
-          <p:cNvSpPr txBox="1"/>
-          <p:nvPr/>
-        </p:nvSpPr>
-        <p:spPr>
-          <a:xfrm>
-            <a:off x="3815916" y="656692"/>
-            <a:ext cx="5112568" cy="400110"/>
-          </a:xfrm>
-          <a:prstGeom prst="rect">
-            <a:avLst/>
-          </a:prstGeom>
-          <a:noFill/>
-        </p:spPr>
-        <p:txBody>
-          <a:bodyPr wrap="square" rtlCol="0">
-            <a:spAutoFit/>
-          </a:bodyPr>
-          <a:lstStyle/>
-          <a:p>
-            <a:r>
-              <a:rPr lang="en-US" sz="2000" dirty="0" smtClean="0">
-                <a:solidFill>
-                  <a:schemeClr val="bg1">
-                    <a:lumMod val="10000"/>
-                  </a:schemeClr>
-                </a:solidFill>
-              </a:rPr>
-              <a:t>•  EEM  •  VOO  •  VTI  •  VTV  •  VUG  •</a:t>
-            </a:r>
+              <a:t>•  Comparison Across Portfolios  •</a:t>
+            </a:r>
+          </a:p>
+          <a:p>
             <a:endParaRPr lang="en-US" sz="2000" dirty="0">
               <a:solidFill>
                 <a:schemeClr val="bg1">
@@ -11122,7 +11186,7 @@
       </p:sp>
       <p:pic>
         <p:nvPicPr>
-          <p:cNvPr id="52226" name="Picture 2" descr="mc_10_cum_return_dist_etf.png"/>
+          <p:cNvPr id="64514" name="Picture 2" descr="historical_avg_annual_return_consolidated.png"/>
           <p:cNvPicPr>
             <a:picLocks noChangeAspect="1" noChangeArrowheads="1"/>
           </p:cNvPicPr>
@@ -11137,8 +11201,8 @@
         </p:blipFill>
         <p:spPr bwMode="auto">
           <a:xfrm>
-            <a:off x="1472184" y="1664208"/>
-            <a:ext cx="6200775" cy="3771900"/>
+            <a:off x="287524" y="1563624"/>
+            <a:ext cx="8579765" cy="5229982"/>
           </a:xfrm>
           <a:prstGeom prst="rect">
             <a:avLst/>
@@ -11183,120 +11247,31 @@
       </p:grpSpPr>
       <p:sp>
         <p:nvSpPr>
-          <p:cNvPr id="7170" name="Rectangle 2"/>
+          <p:cNvPr id="6" name="Title 5"/>
           <p:cNvSpPr>
-            <a:spLocks noGrp="1" noChangeArrowheads="1"/>
+            <a:spLocks noGrp="1"/>
           </p:cNvSpPr>
           <p:nvPr>
             <p:ph type="title"/>
           </p:nvPr>
         </p:nvSpPr>
-        <p:spPr>
-          <a:xfrm>
-            <a:off x="0" y="152636"/>
-            <a:ext cx="4211960" cy="764704"/>
-          </a:xfrm>
-        </p:spPr>
+        <p:spPr/>
         <p:txBody>
           <a:bodyPr/>
           <a:lstStyle/>
           <a:p>
-            <a:pPr algn="ctr" eaLnBrk="1" hangingPunct="1"/>
-            <a:r>
-              <a:rPr lang="en-US" altLang="en-US" sz="4500" b="1" dirty="0" smtClean="0">
+            <a:pPr algn="ctr"/>
+            <a:r>
+              <a:rPr lang="en-US" sz="4200" b="1" dirty="0" smtClean="0">
                 <a:solidFill>
                   <a:schemeClr val="bg1">
                     <a:lumMod val="10000"/>
                   </a:schemeClr>
                 </a:solidFill>
               </a:rPr>
-              <a:t>REAL ESTATE</a:t>
-            </a:r>
-          </a:p>
-        </p:txBody>
-      </p:sp>
-      <p:sp>
-        <p:nvSpPr>
-          <p:cNvPr id="5" name="TextBox 4"/>
-          <p:cNvSpPr txBox="1"/>
-          <p:nvPr/>
-        </p:nvSpPr>
-        <p:spPr>
-          <a:xfrm>
-            <a:off x="3167844" y="5697252"/>
-            <a:ext cx="2844316" cy="923330"/>
-          </a:xfrm>
-          <a:prstGeom prst="rect">
-            <a:avLst/>
-          </a:prstGeom>
-          <a:noFill/>
-        </p:spPr>
-        <p:txBody>
-          <a:bodyPr wrap="square" rtlCol="0">
-            <a:spAutoFit/>
-          </a:bodyPr>
-          <a:lstStyle/>
-          <a:p>
-            <a:pPr algn="ctr"/>
-            <a:r>
-              <a:rPr lang="en-US" b="1" dirty="0" smtClean="0">
-                <a:solidFill>
-                  <a:schemeClr val="bg1">
-                    <a:lumMod val="10000"/>
-                  </a:schemeClr>
-                </a:solidFill>
-              </a:rPr>
-              <a:t>Monte Carlo Simulation </a:t>
-            </a:r>
-            <a:r>
-              <a:rPr lang="en-US" b="1" i="1" dirty="0" smtClean="0">
-                <a:solidFill>
-                  <a:schemeClr val="bg1">
-                    <a:lumMod val="10000"/>
-                  </a:schemeClr>
-                </a:solidFill>
-              </a:rPr>
-              <a:t>10 Years</a:t>
-            </a:r>
-          </a:p>
-          <a:p>
-            <a:endParaRPr lang="en-US" dirty="0"/>
-          </a:p>
-        </p:txBody>
-      </p:sp>
-      <p:sp>
-        <p:nvSpPr>
-          <p:cNvPr id="11" name="TextBox 10"/>
-          <p:cNvSpPr txBox="1"/>
-          <p:nvPr/>
-        </p:nvSpPr>
-        <p:spPr>
-          <a:xfrm>
-            <a:off x="4247964" y="656692"/>
-            <a:ext cx="4716524" cy="400110"/>
-          </a:xfrm>
-          <a:prstGeom prst="rect">
-            <a:avLst/>
-          </a:prstGeom>
-          <a:noFill/>
-        </p:spPr>
-        <p:txBody>
-          <a:bodyPr wrap="square" rtlCol="0">
-            <a:spAutoFit/>
-          </a:bodyPr>
-          <a:lstStyle/>
-          <a:p>
-            <a:r>
-              <a:rPr lang="en-US" sz="2000" dirty="0" smtClean="0">
-                <a:solidFill>
-                  <a:schemeClr val="bg1">
-                    <a:lumMod val="10000"/>
-                  </a:schemeClr>
-                </a:solidFill>
-              </a:rPr>
-              <a:t>•  AMT  • PLD  • CCI  •  EQIX  •  PSA  •</a:t>
-            </a:r>
-            <a:endParaRPr lang="en-US" sz="2000" dirty="0">
+              <a:t>The Future</a:t>
+            </a:r>
+            <a:endParaRPr lang="en-US" sz="4200" b="1" dirty="0">
               <a:solidFill>
                 <a:schemeClr val="bg1">
                   <a:lumMod val="10000"/>
@@ -11306,32 +11281,132 @@
           </a:p>
         </p:txBody>
       </p:sp>
-      <p:pic>
-        <p:nvPicPr>
-          <p:cNvPr id="49154" name="Picture 2" descr="mc_10_cum_return_dist_real_estate.png"/>
-          <p:cNvPicPr>
-            <a:picLocks noChangeAspect="1" noChangeArrowheads="1"/>
-          </p:cNvPicPr>
+      <p:sp>
+        <p:nvSpPr>
+          <p:cNvPr id="7" name="Content Placeholder 6"/>
+          <p:cNvSpPr>
+            <a:spLocks noGrp="1"/>
+          </p:cNvSpPr>
+          <p:nvPr>
+            <p:ph idx="1"/>
+          </p:nvPr>
+        </p:nvSpPr>
+        <p:spPr>
+          <a:xfrm>
+            <a:off x="1871700" y="3104964"/>
+            <a:ext cx="6408712" cy="2160240"/>
+          </a:xfrm>
+        </p:spPr>
+        <p:txBody>
+          <a:bodyPr/>
+          <a:lstStyle/>
+          <a:p>
+            <a:r>
+              <a:rPr lang="en-US" sz="2200" dirty="0" smtClean="0">
+                <a:solidFill>
+                  <a:schemeClr val="bg1">
+                    <a:lumMod val="10000"/>
+                  </a:schemeClr>
+                </a:solidFill>
+              </a:rPr>
+              <a:t>Portfolios by Asset Class</a:t>
+            </a:r>
+          </a:p>
+          <a:p>
+            <a:r>
+              <a:rPr lang="en-US" sz="2200" dirty="0" smtClean="0">
+                <a:solidFill>
+                  <a:schemeClr val="bg1">
+                    <a:lumMod val="10000"/>
+                  </a:schemeClr>
+                </a:solidFill>
+              </a:rPr>
+              <a:t>10 </a:t>
+            </a:r>
+            <a:r>
+              <a:rPr lang="en-US" sz="2200" dirty="0" smtClean="0">
+                <a:solidFill>
+                  <a:schemeClr val="bg1">
+                    <a:lumMod val="10000"/>
+                  </a:schemeClr>
+                </a:solidFill>
+              </a:rPr>
+              <a:t>Year Forecast</a:t>
+            </a:r>
+          </a:p>
+          <a:p>
+            <a:r>
+              <a:rPr lang="en-US" sz="2200" dirty="0" smtClean="0">
+                <a:solidFill>
+                  <a:schemeClr val="bg1">
+                    <a:lumMod val="10000"/>
+                  </a:schemeClr>
+                </a:solidFill>
+              </a:rPr>
+              <a:t>1000 </a:t>
+            </a:r>
+            <a:r>
+              <a:rPr lang="en-US" sz="2200" dirty="0" smtClean="0">
+                <a:solidFill>
+                  <a:schemeClr val="bg1">
+                    <a:lumMod val="10000"/>
+                  </a:schemeClr>
+                </a:solidFill>
+              </a:rPr>
+              <a:t>Simulations</a:t>
+            </a:r>
+            <a:endParaRPr lang="en-US" sz="2200" dirty="0">
+              <a:solidFill>
+                <a:schemeClr val="bg1">
+                  <a:lumMod val="10000"/>
+                </a:schemeClr>
+              </a:solidFill>
+            </a:endParaRPr>
+          </a:p>
+        </p:txBody>
+      </p:sp>
+      <p:sp>
+        <p:nvSpPr>
+          <p:cNvPr id="9" name="TextBox 8"/>
+          <p:cNvSpPr txBox="1"/>
           <p:nvPr/>
-        </p:nvPicPr>
-        <p:blipFill>
-          <a:blip r:embed="rId3" cstate="print"/>
-          <a:srcRect/>
-          <a:stretch>
-            <a:fillRect/>
-          </a:stretch>
-        </p:blipFill>
-        <p:spPr bwMode="auto">
+        </p:nvSpPr>
+        <p:spPr>
           <a:xfrm>
-            <a:off x="1472184" y="1664208"/>
-            <a:ext cx="6200775" cy="3771900"/>
+            <a:off x="1835696" y="2024844"/>
+            <a:ext cx="5472608" cy="677108"/>
           </a:xfrm>
           <a:prstGeom prst="rect">
             <a:avLst/>
           </a:prstGeom>
           <a:noFill/>
         </p:spPr>
-      </p:pic>
+        <p:txBody>
+          <a:bodyPr wrap="square" rtlCol="0">
+            <a:spAutoFit/>
+          </a:bodyPr>
+          <a:lstStyle/>
+          <a:p>
+            <a:r>
+              <a:rPr lang="en-US" sz="3800" dirty="0" smtClean="0">
+                <a:solidFill>
+                  <a:schemeClr val="bg1">
+                    <a:lumMod val="10000"/>
+                  </a:schemeClr>
+                </a:solidFill>
+              </a:rPr>
+              <a:t>Monte Carlo Simulations</a:t>
+            </a:r>
+            <a:endParaRPr lang="en-US" sz="3800" dirty="0">
+              <a:solidFill>
+                <a:schemeClr val="bg1">
+                  <a:lumMod val="10000"/>
+                </a:schemeClr>
+              </a:solidFill>
+            </a:endParaRPr>
+          </a:p>
+        </p:txBody>
+      </p:sp>
     </p:spTree>
   </p:cSld>
   <p:clrMapOvr>
@@ -11379,7 +11454,7 @@
         </p:nvSpPr>
         <p:spPr>
           <a:xfrm>
-            <a:off x="971600" y="224644"/>
+            <a:off x="1115616" y="224644"/>
             <a:ext cx="2880320" cy="764704"/>
           </a:xfrm>
         </p:spPr>
@@ -11396,121 +11471,14 @@
                   </a:schemeClr>
                 </a:solidFill>
               </a:rPr>
-              <a:t>STOCKS</a:t>
-            </a:r>
-          </a:p>
-        </p:txBody>
-      </p:sp>
-      <p:sp>
-        <p:nvSpPr>
-          <p:cNvPr id="5" name="TextBox 4"/>
-          <p:cNvSpPr txBox="1"/>
-          <p:nvPr/>
-        </p:nvSpPr>
-        <p:spPr>
-          <a:xfrm>
-            <a:off x="3167844" y="5697252"/>
-            <a:ext cx="2844316" cy="923330"/>
-          </a:xfrm>
-          <a:prstGeom prst="rect">
-            <a:avLst/>
-          </a:prstGeom>
-          <a:noFill/>
-        </p:spPr>
-        <p:txBody>
-          <a:bodyPr wrap="square" rtlCol="0">
-            <a:spAutoFit/>
-          </a:bodyPr>
-          <a:lstStyle/>
-          <a:p>
-            <a:pPr algn="ctr"/>
-            <a:r>
-              <a:rPr lang="en-US" b="1" dirty="0" smtClean="0">
-                <a:solidFill>
-                  <a:schemeClr val="bg1">
-                    <a:lumMod val="10000"/>
-                  </a:schemeClr>
-                </a:solidFill>
-              </a:rPr>
-              <a:t>Monte Carlo Simulation </a:t>
-            </a:r>
-            <a:r>
-              <a:rPr lang="en-US" b="1" i="1" dirty="0" smtClean="0">
-                <a:solidFill>
-                  <a:schemeClr val="bg1">
-                    <a:lumMod val="10000"/>
-                  </a:schemeClr>
-                </a:solidFill>
-              </a:rPr>
-              <a:t>10 Years</a:t>
-            </a:r>
-          </a:p>
-          <a:p>
-            <a:endParaRPr lang="en-US" dirty="0"/>
-          </a:p>
-        </p:txBody>
-      </p:sp>
-      <p:sp>
-        <p:nvSpPr>
-          <p:cNvPr id="11" name="TextBox 10"/>
-          <p:cNvSpPr txBox="1"/>
-          <p:nvPr/>
-        </p:nvSpPr>
-        <p:spPr>
-          <a:xfrm>
-            <a:off x="3815916" y="440668"/>
-            <a:ext cx="5328084" cy="1015663"/>
-          </a:xfrm>
-          <a:prstGeom prst="rect">
-            <a:avLst/>
-          </a:prstGeom>
-          <a:noFill/>
-        </p:spPr>
-        <p:txBody>
-          <a:bodyPr wrap="square" rtlCol="0">
-            <a:spAutoFit/>
-          </a:bodyPr>
-          <a:lstStyle/>
-          <a:p>
-            <a:pPr algn="ctr"/>
-            <a:r>
-              <a:rPr lang="en-US" sz="2000" dirty="0" smtClean="0">
-                <a:solidFill>
-                  <a:schemeClr val="bg1">
-                    <a:lumMod val="10000"/>
-                  </a:schemeClr>
-                </a:solidFill>
-              </a:rPr>
-              <a:t>•  FB  •  AMZN  •  AAPL  •  XOM  •  JPM  •</a:t>
-            </a:r>
-          </a:p>
-          <a:p>
-            <a:pPr algn="ctr"/>
-            <a:r>
-              <a:rPr lang="en-US" sz="2000" dirty="0" smtClean="0">
-                <a:solidFill>
-                  <a:schemeClr val="bg1">
-                    <a:lumMod val="10000"/>
-                  </a:schemeClr>
-                </a:solidFill>
-              </a:rPr>
-              <a:t>•  JNJ  •  HON  •  LIN  •  AMT  •  PG  •  NEE •</a:t>
-            </a:r>
-          </a:p>
-          <a:p>
-            <a:endParaRPr lang="en-US" sz="2000" dirty="0">
-              <a:solidFill>
-                <a:schemeClr val="bg1">
-                  <a:lumMod val="10000"/>
-                </a:schemeClr>
-              </a:solidFill>
-            </a:endParaRPr>
+              <a:t>BONDS</a:t>
+            </a:r>
           </a:p>
         </p:txBody>
       </p:sp>
       <p:pic>
         <p:nvPicPr>
-          <p:cNvPr id="58370" name="Picture 2" descr="mc_10_cum_return_dist_stocks.png"/>
+          <p:cNvPr id="19458" name="Picture 2" descr="mc_10_cum_return_dist_bonds.png"/>
           <p:cNvPicPr>
             <a:picLocks noChangeAspect="1" noChangeArrowheads="1"/>
           </p:cNvPicPr>
@@ -11525,8 +11493,8 @@
         </p:blipFill>
         <p:spPr bwMode="auto">
           <a:xfrm>
-            <a:off x="1472184" y="1664208"/>
-            <a:ext cx="6200775" cy="3771900"/>
+            <a:off x="1475656" y="1664804"/>
+            <a:ext cx="6186488" cy="3771902"/>
           </a:xfrm>
           <a:prstGeom prst="rect">
             <a:avLst/>
@@ -11534,6 +11502,97 @@
           <a:noFill/>
         </p:spPr>
       </p:pic>
+      <p:sp>
+        <p:nvSpPr>
+          <p:cNvPr id="5" name="TextBox 4"/>
+          <p:cNvSpPr txBox="1"/>
+          <p:nvPr/>
+        </p:nvSpPr>
+        <p:spPr>
+          <a:xfrm>
+            <a:off x="3167844" y="5697252"/>
+            <a:ext cx="2844316" cy="923330"/>
+          </a:xfrm>
+          <a:prstGeom prst="rect">
+            <a:avLst/>
+          </a:prstGeom>
+          <a:noFill/>
+        </p:spPr>
+        <p:txBody>
+          <a:bodyPr wrap="square" rtlCol="0">
+            <a:spAutoFit/>
+          </a:bodyPr>
+          <a:lstStyle/>
+          <a:p>
+            <a:pPr algn="ctr"/>
+            <a:r>
+              <a:rPr lang="en-US" b="1" dirty="0" smtClean="0">
+                <a:solidFill>
+                  <a:schemeClr val="bg1">
+                    <a:lumMod val="10000"/>
+                  </a:schemeClr>
+                </a:solidFill>
+              </a:rPr>
+              <a:t>Monte Carlo Simulation </a:t>
+            </a:r>
+            <a:r>
+              <a:rPr lang="en-US" b="1" i="1" dirty="0" smtClean="0">
+                <a:solidFill>
+                  <a:schemeClr val="bg1">
+                    <a:lumMod val="10000"/>
+                  </a:schemeClr>
+                </a:solidFill>
+              </a:rPr>
+              <a:t>10 Years</a:t>
+            </a:r>
+          </a:p>
+          <a:p>
+            <a:endParaRPr lang="en-US" dirty="0"/>
+          </a:p>
+        </p:txBody>
+      </p:sp>
+      <p:sp>
+        <p:nvSpPr>
+          <p:cNvPr id="11" name="TextBox 10"/>
+          <p:cNvSpPr txBox="1"/>
+          <p:nvPr/>
+        </p:nvSpPr>
+        <p:spPr>
+          <a:xfrm>
+            <a:off x="3815916" y="656692"/>
+            <a:ext cx="5112568" cy="400110"/>
+          </a:xfrm>
+          <a:prstGeom prst="rect">
+            <a:avLst/>
+          </a:prstGeom>
+          <a:noFill/>
+        </p:spPr>
+        <p:txBody>
+          <a:bodyPr wrap="square" rtlCol="0">
+            <a:spAutoFit/>
+          </a:bodyPr>
+          <a:lstStyle/>
+          <a:p>
+            <a:r>
+              <a:rPr lang="en-US" sz="2000" dirty="0" smtClean="0">
+                <a:solidFill>
+                  <a:schemeClr val="bg1">
+                    <a:lumMod val="10000"/>
+                  </a:schemeClr>
+                </a:solidFill>
+              </a:rPr>
+              <a:t>•  BLV  •  BND  •  EDV  •  VCLT  •   VGLT  •</a:t>
+            </a:r>
+            <a:endParaRPr lang="en-US" sz="2000" dirty="0">
+              <a:solidFill>
+                <a:schemeClr val="bg1">
+                  <a:lumMod val="10000"/>
+                </a:schemeClr>
+              </a:solidFill>
+            </a:endParaRPr>
+          </a:p>
+        </p:txBody>
+      </p:sp>
     </p:spTree>
   </p:cSld>
   <p:clrMapOvr>
@@ -11598,7 +11657,7 @@
                   </a:schemeClr>
                 </a:solidFill>
               </a:rPr>
-              <a:t>CRYPTO</a:t>
+              <a:t>ETF</a:t>
             </a:r>
           </a:p>
         </p:txBody>
@@ -11682,7 +11741,7 @@
                   </a:schemeClr>
                 </a:solidFill>
               </a:rPr>
-              <a:t>•  BTC  •  ETH  •  BNB  •  DASH  •  LTC  •</a:t>
+              <a:t>•  EEM  •  VOO  •  VTI  •  VTV  •  VUG  •</a:t>
             </a:r>
             <a:endParaRPr lang="en-US" sz="2000" dirty="0">
               <a:solidFill>
@@ -11696,7 +11755,7 @@
       </p:sp>
       <p:pic>
         <p:nvPicPr>
-          <p:cNvPr id="60418" name="Picture 2" descr="mc_10_cum_return_dist_cryptocurrency.png"/>
+          <p:cNvPr id="52226" name="Picture 2" descr="mc_10_cum_return_dist_etf.png"/>
           <p:cNvPicPr>
             <a:picLocks noChangeAspect="1" noChangeArrowheads="1"/>
           </p:cNvPicPr>
@@ -11712,7 +11771,7 @@
         <p:spPr bwMode="auto">
           <a:xfrm>
             <a:off x="1472184" y="1664208"/>
-            <a:ext cx="6386513" cy="3771900"/>
+            <a:ext cx="6200775" cy="3771900"/>
           </a:xfrm>
           <a:prstGeom prst="rect">
             <a:avLst/>
@@ -11767,8 +11826,8 @@
         </p:nvSpPr>
         <p:spPr>
           <a:xfrm>
-            <a:off x="0" y="224644"/>
-            <a:ext cx="3959932" cy="764704"/>
+            <a:off x="0" y="152636"/>
+            <a:ext cx="4211960" cy="764704"/>
           </a:xfrm>
         </p:spPr>
         <p:txBody>
@@ -11784,7 +11843,7 @@
                   </a:schemeClr>
                 </a:solidFill>
               </a:rPr>
-              <a:t>DIVERSIFIED</a:t>
+              <a:t>REAL ESTATE</a:t>
             </a:r>
           </a:p>
         </p:txBody>
@@ -11846,8 +11905,8 @@
         </p:nvSpPr>
         <p:spPr>
           <a:xfrm>
-            <a:off x="3815916" y="440668"/>
-            <a:ext cx="5328084" cy="1015663"/>
+            <a:off x="4247964" y="656692"/>
+            <a:ext cx="4716524" cy="400110"/>
           </a:xfrm>
           <a:prstGeom prst="rect">
             <a:avLst/>
@@ -11860,7 +11919,6 @@
           </a:bodyPr>
           <a:lstStyle/>
           <a:p>
-            <a:pPr algn="ctr"/>
             <a:r>
               <a:rPr lang="en-US" sz="2000" dirty="0" smtClean="0">
                 <a:solidFill>
@@ -11869,23 +11927,8 @@
                   </a:schemeClr>
                 </a:solidFill>
               </a:rPr>
-              <a:t>•  VOO  •  MSFT  •  AAPL  •  BND  •  AMT  •</a:t>
-            </a:r>
-          </a:p>
-          <a:p>
-            <a:pPr algn="ctr"/>
-            <a:r>
-              <a:rPr lang="en-US" sz="2000" dirty="0" smtClean="0">
-                <a:solidFill>
-                  <a:schemeClr val="bg1">
-                    <a:lumMod val="10000"/>
-                  </a:schemeClr>
-                </a:solidFill>
-              </a:rPr>
-              <a:t>•  VUG  •  TSLA  •  AMZN  •  EDV  •  PLD  •</a:t>
-            </a:r>
-          </a:p>
-          <a:p>
+              <a:t>•  AMT  • PLD  • CCI  •  EQIX  •  PSA  •</a:t>
+            </a:r>
             <a:endParaRPr lang="en-US" sz="2000" dirty="0">
               <a:solidFill>
                 <a:schemeClr val="bg1">
@@ -11898,7 +11941,7 @@
       </p:sp>
       <p:pic>
         <p:nvPicPr>
-          <p:cNvPr id="62466" name="Picture 2" descr="mc_10_cum_return_dist_diversified.png"/>
+          <p:cNvPr id="49154" name="Picture 2" descr="mc_10_cum_return_dist_real_estate.png"/>
           <p:cNvPicPr>
             <a:picLocks noChangeAspect="1" noChangeArrowheads="1"/>
           </p:cNvPicPr>
@@ -12382,7 +12425,7 @@
   </a:extraClrSchemeLst>
   <a:extLst>
     <a:ext uri="{05A4C25C-085E-4340-85A3-A5531E510DB2}">
-      <thm15:themeFamily xmlns="" xmlns:thm15="http://schemas.microsoft.com/office/thememl/2012/main" name="Office Theme" id="{62F939B6-93AF-4DB8-9C6B-D6C7DFDC589F}" vid="{4A3C46E8-61CC-4603-A589-7422A47A8E4A}"/>
+      <thm15:themeFamily xmlns:thm15="http://schemas.microsoft.com/office/thememl/2012/main" name="Office Theme" id="{62F939B6-93AF-4DB8-9C6B-D6C7DFDC589F}" vid="{4A3C46E8-61CC-4603-A589-7422A47A8E4A}"/>
     </a:ext>
   </a:extLst>
 </a:theme>
@@ -12643,7 +12686,7 @@
   <a:extraClrSchemeLst/>
   <a:extLst>
     <a:ext uri="{05A4C25C-085E-4340-85A3-A5531E510DB2}">
-      <thm15:themeFamily xmlns="" xmlns:thm15="http://schemas.microsoft.com/office/thememl/2012/main" name="Office Theme" id="{62F939B6-93AF-4DB8-9C6B-D6C7DFDC589F}" vid="{4A3C46E8-61CC-4603-A589-7422A47A8E4A}"/>
+      <thm15:themeFamily xmlns:thm15="http://schemas.microsoft.com/office/thememl/2012/main" name="Office Theme" id="{62F939B6-93AF-4DB8-9C6B-D6C7DFDC589F}" vid="{4A3C46E8-61CC-4603-A589-7422A47A8E4A}"/>
     </a:ext>
   </a:extLst>
 </a:theme>
@@ -12904,7 +12947,7 @@
   <a:extraClrSchemeLst/>
   <a:extLst>
     <a:ext uri="{05A4C25C-085E-4340-85A3-A5531E510DB2}">
-      <thm15:themeFamily xmlns="" xmlns:thm15="http://schemas.microsoft.com/office/thememl/2012/main" name="Office Theme" id="{62F939B6-93AF-4DB8-9C6B-D6C7DFDC589F}" vid="{4A3C46E8-61CC-4603-A589-7422A47A8E4A}"/>
+      <thm15:themeFamily xmlns:thm15="http://schemas.microsoft.com/office/thememl/2012/main" name="Office Theme" id="{62F939B6-93AF-4DB8-9C6B-D6C7DFDC589F}" vid="{4A3C46E8-61CC-4603-A589-7422A47A8E4A}"/>
     </a:ext>
   </a:extLst>
 </a:theme>

</xml_diff>

<commit_message>
Format slides and add conclusion slide
</commit_message>
<xml_diff>
--- a/presentation/P1- Challening the Status Quo.pptx
+++ b/presentation/P1- Challening the Status Quo.pptx
@@ -5,27 +5,28 @@
     <p:sldMasterId id="2147483648" r:id="rId1"/>
   </p:sldMasterIdLst>
   <p:notesMasterIdLst>
-    <p:notesMasterId r:id="rId17"/>
+    <p:notesMasterId r:id="rId18"/>
   </p:notesMasterIdLst>
   <p:handoutMasterIdLst>
-    <p:handoutMasterId r:id="rId18"/>
+    <p:handoutMasterId r:id="rId19"/>
   </p:handoutMasterIdLst>
   <p:sldIdLst>
     <p:sldId id="262" r:id="rId2"/>
     <p:sldId id="280" r:id="rId3"/>
-    <p:sldId id="281" r:id="rId4"/>
-    <p:sldId id="263" r:id="rId5"/>
-    <p:sldId id="272" r:id="rId6"/>
-    <p:sldId id="273" r:id="rId7"/>
-    <p:sldId id="274" r:id="rId8"/>
-    <p:sldId id="275" r:id="rId9"/>
-    <p:sldId id="276" r:id="rId10"/>
-    <p:sldId id="282" r:id="rId11"/>
-    <p:sldId id="284" r:id="rId12"/>
-    <p:sldId id="277" r:id="rId13"/>
-    <p:sldId id="278" r:id="rId14"/>
+    <p:sldId id="285" r:id="rId4"/>
+    <p:sldId id="278" r:id="rId5"/>
+    <p:sldId id="277" r:id="rId6"/>
+    <p:sldId id="281" r:id="rId7"/>
+    <p:sldId id="263" r:id="rId8"/>
+    <p:sldId id="272" r:id="rId9"/>
+    <p:sldId id="273" r:id="rId10"/>
+    <p:sldId id="274" r:id="rId11"/>
+    <p:sldId id="275" r:id="rId12"/>
+    <p:sldId id="276" r:id="rId13"/>
+    <p:sldId id="282" r:id="rId14"/>
     <p:sldId id="283" r:id="rId15"/>
     <p:sldId id="279" r:id="rId16"/>
+    <p:sldId id="286" r:id="rId17"/>
   </p:sldIdLst>
   <p:sldSz cx="9144000" cy="6858000" type="screen4x3"/>
   <p:notesSz cx="6858000" cy="9144000"/>
@@ -156,7 +157,7 @@
   </p:defaultTextStyle>
   <p:extLst>
     <p:ext uri="{EFAFB233-063F-42B5-8137-9DF3F51BA10A}">
-      <p15:sldGuideLst xmlns="" xmlns:p15="http://schemas.microsoft.com/office/powerpoint/2012/main">
+      <p15:sldGuideLst xmlns:p15="http://schemas.microsoft.com/office/powerpoint/2012/main" xmlns="">
         <p15:guide id="1" orient="horz" pos="2160">
           <p15:clr>
             <a:srgbClr val="A4A3A4"/>
@@ -168,6 +169,9 @@
           </p15:clr>
         </p15:guide>
       </p15:sldGuideLst>
+    </p:ext>
+    <p:ext uri="{2D200454-40CA-4A62-9FC3-DE9A4176ACB9}">
+      <p15:notesGuideLst xmlns:p15="http://schemas.microsoft.com/office/powerpoint/2012/main" xmlns=""/>
     </p:ext>
   </p:extLst>
 </p:presentation>
@@ -223,14 +227,14 @@
           <a:effectLst/>
           <a:extLst>
             <a:ext uri="{909E8E84-426E-40DD-AFC4-6F175D3DCCD1}">
-              <a14:hiddenFill xmlns="" xmlns:a14="http://schemas.microsoft.com/office/drawing/2010/main">
+              <a14:hiddenFill xmlns:a14="http://schemas.microsoft.com/office/drawing/2010/main" xmlns="">
                 <a:solidFill>
                   <a:schemeClr val="accent1"/>
                 </a:solidFill>
               </a14:hiddenFill>
             </a:ext>
             <a:ext uri="{91240B29-F687-4F45-9708-019B960494DF}">
-              <a14:hiddenLine xmlns="" xmlns:a14="http://schemas.microsoft.com/office/drawing/2010/main" w="9525">
+              <a14:hiddenLine xmlns:a14="http://schemas.microsoft.com/office/drawing/2010/main" xmlns="" w="9525">
                 <a:solidFill>
                   <a:schemeClr val="tx1"/>
                 </a:solidFill>
@@ -240,7 +244,7 @@
               </a14:hiddenLine>
             </a:ext>
             <a:ext uri="{AF507438-7753-43E0-B8FC-AC1667EBCBE1}">
-              <a14:hiddenEffects xmlns="" xmlns:a14="http://schemas.microsoft.com/office/drawing/2010/main">
+              <a14:hiddenEffects xmlns:a14="http://schemas.microsoft.com/office/drawing/2010/main" xmlns="">
                 <a:effectLst>
                   <a:outerShdw dist="35921" dir="2700000" algn="ctr" rotWithShape="0">
                     <a:schemeClr val="bg2"/>
@@ -294,14 +298,14 @@
           <a:effectLst/>
           <a:extLst>
             <a:ext uri="{909E8E84-426E-40DD-AFC4-6F175D3DCCD1}">
-              <a14:hiddenFill xmlns="" xmlns:a14="http://schemas.microsoft.com/office/drawing/2010/main">
+              <a14:hiddenFill xmlns:a14="http://schemas.microsoft.com/office/drawing/2010/main" xmlns="">
                 <a:solidFill>
                   <a:schemeClr val="accent1"/>
                 </a:solidFill>
               </a14:hiddenFill>
             </a:ext>
             <a:ext uri="{91240B29-F687-4F45-9708-019B960494DF}">
-              <a14:hiddenLine xmlns="" xmlns:a14="http://schemas.microsoft.com/office/drawing/2010/main" w="9525">
+              <a14:hiddenLine xmlns:a14="http://schemas.microsoft.com/office/drawing/2010/main" xmlns="" w="9525">
                 <a:solidFill>
                   <a:schemeClr val="tx1"/>
                 </a:solidFill>
@@ -311,7 +315,7 @@
               </a14:hiddenLine>
             </a:ext>
             <a:ext uri="{AF507438-7753-43E0-B8FC-AC1667EBCBE1}">
-              <a14:hiddenEffects xmlns="" xmlns:a14="http://schemas.microsoft.com/office/drawing/2010/main">
+              <a14:hiddenEffects xmlns:a14="http://schemas.microsoft.com/office/drawing/2010/main" xmlns="">
                 <a:effectLst>
                   <a:outerShdw dist="35921" dir="2700000" algn="ctr" rotWithShape="0">
                     <a:schemeClr val="bg2"/>
@@ -365,14 +369,14 @@
           <a:effectLst/>
           <a:extLst>
             <a:ext uri="{909E8E84-426E-40DD-AFC4-6F175D3DCCD1}">
-              <a14:hiddenFill xmlns="" xmlns:a14="http://schemas.microsoft.com/office/drawing/2010/main">
+              <a14:hiddenFill xmlns:a14="http://schemas.microsoft.com/office/drawing/2010/main" xmlns="">
                 <a:solidFill>
                   <a:schemeClr val="accent1"/>
                 </a:solidFill>
               </a14:hiddenFill>
             </a:ext>
             <a:ext uri="{91240B29-F687-4F45-9708-019B960494DF}">
-              <a14:hiddenLine xmlns="" xmlns:a14="http://schemas.microsoft.com/office/drawing/2010/main" w="9525">
+              <a14:hiddenLine xmlns:a14="http://schemas.microsoft.com/office/drawing/2010/main" xmlns="" w="9525">
                 <a:solidFill>
                   <a:schemeClr val="tx1"/>
                 </a:solidFill>
@@ -382,7 +386,7 @@
               </a14:hiddenLine>
             </a:ext>
             <a:ext uri="{AF507438-7753-43E0-B8FC-AC1667EBCBE1}">
-              <a14:hiddenEffects xmlns="" xmlns:a14="http://schemas.microsoft.com/office/drawing/2010/main">
+              <a14:hiddenEffects xmlns:a14="http://schemas.microsoft.com/office/drawing/2010/main" xmlns="">
                 <a:effectLst>
                   <a:outerShdw dist="35921" dir="2700000" algn="ctr" rotWithShape="0">
                     <a:schemeClr val="bg2"/>
@@ -436,14 +440,14 @@
           <a:effectLst/>
           <a:extLst>
             <a:ext uri="{909E8E84-426E-40DD-AFC4-6F175D3DCCD1}">
-              <a14:hiddenFill xmlns="" xmlns:a14="http://schemas.microsoft.com/office/drawing/2010/main">
+              <a14:hiddenFill xmlns:a14="http://schemas.microsoft.com/office/drawing/2010/main" xmlns="">
                 <a:solidFill>
                   <a:schemeClr val="accent1"/>
                 </a:solidFill>
               </a14:hiddenFill>
             </a:ext>
             <a:ext uri="{91240B29-F687-4F45-9708-019B960494DF}">
-              <a14:hiddenLine xmlns="" xmlns:a14="http://schemas.microsoft.com/office/drawing/2010/main" w="9525">
+              <a14:hiddenLine xmlns:a14="http://schemas.microsoft.com/office/drawing/2010/main" xmlns="" w="9525">
                 <a:solidFill>
                   <a:schemeClr val="tx1"/>
                 </a:solidFill>
@@ -453,7 +457,7 @@
               </a14:hiddenLine>
             </a:ext>
             <a:ext uri="{AF507438-7753-43E0-B8FC-AC1667EBCBE1}">
-              <a14:hiddenEffects xmlns="" xmlns:a14="http://schemas.microsoft.com/office/drawing/2010/main">
+              <a14:hiddenEffects xmlns:a14="http://schemas.microsoft.com/office/drawing/2010/main" xmlns="">
                 <a:effectLst>
                   <a:outerShdw dist="35921" dir="2700000" algn="ctr" rotWithShape="0">
                     <a:schemeClr val="bg2"/>
@@ -492,7 +496,7 @@
     </p:spTree>
     <p:extLst>
       <p:ext uri="{BB962C8B-B14F-4D97-AF65-F5344CB8AC3E}">
-        <p14:creationId xmlns="" xmlns:p14="http://schemas.microsoft.com/office/powerpoint/2010/main" val="1079346047"/>
+        <p14:creationId xmlns:p14="http://schemas.microsoft.com/office/powerpoint/2010/main" xmlns="" val="1079346047"/>
       </p:ext>
     </p:extLst>
   </p:cSld>
@@ -550,14 +554,14 @@
           <a:effectLst/>
           <a:extLst>
             <a:ext uri="{909E8E84-426E-40DD-AFC4-6F175D3DCCD1}">
-              <a14:hiddenFill xmlns="" xmlns:a14="http://schemas.microsoft.com/office/drawing/2010/main">
+              <a14:hiddenFill xmlns:a14="http://schemas.microsoft.com/office/drawing/2010/main" xmlns="">
                 <a:solidFill>
                   <a:schemeClr val="accent1"/>
                 </a:solidFill>
               </a14:hiddenFill>
             </a:ext>
             <a:ext uri="{91240B29-F687-4F45-9708-019B960494DF}">
-              <a14:hiddenLine xmlns="" xmlns:a14="http://schemas.microsoft.com/office/drawing/2010/main" w="9525">
+              <a14:hiddenLine xmlns:a14="http://schemas.microsoft.com/office/drawing/2010/main" xmlns="" w="9525">
                 <a:solidFill>
                   <a:schemeClr val="tx1"/>
                 </a:solidFill>
@@ -567,7 +571,7 @@
               </a14:hiddenLine>
             </a:ext>
             <a:ext uri="{AF507438-7753-43E0-B8FC-AC1667EBCBE1}">
-              <a14:hiddenEffects xmlns="" xmlns:a14="http://schemas.microsoft.com/office/drawing/2010/main">
+              <a14:hiddenEffects xmlns:a14="http://schemas.microsoft.com/office/drawing/2010/main" xmlns="">
                 <a:effectLst>
                   <a:outerShdw dist="35921" dir="2700000" algn="ctr" rotWithShape="0">
                     <a:schemeClr val="bg2"/>
@@ -621,14 +625,14 @@
           <a:effectLst/>
           <a:extLst>
             <a:ext uri="{909E8E84-426E-40DD-AFC4-6F175D3DCCD1}">
-              <a14:hiddenFill xmlns="" xmlns:a14="http://schemas.microsoft.com/office/drawing/2010/main">
+              <a14:hiddenFill xmlns:a14="http://schemas.microsoft.com/office/drawing/2010/main" xmlns="">
                 <a:solidFill>
                   <a:schemeClr val="accent1"/>
                 </a:solidFill>
               </a14:hiddenFill>
             </a:ext>
             <a:ext uri="{91240B29-F687-4F45-9708-019B960494DF}">
-              <a14:hiddenLine xmlns="" xmlns:a14="http://schemas.microsoft.com/office/drawing/2010/main" w="9525">
+              <a14:hiddenLine xmlns:a14="http://schemas.microsoft.com/office/drawing/2010/main" xmlns="" w="9525">
                 <a:solidFill>
                   <a:schemeClr val="tx1"/>
                 </a:solidFill>
@@ -638,7 +642,7 @@
               </a14:hiddenLine>
             </a:ext>
             <a:ext uri="{AF507438-7753-43E0-B8FC-AC1667EBCBE1}">
-              <a14:hiddenEffects xmlns="" xmlns:a14="http://schemas.microsoft.com/office/drawing/2010/main">
+              <a14:hiddenEffects xmlns:a14="http://schemas.microsoft.com/office/drawing/2010/main" xmlns="">
                 <a:effectLst>
                   <a:outerShdw dist="35921" dir="2700000" algn="ctr" rotWithShape="0">
                     <a:schemeClr val="bg2"/>
@@ -697,14 +701,14 @@
           <a:effectLst/>
           <a:extLst>
             <a:ext uri="{909E8E84-426E-40DD-AFC4-6F175D3DCCD1}">
-              <a14:hiddenFill xmlns="" xmlns:a14="http://schemas.microsoft.com/office/drawing/2010/main">
+              <a14:hiddenFill xmlns:a14="http://schemas.microsoft.com/office/drawing/2010/main" xmlns="">
                 <a:solidFill>
                   <a:srgbClr val="FFFFFF"/>
                 </a:solidFill>
               </a14:hiddenFill>
             </a:ext>
             <a:ext uri="{AF507438-7753-43E0-B8FC-AC1667EBCBE1}">
-              <a14:hiddenEffects xmlns="" xmlns:a14="http://schemas.microsoft.com/office/drawing/2010/main">
+              <a14:hiddenEffects xmlns:a14="http://schemas.microsoft.com/office/drawing/2010/main" xmlns="">
                 <a:effectLst>
                   <a:outerShdw dist="35921" dir="2700000" algn="ctr" rotWithShape="0">
                     <a:srgbClr val="808080"/>
@@ -713,7 +717,7 @@
               </a14:hiddenEffects>
             </a:ext>
             <a:ext uri="{53640926-AAD7-44D8-BBD7-CCE9431645EC}">
-              <a14:shadowObscured xmlns="" xmlns:a14="http://schemas.microsoft.com/office/drawing/2010/main" val="1"/>
+              <a14:shadowObscured xmlns:a14="http://schemas.microsoft.com/office/drawing/2010/main" xmlns="" val="1"/>
             </a:ext>
           </a:extLst>
         </p:spPr>
@@ -743,14 +747,14 @@
           <a:effectLst/>
           <a:extLst>
             <a:ext uri="{909E8E84-426E-40DD-AFC4-6F175D3DCCD1}">
-              <a14:hiddenFill xmlns="" xmlns:a14="http://schemas.microsoft.com/office/drawing/2010/main">
+              <a14:hiddenFill xmlns:a14="http://schemas.microsoft.com/office/drawing/2010/main" xmlns="">
                 <a:solidFill>
                   <a:schemeClr val="accent1"/>
                 </a:solidFill>
               </a14:hiddenFill>
             </a:ext>
             <a:ext uri="{91240B29-F687-4F45-9708-019B960494DF}">
-              <a14:hiddenLine xmlns="" xmlns:a14="http://schemas.microsoft.com/office/drawing/2010/main" w="9525">
+              <a14:hiddenLine xmlns:a14="http://schemas.microsoft.com/office/drawing/2010/main" xmlns="" w="9525">
                 <a:solidFill>
                   <a:schemeClr val="tx1"/>
                 </a:solidFill>
@@ -760,7 +764,7 @@
               </a14:hiddenLine>
             </a:ext>
             <a:ext uri="{AF507438-7753-43E0-B8FC-AC1667EBCBE1}">
-              <a14:hiddenEffects xmlns="" xmlns:a14="http://schemas.microsoft.com/office/drawing/2010/main">
+              <a14:hiddenEffects xmlns:a14="http://schemas.microsoft.com/office/drawing/2010/main" xmlns="">
                 <a:effectLst>
                   <a:outerShdw dist="35921" dir="2700000" algn="ctr" rotWithShape="0">
                     <a:schemeClr val="bg2"/>
@@ -839,14 +843,14 @@
           <a:effectLst/>
           <a:extLst>
             <a:ext uri="{909E8E84-426E-40DD-AFC4-6F175D3DCCD1}">
-              <a14:hiddenFill xmlns="" xmlns:a14="http://schemas.microsoft.com/office/drawing/2010/main">
+              <a14:hiddenFill xmlns:a14="http://schemas.microsoft.com/office/drawing/2010/main" xmlns="">
                 <a:solidFill>
                   <a:schemeClr val="accent1"/>
                 </a:solidFill>
               </a14:hiddenFill>
             </a:ext>
             <a:ext uri="{91240B29-F687-4F45-9708-019B960494DF}">
-              <a14:hiddenLine xmlns="" xmlns:a14="http://schemas.microsoft.com/office/drawing/2010/main" w="9525">
+              <a14:hiddenLine xmlns:a14="http://schemas.microsoft.com/office/drawing/2010/main" xmlns="" w="9525">
                 <a:solidFill>
                   <a:schemeClr val="tx1"/>
                 </a:solidFill>
@@ -856,7 +860,7 @@
               </a14:hiddenLine>
             </a:ext>
             <a:ext uri="{AF507438-7753-43E0-B8FC-AC1667EBCBE1}">
-              <a14:hiddenEffects xmlns="" xmlns:a14="http://schemas.microsoft.com/office/drawing/2010/main">
+              <a14:hiddenEffects xmlns:a14="http://schemas.microsoft.com/office/drawing/2010/main" xmlns="">
                 <a:effectLst>
                   <a:outerShdw dist="35921" dir="2700000" algn="ctr" rotWithShape="0">
                     <a:schemeClr val="bg2"/>
@@ -910,14 +914,14 @@
           <a:effectLst/>
           <a:extLst>
             <a:ext uri="{909E8E84-426E-40DD-AFC4-6F175D3DCCD1}">
-              <a14:hiddenFill xmlns="" xmlns:a14="http://schemas.microsoft.com/office/drawing/2010/main">
+              <a14:hiddenFill xmlns:a14="http://schemas.microsoft.com/office/drawing/2010/main" xmlns="">
                 <a:solidFill>
                   <a:schemeClr val="accent1"/>
                 </a:solidFill>
               </a14:hiddenFill>
             </a:ext>
             <a:ext uri="{91240B29-F687-4F45-9708-019B960494DF}">
-              <a14:hiddenLine xmlns="" xmlns:a14="http://schemas.microsoft.com/office/drawing/2010/main" w="9525">
+              <a14:hiddenLine xmlns:a14="http://schemas.microsoft.com/office/drawing/2010/main" xmlns="" w="9525">
                 <a:solidFill>
                   <a:schemeClr val="tx1"/>
                 </a:solidFill>
@@ -927,7 +931,7 @@
               </a14:hiddenLine>
             </a:ext>
             <a:ext uri="{AF507438-7753-43E0-B8FC-AC1667EBCBE1}">
-              <a14:hiddenEffects xmlns="" xmlns:a14="http://schemas.microsoft.com/office/drawing/2010/main">
+              <a14:hiddenEffects xmlns:a14="http://schemas.microsoft.com/office/drawing/2010/main" xmlns="">
                 <a:effectLst>
                   <a:outerShdw dist="35921" dir="2700000" algn="ctr" rotWithShape="0">
                     <a:schemeClr val="bg2"/>
@@ -966,7 +970,7 @@
     </p:spTree>
     <p:extLst>
       <p:ext uri="{BB962C8B-B14F-4D97-AF65-F5344CB8AC3E}">
-        <p14:creationId xmlns="" xmlns:p14="http://schemas.microsoft.com/office/powerpoint/2010/main" val="1711053471"/>
+        <p14:creationId xmlns:p14="http://schemas.microsoft.com/office/powerpoint/2010/main" xmlns="" val="1711053471"/>
       </p:ext>
     </p:extLst>
   </p:cSld>
@@ -1284,7 +1288,7 @@
     </p:spTree>
     <p:extLst>
       <p:ext uri="{BB962C8B-B14F-4D97-AF65-F5344CB8AC3E}">
-        <p14:creationId xmlns="" xmlns:p14="http://schemas.microsoft.com/office/powerpoint/2010/main" val="2433924881"/>
+        <p14:creationId xmlns:p14="http://schemas.microsoft.com/office/powerpoint/2010/main" xmlns="" val="2433924881"/>
       </p:ext>
     </p:extLst>
   </p:cSld>
@@ -1482,7 +1486,7 @@
     </p:spTree>
     <p:extLst>
       <p:ext uri="{BB962C8B-B14F-4D97-AF65-F5344CB8AC3E}">
-        <p14:creationId xmlns="" xmlns:p14="http://schemas.microsoft.com/office/powerpoint/2010/main" val="1680665394"/>
+        <p14:creationId xmlns:p14="http://schemas.microsoft.com/office/powerpoint/2010/main" xmlns="" val="1680665394"/>
       </p:ext>
     </p:extLst>
   </p:cSld>
@@ -1680,7 +1684,7 @@
     </p:spTree>
     <p:extLst>
       <p:ext uri="{BB962C8B-B14F-4D97-AF65-F5344CB8AC3E}">
-        <p14:creationId xmlns="" xmlns:p14="http://schemas.microsoft.com/office/powerpoint/2010/main" val="1680665394"/>
+        <p14:creationId xmlns:p14="http://schemas.microsoft.com/office/powerpoint/2010/main" xmlns="" val="1680665394"/>
       </p:ext>
     </p:extLst>
   </p:cSld>
@@ -1878,7 +1882,7 @@
     </p:spTree>
     <p:extLst>
       <p:ext uri="{BB962C8B-B14F-4D97-AF65-F5344CB8AC3E}">
-        <p14:creationId xmlns="" xmlns:p14="http://schemas.microsoft.com/office/powerpoint/2010/main" val="1680665394"/>
+        <p14:creationId xmlns:p14="http://schemas.microsoft.com/office/powerpoint/2010/main" xmlns="" val="1680665394"/>
       </p:ext>
     </p:extLst>
   </p:cSld>
@@ -2031,7 +2035,7 @@
             <a:fld id="{ABDE8FA8-F260-4748-B4B1-2AE857DBB852}" type="slidenum">
               <a:rPr lang="en-GB" altLang="en-US"/>
               <a:pPr/>
-              <a:t>6</a:t>
+              <a:t>7</a:t>
             </a:fld>
             <a:endParaRPr lang="en-GB" altLang="en-US"/>
           </a:p>
@@ -2076,7 +2080,7 @@
     </p:spTree>
     <p:extLst>
       <p:ext uri="{BB962C8B-B14F-4D97-AF65-F5344CB8AC3E}">
-        <p14:creationId xmlns="" xmlns:p14="http://schemas.microsoft.com/office/powerpoint/2010/main" val="1680665394"/>
+        <p14:creationId xmlns:p14="http://schemas.microsoft.com/office/powerpoint/2010/main" xmlns="" val="1680665394"/>
       </p:ext>
     </p:extLst>
   </p:cSld>
@@ -2229,7 +2233,7 @@
             <a:fld id="{ABDE8FA8-F260-4748-B4B1-2AE857DBB852}" type="slidenum">
               <a:rPr lang="en-GB" altLang="en-US"/>
               <a:pPr/>
-              <a:t>7</a:t>
+              <a:t>8</a:t>
             </a:fld>
             <a:endParaRPr lang="en-GB" altLang="en-US"/>
           </a:p>
@@ -2274,7 +2278,7 @@
     </p:spTree>
     <p:extLst>
       <p:ext uri="{BB962C8B-B14F-4D97-AF65-F5344CB8AC3E}">
-        <p14:creationId xmlns="" xmlns:p14="http://schemas.microsoft.com/office/powerpoint/2010/main" val="1680665394"/>
+        <p14:creationId xmlns:p14="http://schemas.microsoft.com/office/powerpoint/2010/main" xmlns="" val="1680665394"/>
       </p:ext>
     </p:extLst>
   </p:cSld>
@@ -2427,7 +2431,7 @@
             <a:fld id="{ABDE8FA8-F260-4748-B4B1-2AE857DBB852}" type="slidenum">
               <a:rPr lang="en-GB" altLang="en-US"/>
               <a:pPr/>
-              <a:t>8</a:t>
+              <a:t>9</a:t>
             </a:fld>
             <a:endParaRPr lang="en-GB" altLang="en-US"/>
           </a:p>
@@ -2472,7 +2476,7 @@
     </p:spTree>
     <p:extLst>
       <p:ext uri="{BB962C8B-B14F-4D97-AF65-F5344CB8AC3E}">
-        <p14:creationId xmlns="" xmlns:p14="http://schemas.microsoft.com/office/powerpoint/2010/main" val="1680665394"/>
+        <p14:creationId xmlns:p14="http://schemas.microsoft.com/office/powerpoint/2010/main" xmlns="" val="1680665394"/>
       </p:ext>
     </p:extLst>
   </p:cSld>
@@ -2625,7 +2629,7 @@
             <a:fld id="{ABDE8FA8-F260-4748-B4B1-2AE857DBB852}" type="slidenum">
               <a:rPr lang="en-GB" altLang="en-US"/>
               <a:pPr/>
-              <a:t>9</a:t>
+              <a:t>10</a:t>
             </a:fld>
             <a:endParaRPr lang="en-GB" altLang="en-US"/>
           </a:p>
@@ -2670,7 +2674,7 @@
     </p:spTree>
     <p:extLst>
       <p:ext uri="{BB962C8B-B14F-4D97-AF65-F5344CB8AC3E}">
-        <p14:creationId xmlns="" xmlns:p14="http://schemas.microsoft.com/office/powerpoint/2010/main" val="1680665394"/>
+        <p14:creationId xmlns:p14="http://schemas.microsoft.com/office/powerpoint/2010/main" xmlns="" val="1680665394"/>
       </p:ext>
     </p:extLst>
   </p:cSld>
@@ -2823,7 +2827,7 @@
             <a:fld id="{ABDE8FA8-F260-4748-B4B1-2AE857DBB852}" type="slidenum">
               <a:rPr lang="en-GB" altLang="en-US"/>
               <a:pPr/>
-              <a:t>12</a:t>
+              <a:t>11</a:t>
             </a:fld>
             <a:endParaRPr lang="en-GB" altLang="en-US"/>
           </a:p>
@@ -2868,7 +2872,7 @@
     </p:spTree>
     <p:extLst>
       <p:ext uri="{BB962C8B-B14F-4D97-AF65-F5344CB8AC3E}">
-        <p14:creationId xmlns="" xmlns:p14="http://schemas.microsoft.com/office/powerpoint/2010/main" val="1680665394"/>
+        <p14:creationId xmlns:p14="http://schemas.microsoft.com/office/powerpoint/2010/main" xmlns="" val="1680665394"/>
       </p:ext>
     </p:extLst>
   </p:cSld>
@@ -3021,7 +3025,7 @@
             <a:fld id="{ABDE8FA8-F260-4748-B4B1-2AE857DBB852}" type="slidenum">
               <a:rPr lang="en-GB" altLang="en-US"/>
               <a:pPr/>
-              <a:t>13</a:t>
+              <a:t>12</a:t>
             </a:fld>
             <a:endParaRPr lang="en-GB" altLang="en-US"/>
           </a:p>
@@ -3066,7 +3070,7 @@
     </p:spTree>
     <p:extLst>
       <p:ext uri="{BB962C8B-B14F-4D97-AF65-F5344CB8AC3E}">
-        <p14:creationId xmlns="" xmlns:p14="http://schemas.microsoft.com/office/powerpoint/2010/main" val="1680665394"/>
+        <p14:creationId xmlns:p14="http://schemas.microsoft.com/office/powerpoint/2010/main" xmlns="" val="1680665394"/>
       </p:ext>
     </p:extLst>
   </p:cSld>
@@ -3123,7 +3127,7 @@
           <a:effectLst/>
           <a:extLst>
             <a:ext uri="{AF507438-7753-43E0-B8FC-AC1667EBCBE1}">
-              <a14:hiddenEffects xmlns="" xmlns:a14="http://schemas.microsoft.com/office/drawing/2010/main">
+              <a14:hiddenEffects xmlns:a14="http://schemas.microsoft.com/office/drawing/2010/main" xmlns="">
                 <a:effectLst>
                   <a:outerShdw dist="35921" dir="2700000" algn="ctr" rotWithShape="0">
                     <a:schemeClr val="bg2"/>
@@ -3319,7 +3323,7 @@
           </a:ln>
           <a:extLst>
             <a:ext uri="{91240B29-F687-4F45-9708-019B960494DF}">
-              <a14:hiddenLine xmlns="" xmlns:a14="http://schemas.microsoft.com/office/drawing/2010/main" w="9525">
+              <a14:hiddenLine xmlns:a14="http://schemas.microsoft.com/office/drawing/2010/main" xmlns="" w="9525">
                 <a:solidFill>
                   <a:srgbClr val="000000"/>
                 </a:solidFill>
@@ -3459,14 +3463,14 @@
           </a:prstGeom>
           <a:extLst>
             <a:ext uri="{909E8E84-426E-40DD-AFC4-6F175D3DCCD1}">
-              <a14:hiddenFill xmlns="" xmlns:a14="http://schemas.microsoft.com/office/drawing/2010/main">
+              <a14:hiddenFill xmlns:a14="http://schemas.microsoft.com/office/drawing/2010/main" xmlns="">
                 <a:solidFill>
                   <a:schemeClr val="accent1"/>
                 </a:solidFill>
               </a14:hiddenFill>
             </a:ext>
             <a:ext uri="{91240B29-F687-4F45-9708-019B960494DF}">
-              <a14:hiddenLine xmlns="" xmlns:a14="http://schemas.microsoft.com/office/drawing/2010/main" w="9525">
+              <a14:hiddenLine xmlns:a14="http://schemas.microsoft.com/office/drawing/2010/main" xmlns="" w="9525">
                 <a:solidFill>
                   <a:schemeClr val="tx1"/>
                 </a:solidFill>
@@ -3476,7 +3480,7 @@
               </a14:hiddenLine>
             </a:ext>
             <a:ext uri="{AF507438-7753-43E0-B8FC-AC1667EBCBE1}">
-              <a14:hiddenEffects xmlns="" xmlns:a14="http://schemas.microsoft.com/office/drawing/2010/main">
+              <a14:hiddenEffects xmlns:a14="http://schemas.microsoft.com/office/drawing/2010/main" xmlns="">
                 <a:effectLst>
                   <a:outerShdw dist="35921" dir="2700000" algn="ctr" rotWithShape="0">
                     <a:schemeClr val="bg2"/>
@@ -3546,7 +3550,7 @@
     </p:spTree>
     <p:extLst>
       <p:ext uri="{BB962C8B-B14F-4D97-AF65-F5344CB8AC3E}">
-        <p14:creationId xmlns="" xmlns:p14="http://schemas.microsoft.com/office/powerpoint/2010/main" val="3862339717"/>
+        <p14:creationId xmlns:p14="http://schemas.microsoft.com/office/powerpoint/2010/main" xmlns="" val="3862339717"/>
       </p:ext>
     </p:extLst>
   </p:cSld>
@@ -3717,7 +3721,7 @@
     </p:spTree>
     <p:extLst>
       <p:ext uri="{BB962C8B-B14F-4D97-AF65-F5344CB8AC3E}">
-        <p14:creationId xmlns="" xmlns:p14="http://schemas.microsoft.com/office/powerpoint/2010/main" val="3616501732"/>
+        <p14:creationId xmlns:p14="http://schemas.microsoft.com/office/powerpoint/2010/main" xmlns="" val="3616501732"/>
       </p:ext>
     </p:extLst>
   </p:cSld>
@@ -3898,7 +3902,7 @@
     </p:spTree>
     <p:extLst>
       <p:ext uri="{BB962C8B-B14F-4D97-AF65-F5344CB8AC3E}">
-        <p14:creationId xmlns="" xmlns:p14="http://schemas.microsoft.com/office/powerpoint/2010/main" val="4183861666"/>
+        <p14:creationId xmlns:p14="http://schemas.microsoft.com/office/powerpoint/2010/main" xmlns="" val="4183861666"/>
       </p:ext>
     </p:extLst>
   </p:cSld>
@@ -4047,7 +4051,7 @@
     </p:spTree>
     <p:extLst>
       <p:ext uri="{BB962C8B-B14F-4D97-AF65-F5344CB8AC3E}">
-        <p14:creationId xmlns="" xmlns:p14="http://schemas.microsoft.com/office/powerpoint/2010/main" val="1998572866"/>
+        <p14:creationId xmlns:p14="http://schemas.microsoft.com/office/powerpoint/2010/main" xmlns="" val="1998572866"/>
       </p:ext>
     </p:extLst>
   </p:cSld>
@@ -4196,7 +4200,7 @@
     </p:spTree>
     <p:extLst>
       <p:ext uri="{BB962C8B-B14F-4D97-AF65-F5344CB8AC3E}">
-        <p14:creationId xmlns="" xmlns:p14="http://schemas.microsoft.com/office/powerpoint/2010/main" val="4186681241"/>
+        <p14:creationId xmlns:p14="http://schemas.microsoft.com/office/powerpoint/2010/main" xmlns="" val="4186681241"/>
       </p:ext>
     </p:extLst>
   </p:cSld>
@@ -4434,7 +4438,7 @@
     </p:spTree>
     <p:extLst>
       <p:ext uri="{BB962C8B-B14F-4D97-AF65-F5344CB8AC3E}">
-        <p14:creationId xmlns="" xmlns:p14="http://schemas.microsoft.com/office/powerpoint/2010/main" val="2973065096"/>
+        <p14:creationId xmlns:p14="http://schemas.microsoft.com/office/powerpoint/2010/main" xmlns="" val="2973065096"/>
       </p:ext>
     </p:extLst>
   </p:cSld>
@@ -4605,7 +4609,7 @@
     </p:spTree>
     <p:extLst>
       <p:ext uri="{BB962C8B-B14F-4D97-AF65-F5344CB8AC3E}">
-        <p14:creationId xmlns="" xmlns:p14="http://schemas.microsoft.com/office/powerpoint/2010/main" val="2023945706"/>
+        <p14:creationId xmlns:p14="http://schemas.microsoft.com/office/powerpoint/2010/main" xmlns="" val="2023945706"/>
       </p:ext>
     </p:extLst>
   </p:cSld>
@@ -4798,7 +4802,7 @@
     </p:spTree>
     <p:extLst>
       <p:ext uri="{BB962C8B-B14F-4D97-AF65-F5344CB8AC3E}">
-        <p14:creationId xmlns="" xmlns:p14="http://schemas.microsoft.com/office/powerpoint/2010/main" val="3910440067"/>
+        <p14:creationId xmlns:p14="http://schemas.microsoft.com/office/powerpoint/2010/main" xmlns="" val="3910440067"/>
       </p:ext>
     </p:extLst>
   </p:cSld>
@@ -5031,7 +5035,7 @@
     </p:spTree>
     <p:extLst>
       <p:ext uri="{BB962C8B-B14F-4D97-AF65-F5344CB8AC3E}">
-        <p14:creationId xmlns="" xmlns:p14="http://schemas.microsoft.com/office/powerpoint/2010/main" val="2263429059"/>
+        <p14:creationId xmlns:p14="http://schemas.microsoft.com/office/powerpoint/2010/main" xmlns="" val="2263429059"/>
       </p:ext>
     </p:extLst>
   </p:cSld>
@@ -5399,7 +5403,7 @@
     </p:spTree>
     <p:extLst>
       <p:ext uri="{BB962C8B-B14F-4D97-AF65-F5344CB8AC3E}">
-        <p14:creationId xmlns="" xmlns:p14="http://schemas.microsoft.com/office/powerpoint/2010/main" val="1912727455"/>
+        <p14:creationId xmlns:p14="http://schemas.microsoft.com/office/powerpoint/2010/main" xmlns="" val="1912727455"/>
       </p:ext>
     </p:extLst>
   </p:cSld>
@@ -5518,7 +5522,7 @@
     </p:spTree>
     <p:extLst>
       <p:ext uri="{BB962C8B-B14F-4D97-AF65-F5344CB8AC3E}">
-        <p14:creationId xmlns="" xmlns:p14="http://schemas.microsoft.com/office/powerpoint/2010/main" val="4269111437"/>
+        <p14:creationId xmlns:p14="http://schemas.microsoft.com/office/powerpoint/2010/main" xmlns="" val="4269111437"/>
       </p:ext>
     </p:extLst>
   </p:cSld>
@@ -5614,7 +5618,7 @@
     </p:spTree>
     <p:extLst>
       <p:ext uri="{BB962C8B-B14F-4D97-AF65-F5344CB8AC3E}">
-        <p14:creationId xmlns="" xmlns:p14="http://schemas.microsoft.com/office/powerpoint/2010/main" val="292276621"/>
+        <p14:creationId xmlns:p14="http://schemas.microsoft.com/office/powerpoint/2010/main" xmlns="" val="292276621"/>
       </p:ext>
     </p:extLst>
   </p:cSld>
@@ -5892,7 +5896,7 @@
     </p:spTree>
     <p:extLst>
       <p:ext uri="{BB962C8B-B14F-4D97-AF65-F5344CB8AC3E}">
-        <p14:creationId xmlns="" xmlns:p14="http://schemas.microsoft.com/office/powerpoint/2010/main" val="570490551"/>
+        <p14:creationId xmlns:p14="http://schemas.microsoft.com/office/powerpoint/2010/main" xmlns="" val="570490551"/>
       </p:ext>
     </p:extLst>
   </p:cSld>
@@ -6147,7 +6151,7 @@
     </p:spTree>
     <p:extLst>
       <p:ext uri="{BB962C8B-B14F-4D97-AF65-F5344CB8AC3E}">
-        <p14:creationId xmlns="" xmlns:p14="http://schemas.microsoft.com/office/powerpoint/2010/main" val="2425261388"/>
+        <p14:creationId xmlns:p14="http://schemas.microsoft.com/office/powerpoint/2010/main" xmlns="" val="2425261388"/>
       </p:ext>
     </p:extLst>
   </p:cSld>
@@ -6215,7 +6219,7 @@
           <a:effectLst/>
           <a:extLst>
             <a:ext uri="{AF507438-7753-43E0-B8FC-AC1667EBCBE1}">
-              <a14:hiddenEffects xmlns="" xmlns:a14="http://schemas.microsoft.com/office/drawing/2010/main">
+              <a14:hiddenEffects xmlns:a14="http://schemas.microsoft.com/office/drawing/2010/main" xmlns="">
                 <a:effectLst>
                   <a:outerShdw dist="35921" dir="2700000" algn="ctr" rotWithShape="0">
                     <a:schemeClr val="bg2"/>
@@ -6365,14 +6369,14 @@
           <a:effectLst/>
           <a:extLst>
             <a:ext uri="{909E8E84-426E-40DD-AFC4-6F175D3DCCD1}">
-              <a14:hiddenFill xmlns="" xmlns:a14="http://schemas.microsoft.com/office/drawing/2010/main">
+              <a14:hiddenFill xmlns:a14="http://schemas.microsoft.com/office/drawing/2010/main" xmlns="">
                 <a:solidFill>
                   <a:schemeClr val="accent1"/>
                 </a:solidFill>
               </a14:hiddenFill>
             </a:ext>
             <a:ext uri="{91240B29-F687-4F45-9708-019B960494DF}">
-              <a14:hiddenLine xmlns="" xmlns:a14="http://schemas.microsoft.com/office/drawing/2010/main" w="9525">
+              <a14:hiddenLine xmlns:a14="http://schemas.microsoft.com/office/drawing/2010/main" xmlns="" w="9525">
                 <a:solidFill>
                   <a:schemeClr val="tx1"/>
                 </a:solidFill>
@@ -6382,7 +6386,7 @@
               </a14:hiddenLine>
             </a:ext>
             <a:ext uri="{AF507438-7753-43E0-B8FC-AC1667EBCBE1}">
-              <a14:hiddenEffects xmlns="" xmlns:a14="http://schemas.microsoft.com/office/drawing/2010/main">
+              <a14:hiddenEffects xmlns:a14="http://schemas.microsoft.com/office/drawing/2010/main" xmlns="">
                 <a:effectLst>
                   <a:outerShdw dist="35921" dir="2700000" algn="ctr" rotWithShape="0">
                     <a:schemeClr val="bg2"/>
@@ -6461,14 +6465,14 @@
           <a:effectLst/>
           <a:extLst>
             <a:ext uri="{909E8E84-426E-40DD-AFC4-6F175D3DCCD1}">
-              <a14:hiddenFill xmlns="" xmlns:a14="http://schemas.microsoft.com/office/drawing/2010/main">
+              <a14:hiddenFill xmlns:a14="http://schemas.microsoft.com/office/drawing/2010/main" xmlns="">
                 <a:solidFill>
                   <a:schemeClr val="accent1"/>
                 </a:solidFill>
               </a14:hiddenFill>
             </a:ext>
             <a:ext uri="{91240B29-F687-4F45-9708-019B960494DF}">
-              <a14:hiddenLine xmlns="" xmlns:a14="http://schemas.microsoft.com/office/drawing/2010/main" w="9525">
+              <a14:hiddenLine xmlns:a14="http://schemas.microsoft.com/office/drawing/2010/main" xmlns="" w="9525">
                 <a:solidFill>
                   <a:schemeClr val="tx1"/>
                 </a:solidFill>
@@ -6478,7 +6482,7 @@
               </a14:hiddenLine>
             </a:ext>
             <a:ext uri="{AF507438-7753-43E0-B8FC-AC1667EBCBE1}">
-              <a14:hiddenEffects xmlns="" xmlns:a14="http://schemas.microsoft.com/office/drawing/2010/main">
+              <a14:hiddenEffects xmlns:a14="http://schemas.microsoft.com/office/drawing/2010/main" xmlns="">
                 <a:effectLst>
                   <a:outerShdw dist="35921" dir="2700000" algn="ctr" rotWithShape="0">
                     <a:schemeClr val="bg2"/>
@@ -6529,14 +6533,14 @@
           <a:effectLst/>
           <a:extLst>
             <a:ext uri="{909E8E84-426E-40DD-AFC4-6F175D3DCCD1}">
-              <a14:hiddenFill xmlns="" xmlns:a14="http://schemas.microsoft.com/office/drawing/2010/main">
+              <a14:hiddenFill xmlns:a14="http://schemas.microsoft.com/office/drawing/2010/main" xmlns="">
                 <a:solidFill>
                   <a:schemeClr val="accent1"/>
                 </a:solidFill>
               </a14:hiddenFill>
             </a:ext>
             <a:ext uri="{91240B29-F687-4F45-9708-019B960494DF}">
-              <a14:hiddenLine xmlns="" xmlns:a14="http://schemas.microsoft.com/office/drawing/2010/main" w="9525">
+              <a14:hiddenLine xmlns:a14="http://schemas.microsoft.com/office/drawing/2010/main" xmlns="" w="9525">
                 <a:solidFill>
                   <a:schemeClr val="tx1"/>
                 </a:solidFill>
@@ -6546,7 +6550,7 @@
               </a14:hiddenLine>
             </a:ext>
             <a:ext uri="{AF507438-7753-43E0-B8FC-AC1667EBCBE1}">
-              <a14:hiddenEffects xmlns="" xmlns:a14="http://schemas.microsoft.com/office/drawing/2010/main">
+              <a14:hiddenEffects xmlns:a14="http://schemas.microsoft.com/office/drawing/2010/main" xmlns="">
                 <a:effectLst>
                   <a:outerShdw dist="35921" dir="2700000" algn="ctr" rotWithShape="0">
                     <a:schemeClr val="bg2"/>
@@ -6600,14 +6604,14 @@
           <a:effectLst/>
           <a:extLst>
             <a:ext uri="{909E8E84-426E-40DD-AFC4-6F175D3DCCD1}">
-              <a14:hiddenFill xmlns="" xmlns:a14="http://schemas.microsoft.com/office/drawing/2010/main">
+              <a14:hiddenFill xmlns:a14="http://schemas.microsoft.com/office/drawing/2010/main" xmlns="">
                 <a:solidFill>
                   <a:schemeClr val="accent1"/>
                 </a:solidFill>
               </a14:hiddenFill>
             </a:ext>
             <a:ext uri="{91240B29-F687-4F45-9708-019B960494DF}">
-              <a14:hiddenLine xmlns="" xmlns:a14="http://schemas.microsoft.com/office/drawing/2010/main" w="9525">
+              <a14:hiddenLine xmlns:a14="http://schemas.microsoft.com/office/drawing/2010/main" xmlns="" w="9525">
                 <a:solidFill>
                   <a:schemeClr val="tx1"/>
                 </a:solidFill>
@@ -6617,7 +6621,7 @@
               </a14:hiddenLine>
             </a:ext>
             <a:ext uri="{AF507438-7753-43E0-B8FC-AC1667EBCBE1}">
-              <a14:hiddenEffects xmlns="" xmlns:a14="http://schemas.microsoft.com/office/drawing/2010/main">
+              <a14:hiddenEffects xmlns:a14="http://schemas.microsoft.com/office/drawing/2010/main" xmlns="">
                 <a:effectLst>
                   <a:outerShdw dist="35921" dir="2700000" algn="ctr" rotWithShape="0">
                     <a:schemeClr val="bg2"/>
@@ -7259,6 +7263,596 @@
       </p:grpSpPr>
       <p:sp>
         <p:nvSpPr>
+          <p:cNvPr id="7170" name="Rectangle 2"/>
+          <p:cNvSpPr>
+            <a:spLocks noGrp="1" noChangeArrowheads="1"/>
+          </p:cNvSpPr>
+          <p:nvPr>
+            <p:ph type="title"/>
+          </p:nvPr>
+        </p:nvSpPr>
+        <p:spPr>
+          <a:xfrm>
+            <a:off x="971600" y="188640"/>
+            <a:ext cx="2880320" cy="764704"/>
+          </a:xfrm>
+        </p:spPr>
+        <p:txBody>
+          <a:bodyPr/>
+          <a:lstStyle/>
+          <a:p>
+            <a:pPr algn="ctr" eaLnBrk="1" hangingPunct="1"/>
+            <a:r>
+              <a:rPr lang="en-US" altLang="en-US" sz="4500" b="1" dirty="0" smtClean="0">
+                <a:solidFill>
+                  <a:schemeClr val="bg1">
+                    <a:lumMod val="10000"/>
+                  </a:schemeClr>
+                </a:solidFill>
+              </a:rPr>
+              <a:t>STOCKS</a:t>
+            </a:r>
+          </a:p>
+        </p:txBody>
+      </p:sp>
+      <p:sp>
+        <p:nvSpPr>
+          <p:cNvPr id="5" name="TextBox 4"/>
+          <p:cNvSpPr txBox="1"/>
+          <p:nvPr/>
+        </p:nvSpPr>
+        <p:spPr>
+          <a:xfrm>
+            <a:off x="3167844" y="5697252"/>
+            <a:ext cx="2844316" cy="923330"/>
+          </a:xfrm>
+          <a:prstGeom prst="rect">
+            <a:avLst/>
+          </a:prstGeom>
+          <a:noFill/>
+        </p:spPr>
+        <p:txBody>
+          <a:bodyPr wrap="square" rtlCol="0">
+            <a:spAutoFit/>
+          </a:bodyPr>
+          <a:lstStyle/>
+          <a:p>
+            <a:pPr algn="ctr"/>
+            <a:r>
+              <a:rPr lang="en-US" b="1" dirty="0" smtClean="0">
+                <a:solidFill>
+                  <a:schemeClr val="bg1">
+                    <a:lumMod val="10000"/>
+                  </a:schemeClr>
+                </a:solidFill>
+              </a:rPr>
+              <a:t>Monte Carlo Simulation </a:t>
+            </a:r>
+            <a:r>
+              <a:rPr lang="en-US" b="1" i="1" dirty="0" smtClean="0">
+                <a:solidFill>
+                  <a:schemeClr val="bg1">
+                    <a:lumMod val="10000"/>
+                  </a:schemeClr>
+                </a:solidFill>
+              </a:rPr>
+              <a:t>10 Years</a:t>
+            </a:r>
+          </a:p>
+          <a:p>
+            <a:endParaRPr lang="en-US" dirty="0"/>
+          </a:p>
+        </p:txBody>
+      </p:sp>
+      <p:sp>
+        <p:nvSpPr>
+          <p:cNvPr id="11" name="TextBox 10"/>
+          <p:cNvSpPr txBox="1"/>
+          <p:nvPr/>
+        </p:nvSpPr>
+        <p:spPr>
+          <a:xfrm>
+            <a:off x="3815916" y="440668"/>
+            <a:ext cx="5328084" cy="1015663"/>
+          </a:xfrm>
+          <a:prstGeom prst="rect">
+            <a:avLst/>
+          </a:prstGeom>
+          <a:noFill/>
+        </p:spPr>
+        <p:txBody>
+          <a:bodyPr wrap="square" rtlCol="0">
+            <a:spAutoFit/>
+          </a:bodyPr>
+          <a:lstStyle/>
+          <a:p>
+            <a:pPr algn="ctr"/>
+            <a:r>
+              <a:rPr lang="en-US" sz="2000" dirty="0" smtClean="0">
+                <a:solidFill>
+                  <a:schemeClr val="bg1">
+                    <a:lumMod val="10000"/>
+                  </a:schemeClr>
+                </a:solidFill>
+              </a:rPr>
+              <a:t>•  FB  •  AMZN  •  AAPL  •  XOM  •  JPM  •</a:t>
+            </a:r>
+          </a:p>
+          <a:p>
+            <a:pPr algn="ctr"/>
+            <a:r>
+              <a:rPr lang="en-US" sz="2000" dirty="0" smtClean="0">
+                <a:solidFill>
+                  <a:schemeClr val="bg1">
+                    <a:lumMod val="10000"/>
+                  </a:schemeClr>
+                </a:solidFill>
+              </a:rPr>
+              <a:t>•  JNJ  •  HON  •  LIN  •  AMT  •  PG  •  NEE •</a:t>
+            </a:r>
+          </a:p>
+          <a:p>
+            <a:endParaRPr lang="en-US" sz="2000" dirty="0">
+              <a:solidFill>
+                <a:schemeClr val="bg1">
+                  <a:lumMod val="10000"/>
+                </a:schemeClr>
+              </a:solidFill>
+            </a:endParaRPr>
+          </a:p>
+        </p:txBody>
+      </p:sp>
+      <p:pic>
+        <p:nvPicPr>
+          <p:cNvPr id="58370" name="Picture 2" descr="mc_10_cum_return_dist_stocks.png"/>
+          <p:cNvPicPr>
+            <a:picLocks noChangeAspect="1" noChangeArrowheads="1"/>
+          </p:cNvPicPr>
+          <p:nvPr/>
+        </p:nvPicPr>
+        <p:blipFill>
+          <a:blip r:embed="rId3" cstate="print"/>
+          <a:srcRect/>
+          <a:stretch>
+            <a:fillRect/>
+          </a:stretch>
+        </p:blipFill>
+        <p:spPr bwMode="auto">
+          <a:xfrm>
+            <a:off x="1472184" y="1664208"/>
+            <a:ext cx="6200775" cy="3771900"/>
+          </a:xfrm>
+          <a:prstGeom prst="rect">
+            <a:avLst/>
+          </a:prstGeom>
+          <a:noFill/>
+        </p:spPr>
+      </p:pic>
+    </p:spTree>
+  </p:cSld>
+  <p:clrMapOvr>
+    <a:masterClrMapping/>
+  </p:clrMapOvr>
+  <p:transition>
+    <p:wipe dir="r"/>
+  </p:transition>
+  <p:timing>
+    <p:tnLst>
+      <p:par>
+        <p:cTn id="1" dur="indefinite" restart="never" nodeType="tmRoot"/>
+      </p:par>
+    </p:tnLst>
+  </p:timing>
+</p:sld>
+</file>
+
+<file path=ppt/slides/slide11.xml><?xml version="1.0" encoding="utf-8"?>
+<p:sld xmlns:a="http://schemas.openxmlformats.org/drawingml/2006/main" xmlns:r="http://schemas.openxmlformats.org/officeDocument/2006/relationships" xmlns:p="http://schemas.openxmlformats.org/presentationml/2006/main">
+  <p:cSld>
+    <p:spTree>
+      <p:nvGrpSpPr>
+        <p:cNvPr id="1" name=""/>
+        <p:cNvGrpSpPr/>
+        <p:nvPr/>
+      </p:nvGrpSpPr>
+      <p:grpSpPr>
+        <a:xfrm>
+          <a:off x="0" y="0"/>
+          <a:ext cx="0" cy="0"/>
+          <a:chOff x="0" y="0"/>
+          <a:chExt cx="0" cy="0"/>
+        </a:xfrm>
+      </p:grpSpPr>
+      <p:sp>
+        <p:nvSpPr>
+          <p:cNvPr id="7170" name="Rectangle 2"/>
+          <p:cNvSpPr>
+            <a:spLocks noGrp="1" noChangeArrowheads="1"/>
+          </p:cNvSpPr>
+          <p:nvPr>
+            <p:ph type="title"/>
+          </p:nvPr>
+        </p:nvSpPr>
+        <p:spPr>
+          <a:xfrm>
+            <a:off x="1115616" y="188640"/>
+            <a:ext cx="2880320" cy="764704"/>
+          </a:xfrm>
+        </p:spPr>
+        <p:txBody>
+          <a:bodyPr/>
+          <a:lstStyle/>
+          <a:p>
+            <a:pPr algn="ctr" eaLnBrk="1" hangingPunct="1"/>
+            <a:r>
+              <a:rPr lang="en-US" altLang="en-US" sz="4500" b="1" dirty="0" smtClean="0">
+                <a:solidFill>
+                  <a:schemeClr val="bg1">
+                    <a:lumMod val="10000"/>
+                  </a:schemeClr>
+                </a:solidFill>
+              </a:rPr>
+              <a:t>CRYPTO</a:t>
+            </a:r>
+          </a:p>
+        </p:txBody>
+      </p:sp>
+      <p:sp>
+        <p:nvSpPr>
+          <p:cNvPr id="5" name="TextBox 4"/>
+          <p:cNvSpPr txBox="1"/>
+          <p:nvPr/>
+        </p:nvSpPr>
+        <p:spPr>
+          <a:xfrm>
+            <a:off x="3167844" y="5697252"/>
+            <a:ext cx="2844316" cy="923330"/>
+          </a:xfrm>
+          <a:prstGeom prst="rect">
+            <a:avLst/>
+          </a:prstGeom>
+          <a:noFill/>
+        </p:spPr>
+        <p:txBody>
+          <a:bodyPr wrap="square" rtlCol="0">
+            <a:spAutoFit/>
+          </a:bodyPr>
+          <a:lstStyle/>
+          <a:p>
+            <a:pPr algn="ctr"/>
+            <a:r>
+              <a:rPr lang="en-US" b="1" dirty="0" smtClean="0">
+                <a:solidFill>
+                  <a:schemeClr val="bg1">
+                    <a:lumMod val="10000"/>
+                  </a:schemeClr>
+                </a:solidFill>
+              </a:rPr>
+              <a:t>Monte Carlo Simulation </a:t>
+            </a:r>
+            <a:r>
+              <a:rPr lang="en-US" b="1" i="1" dirty="0" smtClean="0">
+                <a:solidFill>
+                  <a:schemeClr val="bg1">
+                    <a:lumMod val="10000"/>
+                  </a:schemeClr>
+                </a:solidFill>
+              </a:rPr>
+              <a:t>10 Years</a:t>
+            </a:r>
+          </a:p>
+          <a:p>
+            <a:endParaRPr lang="en-US" dirty="0"/>
+          </a:p>
+        </p:txBody>
+      </p:sp>
+      <p:sp>
+        <p:nvSpPr>
+          <p:cNvPr id="11" name="TextBox 10"/>
+          <p:cNvSpPr txBox="1"/>
+          <p:nvPr/>
+        </p:nvSpPr>
+        <p:spPr>
+          <a:xfrm>
+            <a:off x="3815916" y="656692"/>
+            <a:ext cx="5112568" cy="400110"/>
+          </a:xfrm>
+          <a:prstGeom prst="rect">
+            <a:avLst/>
+          </a:prstGeom>
+          <a:noFill/>
+        </p:spPr>
+        <p:txBody>
+          <a:bodyPr wrap="square" rtlCol="0">
+            <a:spAutoFit/>
+          </a:bodyPr>
+          <a:lstStyle/>
+          <a:p>
+            <a:r>
+              <a:rPr lang="en-US" sz="2000" dirty="0" smtClean="0">
+                <a:solidFill>
+                  <a:schemeClr val="bg1">
+                    <a:lumMod val="10000"/>
+                  </a:schemeClr>
+                </a:solidFill>
+              </a:rPr>
+              <a:t>•  BTC  •  ETH  •  BNB  •  DASH  •  LTC  •</a:t>
+            </a:r>
+            <a:endParaRPr lang="en-US" sz="2000" dirty="0">
+              <a:solidFill>
+                <a:schemeClr val="bg1">
+                  <a:lumMod val="10000"/>
+                </a:schemeClr>
+              </a:solidFill>
+            </a:endParaRPr>
+          </a:p>
+        </p:txBody>
+      </p:sp>
+      <p:pic>
+        <p:nvPicPr>
+          <p:cNvPr id="60418" name="Picture 2" descr="mc_10_cum_return_dist_cryptocurrency.png"/>
+          <p:cNvPicPr>
+            <a:picLocks noChangeAspect="1" noChangeArrowheads="1"/>
+          </p:cNvPicPr>
+          <p:nvPr/>
+        </p:nvPicPr>
+        <p:blipFill>
+          <a:blip r:embed="rId3" cstate="print"/>
+          <a:srcRect/>
+          <a:stretch>
+            <a:fillRect/>
+          </a:stretch>
+        </p:blipFill>
+        <p:spPr bwMode="auto">
+          <a:xfrm>
+            <a:off x="1472184" y="1664208"/>
+            <a:ext cx="6386513" cy="3771900"/>
+          </a:xfrm>
+          <a:prstGeom prst="rect">
+            <a:avLst/>
+          </a:prstGeom>
+          <a:noFill/>
+        </p:spPr>
+      </p:pic>
+    </p:spTree>
+  </p:cSld>
+  <p:clrMapOvr>
+    <a:masterClrMapping/>
+  </p:clrMapOvr>
+  <p:transition>
+    <p:wipe dir="r"/>
+  </p:transition>
+  <p:timing>
+    <p:tnLst>
+      <p:par>
+        <p:cTn id="1" dur="indefinite" restart="never" nodeType="tmRoot"/>
+      </p:par>
+    </p:tnLst>
+  </p:timing>
+</p:sld>
+</file>
+
+<file path=ppt/slides/slide12.xml><?xml version="1.0" encoding="utf-8"?>
+<p:sld xmlns:a="http://schemas.openxmlformats.org/drawingml/2006/main" xmlns:r="http://schemas.openxmlformats.org/officeDocument/2006/relationships" xmlns:p="http://schemas.openxmlformats.org/presentationml/2006/main">
+  <p:cSld>
+    <p:spTree>
+      <p:nvGrpSpPr>
+        <p:cNvPr id="1" name=""/>
+        <p:cNvGrpSpPr/>
+        <p:nvPr/>
+      </p:nvGrpSpPr>
+      <p:grpSpPr>
+        <a:xfrm>
+          <a:off x="0" y="0"/>
+          <a:ext cx="0" cy="0"/>
+          <a:chOff x="0" y="0"/>
+          <a:chExt cx="0" cy="0"/>
+        </a:xfrm>
+      </p:grpSpPr>
+      <p:sp>
+        <p:nvSpPr>
+          <p:cNvPr id="7170" name="Rectangle 2"/>
+          <p:cNvSpPr>
+            <a:spLocks noGrp="1" noChangeArrowheads="1"/>
+          </p:cNvSpPr>
+          <p:nvPr>
+            <p:ph type="title"/>
+          </p:nvPr>
+        </p:nvSpPr>
+        <p:spPr>
+          <a:xfrm>
+            <a:off x="0" y="188640"/>
+            <a:ext cx="3959932" cy="764704"/>
+          </a:xfrm>
+        </p:spPr>
+        <p:txBody>
+          <a:bodyPr/>
+          <a:lstStyle/>
+          <a:p>
+            <a:pPr algn="ctr" eaLnBrk="1" hangingPunct="1"/>
+            <a:r>
+              <a:rPr lang="en-US" altLang="en-US" sz="4500" b="1" dirty="0" smtClean="0">
+                <a:solidFill>
+                  <a:schemeClr val="bg1">
+                    <a:lumMod val="10000"/>
+                  </a:schemeClr>
+                </a:solidFill>
+              </a:rPr>
+              <a:t>DIVERSIFIED</a:t>
+            </a:r>
+          </a:p>
+        </p:txBody>
+      </p:sp>
+      <p:sp>
+        <p:nvSpPr>
+          <p:cNvPr id="5" name="TextBox 4"/>
+          <p:cNvSpPr txBox="1"/>
+          <p:nvPr/>
+        </p:nvSpPr>
+        <p:spPr>
+          <a:xfrm>
+            <a:off x="3167844" y="5697252"/>
+            <a:ext cx="2844316" cy="923330"/>
+          </a:xfrm>
+          <a:prstGeom prst="rect">
+            <a:avLst/>
+          </a:prstGeom>
+          <a:noFill/>
+        </p:spPr>
+        <p:txBody>
+          <a:bodyPr wrap="square" rtlCol="0">
+            <a:spAutoFit/>
+          </a:bodyPr>
+          <a:lstStyle/>
+          <a:p>
+            <a:pPr algn="ctr"/>
+            <a:r>
+              <a:rPr lang="en-US" b="1" dirty="0" smtClean="0">
+                <a:solidFill>
+                  <a:schemeClr val="bg1">
+                    <a:lumMod val="10000"/>
+                  </a:schemeClr>
+                </a:solidFill>
+              </a:rPr>
+              <a:t>Monte Carlo Simulation </a:t>
+            </a:r>
+            <a:r>
+              <a:rPr lang="en-US" b="1" i="1" dirty="0" smtClean="0">
+                <a:solidFill>
+                  <a:schemeClr val="bg1">
+                    <a:lumMod val="10000"/>
+                  </a:schemeClr>
+                </a:solidFill>
+              </a:rPr>
+              <a:t>10 Years</a:t>
+            </a:r>
+          </a:p>
+          <a:p>
+            <a:endParaRPr lang="en-US" dirty="0"/>
+          </a:p>
+        </p:txBody>
+      </p:sp>
+      <p:sp>
+        <p:nvSpPr>
+          <p:cNvPr id="11" name="TextBox 10"/>
+          <p:cNvSpPr txBox="1"/>
+          <p:nvPr/>
+        </p:nvSpPr>
+        <p:spPr>
+          <a:xfrm>
+            <a:off x="3815916" y="440668"/>
+            <a:ext cx="5328084" cy="1015663"/>
+          </a:xfrm>
+          <a:prstGeom prst="rect">
+            <a:avLst/>
+          </a:prstGeom>
+          <a:noFill/>
+        </p:spPr>
+        <p:txBody>
+          <a:bodyPr wrap="square" rtlCol="0">
+            <a:spAutoFit/>
+          </a:bodyPr>
+          <a:lstStyle/>
+          <a:p>
+            <a:pPr algn="ctr"/>
+            <a:r>
+              <a:rPr lang="en-US" sz="2000" dirty="0" smtClean="0">
+                <a:solidFill>
+                  <a:schemeClr val="bg1">
+                    <a:lumMod val="10000"/>
+                  </a:schemeClr>
+                </a:solidFill>
+              </a:rPr>
+              <a:t>•  VOO  •  MSFT  •  AAPL  •  BND  •  AMT  •</a:t>
+            </a:r>
+          </a:p>
+          <a:p>
+            <a:pPr algn="ctr"/>
+            <a:r>
+              <a:rPr lang="en-US" sz="2000" dirty="0" smtClean="0">
+                <a:solidFill>
+                  <a:schemeClr val="bg1">
+                    <a:lumMod val="10000"/>
+                  </a:schemeClr>
+                </a:solidFill>
+              </a:rPr>
+              <a:t>•  VUG  •  TSLA  •  AMZN  •  EDV  •  PLD  •</a:t>
+            </a:r>
+          </a:p>
+          <a:p>
+            <a:endParaRPr lang="en-US" sz="2000" dirty="0">
+              <a:solidFill>
+                <a:schemeClr val="bg1">
+                  <a:lumMod val="10000"/>
+                </a:schemeClr>
+              </a:solidFill>
+            </a:endParaRPr>
+          </a:p>
+        </p:txBody>
+      </p:sp>
+      <p:pic>
+        <p:nvPicPr>
+          <p:cNvPr id="62466" name="Picture 2" descr="mc_10_cum_return_dist_diversified.png"/>
+          <p:cNvPicPr>
+            <a:picLocks noChangeAspect="1" noChangeArrowheads="1"/>
+          </p:cNvPicPr>
+          <p:nvPr/>
+        </p:nvPicPr>
+        <p:blipFill>
+          <a:blip r:embed="rId3" cstate="print"/>
+          <a:srcRect/>
+          <a:stretch>
+            <a:fillRect/>
+          </a:stretch>
+        </p:blipFill>
+        <p:spPr bwMode="auto">
+          <a:xfrm>
+            <a:off x="1472184" y="1664208"/>
+            <a:ext cx="6200775" cy="3771900"/>
+          </a:xfrm>
+          <a:prstGeom prst="rect">
+            <a:avLst/>
+          </a:prstGeom>
+          <a:noFill/>
+        </p:spPr>
+      </p:pic>
+    </p:spTree>
+  </p:cSld>
+  <p:clrMapOvr>
+    <a:masterClrMapping/>
+  </p:clrMapOvr>
+  <p:transition>
+    <p:wipe dir="r"/>
+  </p:transition>
+  <p:timing>
+    <p:tnLst>
+      <p:par>
+        <p:cTn id="1" dur="indefinite" restart="never" nodeType="tmRoot"/>
+      </p:par>
+    </p:tnLst>
+  </p:timing>
+</p:sld>
+</file>
+
+<file path=ppt/slides/slide13.xml><?xml version="1.0" encoding="utf-8"?>
+<p:sld xmlns:a="http://schemas.openxmlformats.org/drawingml/2006/main" xmlns:r="http://schemas.openxmlformats.org/officeDocument/2006/relationships" xmlns:p="http://schemas.openxmlformats.org/presentationml/2006/main">
+  <p:cSld>
+    <p:spTree>
+      <p:nvGrpSpPr>
+        <p:cNvPr id="1" name=""/>
+        <p:cNvGrpSpPr/>
+        <p:nvPr/>
+      </p:nvGrpSpPr>
+      <p:grpSpPr>
+        <a:xfrm>
+          <a:off x="0" y="0"/>
+          <a:ext cx="0" cy="0"/>
+          <a:chOff x="0" y="0"/>
+          <a:chExt cx="0" cy="0"/>
+        </a:xfrm>
+      </p:grpSpPr>
+      <p:sp>
+        <p:nvSpPr>
           <p:cNvPr id="6" name="Title 5"/>
           <p:cNvSpPr>
             <a:spLocks noGrp="1"/>
@@ -7300,7 +7894,7 @@
                   </a:schemeClr>
                 </a:solidFill>
               </a:rPr>
-              <a:t>$ QUANTIFIED $</a:t>
+              <a:t>QUANTIFIED</a:t>
             </a:r>
             <a:endParaRPr lang="en-US" sz="4200" b="1" dirty="0">
               <a:solidFill>
@@ -7340,7 +7934,27 @@
                   </a:schemeClr>
                 </a:solidFill>
               </a:rPr>
-              <a:t>What are the expected returns after 10 years?</a:t>
+              <a:t>What are the expected returns </a:t>
+            </a:r>
+            <a:r>
+              <a:rPr lang="en-US" sz="2200" dirty="0" smtClean="0">
+                <a:solidFill>
+                  <a:schemeClr val="bg1">
+                    <a:lumMod val="10000"/>
+                  </a:schemeClr>
+                </a:solidFill>
+              </a:rPr>
+              <a:t>in </a:t>
+            </a:r>
+            <a:r>
+              <a:rPr lang="en-US" sz="2200" dirty="0" smtClean="0">
+                <a:solidFill>
+                  <a:schemeClr val="bg1">
+                    <a:lumMod val="10000"/>
+                  </a:schemeClr>
+                </a:solidFill>
+              </a:rPr>
+              <a:t>10 years?</a:t>
             </a:r>
           </a:p>
           <a:p>
@@ -8540,456 +9154,6 @@
 </p:sld>
 </file>
 
-<file path=ppt/slides/slide11.xml><?xml version="1.0" encoding="utf-8"?>
-<p:sld xmlns:a="http://schemas.openxmlformats.org/drawingml/2006/main" xmlns:r="http://schemas.openxmlformats.org/officeDocument/2006/relationships" xmlns:p="http://schemas.openxmlformats.org/presentationml/2006/main">
-  <p:cSld>
-    <p:spTree>
-      <p:nvGrpSpPr>
-        <p:cNvPr id="1" name=""/>
-        <p:cNvGrpSpPr/>
-        <p:nvPr/>
-      </p:nvGrpSpPr>
-      <p:grpSpPr>
-        <a:xfrm>
-          <a:off x="0" y="0"/>
-          <a:ext cx="0" cy="0"/>
-          <a:chOff x="0" y="0"/>
-          <a:chExt cx="0" cy="0"/>
-        </a:xfrm>
-      </p:grpSpPr>
-      <p:sp>
-        <p:nvSpPr>
-          <p:cNvPr id="6" name="Title 5"/>
-          <p:cNvSpPr>
-            <a:spLocks noGrp="1"/>
-          </p:cNvSpPr>
-          <p:nvPr>
-            <p:ph type="title"/>
-          </p:nvPr>
-        </p:nvSpPr>
-        <p:spPr>
-          <a:xfrm>
-            <a:off x="359532" y="188640"/>
-            <a:ext cx="8110538" cy="792162"/>
-          </a:xfrm>
-        </p:spPr>
-        <p:txBody>
-          <a:bodyPr/>
-          <a:lstStyle/>
-          <a:p>
-            <a:pPr algn="ctr"/>
-            <a:r>
-              <a:rPr lang="en-US" sz="4200" b="1" dirty="0" smtClean="0">
-                <a:solidFill>
-                  <a:schemeClr val="bg1">
-                    <a:lumMod val="10000"/>
-                  </a:schemeClr>
-                </a:solidFill>
-              </a:rPr>
-              <a:t>TEST # 2</a:t>
-            </a:r>
-            <a:endParaRPr lang="en-US" sz="4200" b="1" dirty="0">
-              <a:solidFill>
-                <a:schemeClr val="bg1">
-                  <a:lumMod val="10000"/>
-                </a:schemeClr>
-              </a:solidFill>
-            </a:endParaRPr>
-          </a:p>
-        </p:txBody>
-      </p:sp>
-      <p:sp>
-        <p:nvSpPr>
-          <p:cNvPr id="7" name="Content Placeholder 6"/>
-          <p:cNvSpPr>
-            <a:spLocks noGrp="1"/>
-          </p:cNvSpPr>
-          <p:nvPr>
-            <p:ph idx="1"/>
-          </p:nvPr>
-        </p:nvSpPr>
-        <p:spPr>
-          <a:xfrm>
-            <a:off x="1835696" y="3176972"/>
-            <a:ext cx="4824536" cy="936104"/>
-          </a:xfrm>
-        </p:spPr>
-        <p:txBody>
-          <a:bodyPr/>
-          <a:lstStyle/>
-          <a:p>
-            <a:r>
-              <a:rPr lang="en-US" sz="2200" dirty="0" smtClean="0">
-                <a:solidFill>
-                  <a:schemeClr val="bg1">
-                    <a:lumMod val="10000"/>
-                  </a:schemeClr>
-                </a:solidFill>
-              </a:rPr>
-              <a:t>Average Annualized Returns</a:t>
-            </a:r>
-          </a:p>
-          <a:p>
-            <a:r>
-              <a:rPr lang="en-US" sz="2200" dirty="0" smtClean="0">
-                <a:solidFill>
-                  <a:schemeClr val="bg1">
-                    <a:lumMod val="10000"/>
-                  </a:schemeClr>
-                </a:solidFill>
-              </a:rPr>
-              <a:t>Cumulative Returns</a:t>
-            </a:r>
-            <a:endParaRPr lang="en-US" sz="2200" dirty="0">
-              <a:solidFill>
-                <a:schemeClr val="bg1">
-                  <a:lumMod val="10000"/>
-                </a:schemeClr>
-              </a:solidFill>
-            </a:endParaRPr>
-          </a:p>
-        </p:txBody>
-      </p:sp>
-      <p:sp>
-        <p:nvSpPr>
-          <p:cNvPr id="9" name="TextBox 8"/>
-          <p:cNvSpPr txBox="1"/>
-          <p:nvPr/>
-        </p:nvSpPr>
-        <p:spPr>
-          <a:xfrm>
-            <a:off x="1367644" y="2024844"/>
-            <a:ext cx="6768752" cy="677108"/>
-          </a:xfrm>
-          <a:prstGeom prst="rect">
-            <a:avLst/>
-          </a:prstGeom>
-          <a:noFill/>
-        </p:spPr>
-        <p:txBody>
-          <a:bodyPr wrap="square" rtlCol="0">
-            <a:spAutoFit/>
-          </a:bodyPr>
-          <a:lstStyle/>
-          <a:p>
-            <a:r>
-              <a:rPr lang="en-US" sz="3800" dirty="0" smtClean="0">
-                <a:solidFill>
-                  <a:schemeClr val="bg1">
-                    <a:lumMod val="10000"/>
-                  </a:schemeClr>
-                </a:solidFill>
-              </a:rPr>
-              <a:t>Historical Returns Comparison</a:t>
-            </a:r>
-            <a:endParaRPr lang="en-US" sz="3800" dirty="0">
-              <a:solidFill>
-                <a:schemeClr val="bg1">
-                  <a:lumMod val="10000"/>
-                </a:schemeClr>
-              </a:solidFill>
-            </a:endParaRPr>
-          </a:p>
-        </p:txBody>
-      </p:sp>
-    </p:spTree>
-  </p:cSld>
-  <p:clrMapOvr>
-    <a:masterClrMapping/>
-  </p:clrMapOvr>
-  <p:transition>
-    <p:wipe dir="r"/>
-  </p:transition>
-  <p:timing>
-    <p:tnLst>
-      <p:par>
-        <p:cTn id="1" dur="indefinite" restart="never" nodeType="tmRoot"/>
-      </p:par>
-    </p:tnLst>
-  </p:timing>
-</p:sld>
-</file>
-
-<file path=ppt/slides/slide12.xml><?xml version="1.0" encoding="utf-8"?>
-<p:sld xmlns:a="http://schemas.openxmlformats.org/drawingml/2006/main" xmlns:r="http://schemas.openxmlformats.org/officeDocument/2006/relationships" xmlns:p="http://schemas.openxmlformats.org/presentationml/2006/main">
-  <p:cSld>
-    <p:spTree>
-      <p:nvGrpSpPr>
-        <p:cNvPr id="1" name=""/>
-        <p:cNvGrpSpPr/>
-        <p:nvPr/>
-      </p:nvGrpSpPr>
-      <p:grpSpPr>
-        <a:xfrm>
-          <a:off x="0" y="0"/>
-          <a:ext cx="0" cy="0"/>
-          <a:chOff x="0" y="0"/>
-          <a:chExt cx="0" cy="0"/>
-        </a:xfrm>
-      </p:grpSpPr>
-      <p:sp>
-        <p:nvSpPr>
-          <p:cNvPr id="7170" name="Rectangle 2"/>
-          <p:cNvSpPr>
-            <a:spLocks noGrp="1" noChangeArrowheads="1"/>
-          </p:cNvSpPr>
-          <p:nvPr>
-            <p:ph type="title"/>
-          </p:nvPr>
-        </p:nvSpPr>
-        <p:spPr>
-          <a:xfrm>
-            <a:off x="0" y="0"/>
-            <a:ext cx="7020780" cy="764704"/>
-          </a:xfrm>
-        </p:spPr>
-        <p:txBody>
-          <a:bodyPr/>
-          <a:lstStyle/>
-          <a:p>
-            <a:pPr eaLnBrk="1" hangingPunct="1"/>
-            <a:r>
-              <a:rPr lang="en-US" altLang="en-US" sz="4200" b="1" dirty="0" smtClean="0">
-                <a:solidFill>
-                  <a:schemeClr val="bg1">
-                    <a:lumMod val="10000"/>
-                  </a:schemeClr>
-                </a:solidFill>
-              </a:rPr>
-              <a:t>ANNUALIZED RETURNS</a:t>
-            </a:r>
-          </a:p>
-        </p:txBody>
-      </p:sp>
-      <p:sp>
-        <p:nvSpPr>
-          <p:cNvPr id="11" name="TextBox 10"/>
-          <p:cNvSpPr txBox="1"/>
-          <p:nvPr/>
-        </p:nvSpPr>
-        <p:spPr>
-          <a:xfrm>
-            <a:off x="4319464" y="764704"/>
-            <a:ext cx="4824536" cy="738664"/>
-          </a:xfrm>
-          <a:prstGeom prst="rect">
-            <a:avLst/>
-          </a:prstGeom>
-          <a:noFill/>
-        </p:spPr>
-        <p:txBody>
-          <a:bodyPr wrap="square" rtlCol="0">
-            <a:spAutoFit/>
-          </a:bodyPr>
-          <a:lstStyle/>
-          <a:p>
-            <a:pPr algn="ctr"/>
-            <a:r>
-              <a:rPr lang="en-US" sz="2200" dirty="0" smtClean="0">
-                <a:solidFill>
-                  <a:schemeClr val="bg1">
-                    <a:lumMod val="10000"/>
-                  </a:schemeClr>
-                </a:solidFill>
-              </a:rPr>
-              <a:t>•  Comparison Across Portfolios  •</a:t>
-            </a:r>
-          </a:p>
-          <a:p>
-            <a:endParaRPr lang="en-US" sz="2000" dirty="0">
-              <a:solidFill>
-                <a:schemeClr val="bg1">
-                  <a:lumMod val="10000"/>
-                </a:schemeClr>
-              </a:solidFill>
-            </a:endParaRPr>
-          </a:p>
-        </p:txBody>
-      </p:sp>
-      <p:pic>
-        <p:nvPicPr>
-          <p:cNvPr id="64514" name="Picture 2" descr="historical_avg_annual_return_consolidated.png"/>
-          <p:cNvPicPr>
-            <a:picLocks noChangeAspect="1" noChangeArrowheads="1"/>
-          </p:cNvPicPr>
-          <p:nvPr/>
-        </p:nvPicPr>
-        <p:blipFill>
-          <a:blip r:embed="rId3" cstate="print"/>
-          <a:srcRect/>
-          <a:stretch>
-            <a:fillRect/>
-          </a:stretch>
-        </p:blipFill>
-        <p:spPr bwMode="auto">
-          <a:xfrm>
-            <a:off x="287524" y="1563624"/>
-            <a:ext cx="8579765" cy="5229982"/>
-          </a:xfrm>
-          <a:prstGeom prst="rect">
-            <a:avLst/>
-          </a:prstGeom>
-          <a:noFill/>
-        </p:spPr>
-      </p:pic>
-    </p:spTree>
-  </p:cSld>
-  <p:clrMapOvr>
-    <a:masterClrMapping/>
-  </p:clrMapOvr>
-  <p:transition>
-    <p:wipe dir="r"/>
-  </p:transition>
-  <p:timing>
-    <p:tnLst>
-      <p:par>
-        <p:cTn id="1" dur="indefinite" restart="never" nodeType="tmRoot"/>
-      </p:par>
-    </p:tnLst>
-  </p:timing>
-</p:sld>
-</file>
-
-<file path=ppt/slides/slide13.xml><?xml version="1.0" encoding="utf-8"?>
-<p:sld xmlns:a="http://schemas.openxmlformats.org/drawingml/2006/main" xmlns:r="http://schemas.openxmlformats.org/officeDocument/2006/relationships" xmlns:p="http://schemas.openxmlformats.org/presentationml/2006/main">
-  <p:cSld>
-    <p:spTree>
-      <p:nvGrpSpPr>
-        <p:cNvPr id="1" name=""/>
-        <p:cNvGrpSpPr/>
-        <p:nvPr/>
-      </p:nvGrpSpPr>
-      <p:grpSpPr>
-        <a:xfrm>
-          <a:off x="0" y="0"/>
-          <a:ext cx="0" cy="0"/>
-          <a:chOff x="0" y="0"/>
-          <a:chExt cx="0" cy="0"/>
-        </a:xfrm>
-      </p:grpSpPr>
-      <p:sp>
-        <p:nvSpPr>
-          <p:cNvPr id="7170" name="Rectangle 2"/>
-          <p:cNvSpPr>
-            <a:spLocks noGrp="1" noChangeArrowheads="1"/>
-          </p:cNvSpPr>
-          <p:nvPr>
-            <p:ph type="title"/>
-          </p:nvPr>
-        </p:nvSpPr>
-        <p:spPr>
-          <a:xfrm>
-            <a:off x="0" y="0"/>
-            <a:ext cx="7020780" cy="764704"/>
-          </a:xfrm>
-        </p:spPr>
-        <p:txBody>
-          <a:bodyPr/>
-          <a:lstStyle/>
-          <a:p>
-            <a:pPr eaLnBrk="1" hangingPunct="1"/>
-            <a:r>
-              <a:rPr lang="en-US" altLang="en-US" sz="4200" b="1" dirty="0" smtClean="0">
-                <a:solidFill>
-                  <a:schemeClr val="bg1">
-                    <a:lumMod val="10000"/>
-                  </a:schemeClr>
-                </a:solidFill>
-              </a:rPr>
-              <a:t>CUMULATIVE RETURNS</a:t>
-            </a:r>
-          </a:p>
-        </p:txBody>
-      </p:sp>
-      <p:sp>
-        <p:nvSpPr>
-          <p:cNvPr id="11" name="TextBox 10"/>
-          <p:cNvSpPr txBox="1"/>
-          <p:nvPr/>
-        </p:nvSpPr>
-        <p:spPr>
-          <a:xfrm>
-            <a:off x="4319464" y="764704"/>
-            <a:ext cx="4824536" cy="738664"/>
-          </a:xfrm>
-          <a:prstGeom prst="rect">
-            <a:avLst/>
-          </a:prstGeom>
-          <a:noFill/>
-        </p:spPr>
-        <p:txBody>
-          <a:bodyPr wrap="square" rtlCol="0">
-            <a:spAutoFit/>
-          </a:bodyPr>
-          <a:lstStyle/>
-          <a:p>
-            <a:pPr algn="ctr"/>
-            <a:r>
-              <a:rPr lang="en-US" sz="2200" dirty="0" smtClean="0">
-                <a:solidFill>
-                  <a:schemeClr val="bg1">
-                    <a:lumMod val="10000"/>
-                  </a:schemeClr>
-                </a:solidFill>
-              </a:rPr>
-              <a:t>•  Comparison Across Portfolios  •</a:t>
-            </a:r>
-          </a:p>
-          <a:p>
-            <a:endParaRPr lang="en-US" sz="2000" dirty="0">
-              <a:solidFill>
-                <a:schemeClr val="bg1">
-                  <a:lumMod val="10000"/>
-                </a:schemeClr>
-              </a:solidFill>
-            </a:endParaRPr>
-          </a:p>
-        </p:txBody>
-      </p:sp>
-      <p:pic>
-        <p:nvPicPr>
-          <p:cNvPr id="66562" name="Picture 2" descr="consolidated_cumulative_returns.png"/>
-          <p:cNvPicPr>
-            <a:picLocks noChangeAspect="1" noChangeArrowheads="1"/>
-          </p:cNvPicPr>
-          <p:nvPr/>
-        </p:nvPicPr>
-        <p:blipFill>
-          <a:blip r:embed="rId3" cstate="print"/>
-          <a:srcRect/>
-          <a:stretch>
-            <a:fillRect/>
-          </a:stretch>
-        </p:blipFill>
-        <p:spPr bwMode="auto">
-          <a:xfrm>
-            <a:off x="283464" y="1563624"/>
-            <a:ext cx="8577072" cy="4651390"/>
-          </a:xfrm>
-          <a:prstGeom prst="rect">
-            <a:avLst/>
-          </a:prstGeom>
-          <a:noFill/>
-        </p:spPr>
-      </p:pic>
-    </p:spTree>
-  </p:cSld>
-  <p:clrMapOvr>
-    <a:masterClrMapping/>
-  </p:clrMapOvr>
-  <p:transition>
-    <p:wipe dir="r"/>
-  </p:transition>
-  <p:timing>
-    <p:tnLst>
-      <p:par>
-        <p:cTn id="1" dur="indefinite" restart="never" nodeType="tmRoot"/>
-      </p:par>
-    </p:tnLst>
-  </p:timing>
-</p:sld>
-</file>
-
 <file path=ppt/slides/slide14.xml><?xml version="1.0" encoding="utf-8"?>
 <p:sld xmlns:a="http://schemas.openxmlformats.org/drawingml/2006/main" xmlns:r="http://schemas.openxmlformats.org/officeDocument/2006/relationships" xmlns:p="http://schemas.openxmlformats.org/presentationml/2006/main">
   <p:cSld>
@@ -9019,7 +9183,7 @@
         </p:nvSpPr>
         <p:spPr>
           <a:xfrm>
-            <a:off x="287524" y="188640"/>
+            <a:off x="431540" y="188640"/>
             <a:ext cx="8110538" cy="792162"/>
           </a:xfrm>
         </p:spPr>
@@ -9036,7 +9200,7 @@
                   </a:schemeClr>
                 </a:solidFill>
               </a:rPr>
-              <a:t>TEST # 3</a:t>
+              <a:t>WHAT ABOUT RISK?</a:t>
             </a:r>
             <a:endParaRPr lang="en-US" sz="4200" b="1" dirty="0">
               <a:solidFill>
@@ -9299,7 +9463,7 @@
           <p:nvPr/>
         </p:nvGraphicFramePr>
         <p:xfrm>
-          <a:off x="575556" y="5697252"/>
+          <a:off x="683568" y="5625244"/>
           <a:ext cx="7668852" cy="972108"/>
         </p:xfrm>
         <a:graphic>
@@ -9646,7 +9810,7 @@
                     <a:bodyPr/>
                     <a:lstStyle/>
                     <a:p>
-                      <a:pPr algn="r" fontAlgn="ctr"/>
+                      <a:pPr algn="ctr" fontAlgn="ctr"/>
                       <a:r>
                         <a:rPr lang="en-US" sz="1200" b="0" i="0" u="none" strike="noStrike" dirty="0">
                           <a:solidFill>
@@ -9654,8 +9818,41 @@
                           </a:solidFill>
                           <a:latin typeface="Arial"/>
                         </a:rPr>
-                        <a:t>Annual Avg Return</a:t>
+                        <a:t>Annual </a:t>
                       </a:r>
+                      <a:r>
+                        <a:rPr lang="en-US" sz="1200" b="0" i="0" u="none" strike="noStrike" dirty="0" err="1">
+                          <a:solidFill>
+                            <a:srgbClr val="BB0000"/>
+                          </a:solidFill>
+                          <a:latin typeface="Arial"/>
+                        </a:rPr>
+                        <a:t>Avg</a:t>
+                      </a:r>
+                      <a:r>
+                        <a:rPr lang="en-US" sz="1200" b="0" i="0" u="none" strike="noStrike" dirty="0">
+                          <a:solidFill>
+                            <a:srgbClr val="BB0000"/>
+                          </a:solidFill>
+                          <a:latin typeface="Arial"/>
+                        </a:rPr>
+                        <a:t> </a:t>
+                      </a:r>
+                      <a:r>
+                        <a:rPr lang="en-US" sz="1200" b="0" i="0" u="none" strike="noStrike" dirty="0" smtClean="0">
+                          <a:solidFill>
+                            <a:srgbClr val="BB0000"/>
+                          </a:solidFill>
+                          <a:latin typeface="Arial"/>
+                        </a:rPr>
+                        <a:t>Return   </a:t>
+                      </a:r>
+                      <a:endParaRPr lang="en-US" sz="1200" b="0" i="0" u="none" strike="noStrike" dirty="0">
+                        <a:solidFill>
+                          <a:srgbClr val="BB0000"/>
+                        </a:solidFill>
+                        <a:latin typeface="Arial"/>
+                      </a:endParaRPr>
                     </a:p>
                   </a:txBody>
                   <a:tcPr marL="7483" marR="7483" marT="7483" marB="0" anchor="ctr">
@@ -10029,7 +10226,7 @@
                     <a:bodyPr/>
                     <a:lstStyle/>
                     <a:p>
-                      <a:pPr algn="r" fontAlgn="ctr"/>
+                      <a:pPr algn="ctr" fontAlgn="ctr"/>
                       <a:r>
                         <a:rPr lang="en-US" sz="1200" b="0" i="0" u="none" strike="noStrike" dirty="0">
                           <a:solidFill>
@@ -10365,6 +10562,280 @@
 </p:sld>
 </file>
 
+<file path=ppt/slides/slide16.xml><?xml version="1.0" encoding="utf-8"?>
+<p:sld xmlns:a="http://schemas.openxmlformats.org/drawingml/2006/main" xmlns:r="http://schemas.openxmlformats.org/officeDocument/2006/relationships" xmlns:p="http://schemas.openxmlformats.org/presentationml/2006/main">
+  <p:cSld>
+    <p:spTree>
+      <p:nvGrpSpPr>
+        <p:cNvPr id="1" name=""/>
+        <p:cNvGrpSpPr/>
+        <p:nvPr/>
+      </p:nvGrpSpPr>
+      <p:grpSpPr>
+        <a:xfrm>
+          <a:off x="0" y="0"/>
+          <a:ext cx="0" cy="0"/>
+          <a:chOff x="0" y="0"/>
+          <a:chExt cx="0" cy="0"/>
+        </a:xfrm>
+      </p:grpSpPr>
+      <p:sp>
+        <p:nvSpPr>
+          <p:cNvPr id="6" name="Title 5"/>
+          <p:cNvSpPr>
+            <a:spLocks noGrp="1"/>
+          </p:cNvSpPr>
+          <p:nvPr>
+            <p:ph type="title"/>
+          </p:nvPr>
+        </p:nvSpPr>
+        <p:spPr/>
+        <p:txBody>
+          <a:bodyPr/>
+          <a:lstStyle/>
+          <a:p>
+            <a:pPr algn="ctr"/>
+            <a:r>
+              <a:rPr lang="en-US" sz="4200" b="1" dirty="0" smtClean="0">
+                <a:solidFill>
+                  <a:schemeClr val="bg1">
+                    <a:lumMod val="10000"/>
+                  </a:schemeClr>
+                </a:solidFill>
+              </a:rPr>
+              <a:t>THE </a:t>
+            </a:r>
+            <a:r>
+              <a:rPr lang="en-US" sz="4200" b="1" dirty="0" smtClean="0">
+                <a:solidFill>
+                  <a:schemeClr val="bg1">
+                    <a:lumMod val="10000"/>
+                  </a:schemeClr>
+                </a:solidFill>
+              </a:rPr>
+              <a:t>CHAMP</a:t>
+            </a:r>
+            <a:endParaRPr lang="en-US" sz="4200" b="1" dirty="0">
+              <a:solidFill>
+                <a:schemeClr val="bg1">
+                  <a:lumMod val="10000"/>
+                </a:schemeClr>
+              </a:solidFill>
+            </a:endParaRPr>
+          </a:p>
+        </p:txBody>
+      </p:sp>
+      <p:sp>
+        <p:nvSpPr>
+          <p:cNvPr id="7" name="Content Placeholder 6"/>
+          <p:cNvSpPr>
+            <a:spLocks noGrp="1"/>
+          </p:cNvSpPr>
+          <p:nvPr>
+            <p:ph idx="1"/>
+          </p:nvPr>
+        </p:nvSpPr>
+        <p:spPr>
+          <a:xfrm>
+            <a:off x="5580112" y="3681028"/>
+            <a:ext cx="2988332" cy="2628292"/>
+          </a:xfrm>
+        </p:spPr>
+        <p:txBody>
+          <a:bodyPr/>
+          <a:lstStyle/>
+          <a:p>
+            <a:r>
+              <a:rPr lang="en-US" sz="2600" dirty="0" smtClean="0">
+                <a:solidFill>
+                  <a:schemeClr val="bg1">
+                    <a:lumMod val="10000"/>
+                  </a:schemeClr>
+                </a:solidFill>
+              </a:rPr>
+              <a:t>Bonds</a:t>
+            </a:r>
+          </a:p>
+          <a:p>
+            <a:r>
+              <a:rPr lang="en-US" sz="2600" dirty="0" smtClean="0">
+                <a:solidFill>
+                  <a:schemeClr val="bg1">
+                    <a:lumMod val="10000"/>
+                  </a:schemeClr>
+                </a:solidFill>
+              </a:rPr>
+              <a:t>ETF</a:t>
+            </a:r>
+          </a:p>
+          <a:p>
+            <a:r>
+              <a:rPr lang="en-US" sz="2600" dirty="0" smtClean="0">
+                <a:solidFill>
+                  <a:schemeClr val="bg1">
+                    <a:lumMod val="10000"/>
+                  </a:schemeClr>
+                </a:solidFill>
+              </a:rPr>
+              <a:t>Real Estate</a:t>
+            </a:r>
+          </a:p>
+          <a:p>
+            <a:r>
+              <a:rPr lang="en-US" sz="2600" dirty="0" smtClean="0">
+                <a:solidFill>
+                  <a:schemeClr val="bg1">
+                    <a:lumMod val="10000"/>
+                  </a:schemeClr>
+                </a:solidFill>
+              </a:rPr>
+              <a:t>Stocks</a:t>
+            </a:r>
+          </a:p>
+          <a:p>
+            <a:r>
+              <a:rPr lang="en-US" sz="2600" dirty="0" smtClean="0">
+                <a:solidFill>
+                  <a:schemeClr val="bg1">
+                    <a:lumMod val="10000"/>
+                  </a:schemeClr>
+                </a:solidFill>
+              </a:rPr>
+              <a:t>Cryptocurrency</a:t>
+            </a:r>
+          </a:p>
+          <a:p>
+            <a:pPr algn="r">
+              <a:buNone/>
+            </a:pPr>
+            <a:endParaRPr lang="en-US" dirty="0"/>
+          </a:p>
+        </p:txBody>
+      </p:sp>
+      <p:sp>
+        <p:nvSpPr>
+          <p:cNvPr id="8" name="TextBox 7"/>
+          <p:cNvSpPr txBox="1"/>
+          <p:nvPr/>
+        </p:nvSpPr>
+        <p:spPr>
+          <a:xfrm>
+            <a:off x="3923928" y="2636912"/>
+            <a:ext cx="1440160" cy="1092607"/>
+          </a:xfrm>
+          <a:prstGeom prst="rect">
+            <a:avLst/>
+          </a:prstGeom>
+          <a:noFill/>
+        </p:spPr>
+        <p:txBody>
+          <a:bodyPr wrap="square" rtlCol="0">
+            <a:spAutoFit/>
+          </a:bodyPr>
+          <a:lstStyle/>
+          <a:p>
+            <a:r>
+              <a:rPr lang="en-US" sz="6500" dirty="0" smtClean="0">
+                <a:solidFill>
+                  <a:srgbClr val="FF0000"/>
+                </a:solidFill>
+              </a:rPr>
+              <a:t>vs.</a:t>
+            </a:r>
+            <a:endParaRPr lang="en-US" sz="6500" dirty="0">
+              <a:solidFill>
+                <a:srgbClr val="FF0000"/>
+              </a:solidFill>
+            </a:endParaRPr>
+          </a:p>
+        </p:txBody>
+      </p:sp>
+      <p:sp>
+        <p:nvSpPr>
+          <p:cNvPr id="9" name="TextBox 8"/>
+          <p:cNvSpPr txBox="1"/>
+          <p:nvPr/>
+        </p:nvSpPr>
+        <p:spPr>
+          <a:xfrm>
+            <a:off x="1115616" y="2096852"/>
+            <a:ext cx="2700300" cy="677108"/>
+          </a:xfrm>
+          <a:prstGeom prst="rect">
+            <a:avLst/>
+          </a:prstGeom>
+          <a:noFill/>
+        </p:spPr>
+        <p:txBody>
+          <a:bodyPr wrap="square" rtlCol="0">
+            <a:spAutoFit/>
+          </a:bodyPr>
+          <a:lstStyle/>
+          <a:p>
+            <a:r>
+              <a:rPr lang="en-US" sz="3800" dirty="0" smtClean="0">
+                <a:solidFill>
+                  <a:schemeClr val="bg1">
+                    <a:lumMod val="10000"/>
+                  </a:schemeClr>
+                </a:solidFill>
+              </a:rPr>
+              <a:t>Diversified</a:t>
+            </a:r>
+            <a:endParaRPr lang="en-US" sz="3800" dirty="0">
+              <a:solidFill>
+                <a:schemeClr val="bg1">
+                  <a:lumMod val="10000"/>
+                </a:schemeClr>
+              </a:solidFill>
+            </a:endParaRPr>
+          </a:p>
+        </p:txBody>
+      </p:sp>
+      <p:pic>
+        <p:nvPicPr>
+          <p:cNvPr id="1026" name="Picture 2" descr="C:\Users\Owner\AppData\Local\Microsoft\Windows\INetCache\IE\8GV2DLMX\1200px-Heraldic_eastern_crown.svg[1].png"/>
+          <p:cNvPicPr>
+            <a:picLocks noChangeAspect="1" noChangeArrowheads="1"/>
+          </p:cNvPicPr>
+          <p:nvPr/>
+        </p:nvPicPr>
+        <p:blipFill>
+          <a:blip r:embed="rId2" cstate="print"/>
+          <a:srcRect/>
+          <a:stretch>
+            <a:fillRect/>
+          </a:stretch>
+        </p:blipFill>
+        <p:spPr bwMode="auto">
+          <a:xfrm>
+            <a:off x="1655676" y="1268760"/>
+            <a:ext cx="1240905" cy="898622"/>
+          </a:xfrm>
+          <a:prstGeom prst="rect">
+            <a:avLst/>
+          </a:prstGeom>
+          <a:noFill/>
+        </p:spPr>
+      </p:pic>
+    </p:spTree>
+  </p:cSld>
+  <p:clrMapOvr>
+    <a:masterClrMapping/>
+  </p:clrMapOvr>
+  <p:transition>
+    <p:wipe dir="r"/>
+  </p:transition>
+  <p:timing>
+    <p:tnLst>
+      <p:par>
+        <p:cTn id="1" dur="indefinite" restart="never" nodeType="tmRoot"/>
+      </p:par>
+    </p:tnLst>
+  </p:timing>
+</p:sld>
+</file>
+
 <file path=ppt/slides/slide2.xml><?xml version="1.0" encoding="utf-8"?>
 <p:sld xmlns:a="http://schemas.openxmlformats.org/drawingml/2006/main" xmlns:r="http://schemas.openxmlformats.org/officeDocument/2006/relationships" xmlns:p="http://schemas.openxmlformats.org/presentationml/2006/main">
   <p:cSld>
@@ -10630,23 +11101,28 @@
             <p:ph type="title"/>
           </p:nvPr>
         </p:nvSpPr>
-        <p:spPr/>
+        <p:spPr>
+          <a:xfrm>
+            <a:off x="107504" y="116632"/>
+            <a:ext cx="6264696" cy="684076"/>
+          </a:xfrm>
+        </p:spPr>
         <p:txBody>
           <a:bodyPr/>
           <a:lstStyle/>
           <a:p>
             <a:pPr algn="ctr"/>
             <a:r>
-              <a:rPr lang="en-US" sz="4200" b="1" dirty="0" smtClean="0">
+              <a:rPr lang="en-US" b="1" dirty="0" smtClean="0">
                 <a:solidFill>
                   <a:schemeClr val="bg1">
                     <a:lumMod val="10000"/>
                   </a:schemeClr>
                 </a:solidFill>
               </a:rPr>
-              <a:t>TEST # 1</a:t>
-            </a:r>
-            <a:endParaRPr lang="en-US" sz="4200" b="1" dirty="0">
+              <a:t>HISTORICAL ANALYSIS</a:t>
+            </a:r>
+            <a:endParaRPr lang="en-US" b="1" dirty="0">
               <a:solidFill>
                 <a:schemeClr val="bg1">
                   <a:lumMod val="10000"/>
@@ -10668,8 +11144,8 @@
         </p:nvSpPr>
         <p:spPr>
           <a:xfrm>
-            <a:off x="1871700" y="3104964"/>
-            <a:ext cx="6408712" cy="2160240"/>
+            <a:off x="2699792" y="3032956"/>
+            <a:ext cx="3996444" cy="1548172"/>
           </a:xfrm>
         </p:spPr>
         <p:txBody>
@@ -10686,43 +11162,7 @@
               </a:rPr>
               <a:t>Portfolios by Asset Class</a:t>
             </a:r>
-          </a:p>
-          <a:p>
-            <a:r>
-              <a:rPr lang="en-US" sz="2200" dirty="0" smtClean="0">
-                <a:solidFill>
-                  <a:schemeClr val="bg1">
-                    <a:lumMod val="10000"/>
-                  </a:schemeClr>
-                </a:solidFill>
-              </a:rPr>
-              <a:t>Historical data: Jan 1, 2018 – Nov 5, 2021</a:t>
-            </a:r>
-          </a:p>
-          <a:p>
-            <a:r>
-              <a:rPr lang="en-US" sz="2200" dirty="0" smtClean="0">
-                <a:solidFill>
-                  <a:schemeClr val="bg1">
-                    <a:lumMod val="10000"/>
-                  </a:schemeClr>
-                </a:solidFill>
-              </a:rPr>
-              <a:t>10 Year Forecast</a:t>
-            </a:r>
-          </a:p>
-          <a:p>
-            <a:r>
-              <a:rPr lang="en-US" sz="2200" dirty="0" smtClean="0">
-                <a:solidFill>
-                  <a:schemeClr val="bg1">
-                    <a:lumMod val="10000"/>
-                  </a:schemeClr>
-                </a:solidFill>
-              </a:rPr>
-              <a:t>1000 Simulation Analysis</a:t>
-            </a:r>
-            <a:endParaRPr lang="en-US" sz="2200" dirty="0">
+            <a:endParaRPr lang="en-US" sz="2200" dirty="0" smtClean="0">
               <a:solidFill>
                 <a:schemeClr val="bg1">
                   <a:lumMod val="10000"/>
@@ -10730,41 +11170,42 @@
               </a:solidFill>
             </a:endParaRPr>
           </a:p>
-        </p:txBody>
-      </p:sp>
-      <p:sp>
-        <p:nvSpPr>
-          <p:cNvPr id="9" name="TextBox 8"/>
-          <p:cNvSpPr txBox="1"/>
-          <p:nvPr/>
-        </p:nvSpPr>
-        <p:spPr>
-          <a:xfrm>
-            <a:off x="1835696" y="2024844"/>
-            <a:ext cx="5472608" cy="677108"/>
-          </a:xfrm>
-          <a:prstGeom prst="rect">
-            <a:avLst/>
-          </a:prstGeom>
-          <a:noFill/>
-        </p:spPr>
-        <p:txBody>
-          <a:bodyPr wrap="square" rtlCol="0">
-            <a:spAutoFit/>
-          </a:bodyPr>
-          <a:lstStyle/>
-          <a:p>
-            <a:r>
-              <a:rPr lang="en-US" sz="3800" dirty="0" smtClean="0">
+          <a:p>
+            <a:pPr lvl="1"/>
+            <a:r>
+              <a:rPr lang="en-US" sz="1800" dirty="0" smtClean="0">
                 <a:solidFill>
                   <a:schemeClr val="bg1">
                     <a:lumMod val="10000"/>
                   </a:schemeClr>
                 </a:solidFill>
               </a:rPr>
-              <a:t>Monte Carlo Simulations</a:t>
-            </a:r>
-            <a:endParaRPr lang="en-US" sz="3800" dirty="0">
+              <a:t>Cumulative Returns</a:t>
+            </a:r>
+          </a:p>
+          <a:p>
+            <a:pPr lvl="1"/>
+            <a:r>
+              <a:rPr lang="en-US" sz="1800" dirty="0" smtClean="0">
+                <a:solidFill>
+                  <a:schemeClr val="bg1">
+                    <a:lumMod val="10000"/>
+                  </a:schemeClr>
+                </a:solidFill>
+              </a:rPr>
+              <a:t>Average </a:t>
+            </a:r>
+            <a:r>
+              <a:rPr lang="en-US" sz="1800" dirty="0" smtClean="0">
+                <a:solidFill>
+                  <a:schemeClr val="bg1">
+                    <a:lumMod val="10000"/>
+                  </a:schemeClr>
+                </a:solidFill>
+              </a:rPr>
+              <a:t>Annual Returns</a:t>
+            </a:r>
+            <a:endParaRPr lang="en-US" sz="1800" dirty="0">
               <a:solidFill>
                 <a:schemeClr val="bg1">
                   <a:lumMod val="10000"/>
@@ -10774,7 +11215,116 @@
           </a:p>
         </p:txBody>
       </p:sp>
+      <p:sp>
+        <p:nvSpPr>
+          <p:cNvPr id="5" name="TextBox 4"/>
+          <p:cNvSpPr txBox="1"/>
+          <p:nvPr/>
+        </p:nvSpPr>
+        <p:spPr>
+          <a:xfrm>
+            <a:off x="5040052" y="800708"/>
+            <a:ext cx="3888432" cy="738664"/>
+          </a:xfrm>
+          <a:prstGeom prst="rect">
+            <a:avLst/>
+          </a:prstGeom>
+          <a:noFill/>
+        </p:spPr>
+        <p:txBody>
+          <a:bodyPr wrap="square" rtlCol="0">
+            <a:spAutoFit/>
+          </a:bodyPr>
+          <a:lstStyle/>
+          <a:p>
+            <a:pPr algn="ctr"/>
+            <a:r>
+              <a:rPr lang="en-US" sz="2200" dirty="0" smtClean="0">
+                <a:solidFill>
+                  <a:schemeClr val="bg1">
+                    <a:lumMod val="10000"/>
+                  </a:schemeClr>
+                </a:solidFill>
+              </a:rPr>
+              <a:t>•  Jan 1 2018 – Nov 5 </a:t>
+            </a:r>
+            <a:r>
+              <a:rPr lang="en-US" sz="2200" dirty="0" smtClean="0">
+                <a:solidFill>
+                  <a:schemeClr val="bg1">
+                    <a:lumMod val="10000"/>
+                  </a:schemeClr>
+                </a:solidFill>
+              </a:rPr>
+              <a:t>2021  •</a:t>
+            </a:r>
+            <a:endParaRPr lang="en-US" sz="2200" dirty="0" smtClean="0">
+              <a:solidFill>
+                <a:schemeClr val="bg1">
+                  <a:lumMod val="10000"/>
+                </a:schemeClr>
+              </a:solidFill>
+            </a:endParaRPr>
+          </a:p>
+          <a:p>
+            <a:endParaRPr lang="en-US" sz="2000" dirty="0">
+              <a:solidFill>
+                <a:schemeClr val="bg1">
+                  <a:lumMod val="10000"/>
+                </a:schemeClr>
+              </a:solidFill>
+            </a:endParaRPr>
+          </a:p>
+        </p:txBody>
+      </p:sp>
+      <p:sp>
+        <p:nvSpPr>
+          <p:cNvPr id="8" name="TextBox 7"/>
+          <p:cNvSpPr txBox="1"/>
+          <p:nvPr/>
+        </p:nvSpPr>
+        <p:spPr>
+          <a:xfrm>
+            <a:off x="3455876" y="1952836"/>
+            <a:ext cx="1836204" cy="646331"/>
+          </a:xfrm>
+          <a:prstGeom prst="rect">
+            <a:avLst/>
+          </a:prstGeom>
+          <a:noFill/>
+        </p:spPr>
+        <p:txBody>
+          <a:bodyPr wrap="square" rtlCol="0">
+            <a:spAutoFit/>
+          </a:bodyPr>
+          <a:lstStyle/>
+          <a:p>
+            <a:r>
+              <a:rPr lang="en-US" sz="3600" dirty="0" smtClean="0">
+                <a:solidFill>
+                  <a:schemeClr val="bg1">
+                    <a:lumMod val="10000"/>
+                  </a:schemeClr>
+                </a:solidFill>
+              </a:rPr>
+              <a:t>Returns</a:t>
+            </a:r>
+            <a:endParaRPr lang="en-US" sz="3600" dirty="0">
+              <a:solidFill>
+                <a:schemeClr val="bg1">
+                  <a:lumMod val="10000"/>
+                </a:schemeClr>
+              </a:solidFill>
+            </a:endParaRPr>
+          </a:p>
+        </p:txBody>
+      </p:sp>
     </p:spTree>
+    <p:extLst>
+      <p:ext uri="{BB962C8B-B14F-4D97-AF65-F5344CB8AC3E}">
+        <p14:creationId xmlns:p14="http://schemas.microsoft.com/office/powerpoint/2010/main" xmlns="" val="3204545569"/>
+      </p:ext>
+    </p:extLst>
   </p:cSld>
   <p:clrMapOvr>
     <a:masterClrMapping/>
@@ -10821,31 +11371,76 @@
         </p:nvSpPr>
         <p:spPr>
           <a:xfrm>
-            <a:off x="1115616" y="224644"/>
-            <a:ext cx="2880320" cy="764704"/>
+            <a:off x="0" y="0"/>
+            <a:ext cx="7020780" cy="764704"/>
           </a:xfrm>
         </p:spPr>
         <p:txBody>
           <a:bodyPr/>
           <a:lstStyle/>
           <a:p>
-            <a:pPr algn="ctr" eaLnBrk="1" hangingPunct="1"/>
-            <a:r>
-              <a:rPr lang="en-US" altLang="en-US" sz="4500" b="1" dirty="0" smtClean="0">
+            <a:pPr eaLnBrk="1" hangingPunct="1"/>
+            <a:r>
+              <a:rPr lang="en-US" altLang="en-US" sz="4200" b="1" dirty="0" smtClean="0">
                 <a:solidFill>
                   <a:schemeClr val="bg1">
                     <a:lumMod val="10000"/>
                   </a:schemeClr>
                 </a:solidFill>
               </a:rPr>
-              <a:t>BONDS</a:t>
-            </a:r>
+              <a:t>CUMULATIVE RETURNS</a:t>
+            </a:r>
+          </a:p>
+        </p:txBody>
+      </p:sp>
+      <p:sp>
+        <p:nvSpPr>
+          <p:cNvPr id="11" name="TextBox 10"/>
+          <p:cNvSpPr txBox="1"/>
+          <p:nvPr/>
+        </p:nvSpPr>
+        <p:spPr>
+          <a:xfrm>
+            <a:off x="4319464" y="764704"/>
+            <a:ext cx="4824536" cy="738664"/>
+          </a:xfrm>
+          <a:prstGeom prst="rect">
+            <a:avLst/>
+          </a:prstGeom>
+          <a:noFill/>
+        </p:spPr>
+        <p:txBody>
+          <a:bodyPr wrap="square" rtlCol="0">
+            <a:spAutoFit/>
+          </a:bodyPr>
+          <a:lstStyle/>
+          <a:p>
+            <a:pPr algn="ctr"/>
+            <a:r>
+              <a:rPr lang="en-US" sz="2200" dirty="0" smtClean="0">
+                <a:solidFill>
+                  <a:schemeClr val="bg1">
+                    <a:lumMod val="10000"/>
+                  </a:schemeClr>
+                </a:solidFill>
+              </a:rPr>
+              <a:t>•  Comparison Across Portfolios  •</a:t>
+            </a:r>
+          </a:p>
+          <a:p>
+            <a:endParaRPr lang="en-US" sz="2000" dirty="0">
+              <a:solidFill>
+                <a:schemeClr val="bg1">
+                  <a:lumMod val="10000"/>
+                </a:schemeClr>
+              </a:solidFill>
+            </a:endParaRPr>
           </a:p>
         </p:txBody>
       </p:sp>
       <p:pic>
         <p:nvPicPr>
-          <p:cNvPr id="19458" name="Picture 2" descr="mc_10_cum_return_dist_bonds.png"/>
+          <p:cNvPr id="66562" name="Picture 2" descr="consolidated_cumulative_returns.png"/>
           <p:cNvPicPr>
             <a:picLocks noChangeAspect="1" noChangeArrowheads="1"/>
           </p:cNvPicPr>
@@ -10860,8 +11455,8 @@
         </p:blipFill>
         <p:spPr bwMode="auto">
           <a:xfrm>
-            <a:off x="1475656" y="1664804"/>
-            <a:ext cx="6186488" cy="3771902"/>
+            <a:off x="283464" y="1563624"/>
+            <a:ext cx="8577072" cy="4651390"/>
           </a:xfrm>
           <a:prstGeom prst="rect">
             <a:avLst/>
@@ -10869,97 +11464,6 @@
           <a:noFill/>
         </p:spPr>
       </p:pic>
-      <p:sp>
-        <p:nvSpPr>
-          <p:cNvPr id="5" name="TextBox 4"/>
-          <p:cNvSpPr txBox="1"/>
-          <p:nvPr/>
-        </p:nvSpPr>
-        <p:spPr>
-          <a:xfrm>
-            <a:off x="3167844" y="5697252"/>
-            <a:ext cx="2844316" cy="923330"/>
-          </a:xfrm>
-          <a:prstGeom prst="rect">
-            <a:avLst/>
-          </a:prstGeom>
-          <a:noFill/>
-        </p:spPr>
-        <p:txBody>
-          <a:bodyPr wrap="square" rtlCol="0">
-            <a:spAutoFit/>
-          </a:bodyPr>
-          <a:lstStyle/>
-          <a:p>
-            <a:pPr algn="ctr"/>
-            <a:r>
-              <a:rPr lang="en-US" b="1" dirty="0" smtClean="0">
-                <a:solidFill>
-                  <a:schemeClr val="bg1">
-                    <a:lumMod val="10000"/>
-                  </a:schemeClr>
-                </a:solidFill>
-              </a:rPr>
-              <a:t>Monte Carlo Simulation </a:t>
-            </a:r>
-            <a:r>
-              <a:rPr lang="en-US" b="1" i="1" dirty="0" smtClean="0">
-                <a:solidFill>
-                  <a:schemeClr val="bg1">
-                    <a:lumMod val="10000"/>
-                  </a:schemeClr>
-                </a:solidFill>
-              </a:rPr>
-              <a:t>10 Years</a:t>
-            </a:r>
-          </a:p>
-          <a:p>
-            <a:endParaRPr lang="en-US" dirty="0"/>
-          </a:p>
-        </p:txBody>
-      </p:sp>
-      <p:sp>
-        <p:nvSpPr>
-          <p:cNvPr id="11" name="TextBox 10"/>
-          <p:cNvSpPr txBox="1"/>
-          <p:nvPr/>
-        </p:nvSpPr>
-        <p:spPr>
-          <a:xfrm>
-            <a:off x="3815916" y="656692"/>
-            <a:ext cx="5112568" cy="400110"/>
-          </a:xfrm>
-          <a:prstGeom prst="rect">
-            <a:avLst/>
-          </a:prstGeom>
-          <a:noFill/>
-        </p:spPr>
-        <p:txBody>
-          <a:bodyPr wrap="square" rtlCol="0">
-            <a:spAutoFit/>
-          </a:bodyPr>
-          <a:lstStyle/>
-          <a:p>
-            <a:r>
-              <a:rPr lang="en-US" sz="2000" dirty="0" smtClean="0">
-                <a:solidFill>
-                  <a:schemeClr val="bg1">
-                    <a:lumMod val="10000"/>
-                  </a:schemeClr>
-                </a:solidFill>
-              </a:rPr>
-              <a:t>•  BLV  •  BND  •  EDV  •  VCLT  •   VGLT  •</a:t>
-            </a:r>
-            <a:endParaRPr lang="en-US" sz="2000" dirty="0">
-              <a:solidFill>
-                <a:schemeClr val="bg1">
-                  <a:lumMod val="10000"/>
-                </a:schemeClr>
-              </a:solidFill>
-            </a:endParaRPr>
-          </a:p>
-        </p:txBody>
-      </p:sp>
     </p:spTree>
   </p:cSld>
   <p:clrMapOvr>
@@ -11007,38 +11511,38 @@
         </p:nvSpPr>
         <p:spPr>
           <a:xfrm>
-            <a:off x="1115616" y="224644"/>
-            <a:ext cx="2880320" cy="764704"/>
+            <a:off x="0" y="0"/>
+            <a:ext cx="7020780" cy="764704"/>
           </a:xfrm>
         </p:spPr>
         <p:txBody>
           <a:bodyPr/>
           <a:lstStyle/>
           <a:p>
-            <a:pPr algn="ctr" eaLnBrk="1" hangingPunct="1"/>
-            <a:r>
-              <a:rPr lang="en-US" altLang="en-US" sz="4500" b="1" dirty="0" smtClean="0">
+            <a:pPr eaLnBrk="1" hangingPunct="1"/>
+            <a:r>
+              <a:rPr lang="en-US" altLang="en-US" sz="4200" b="1" dirty="0" smtClean="0">
                 <a:solidFill>
                   <a:schemeClr val="bg1">
                     <a:lumMod val="10000"/>
                   </a:schemeClr>
                 </a:solidFill>
               </a:rPr>
-              <a:t>ETF</a:t>
-            </a:r>
-          </a:p>
-        </p:txBody>
-      </p:sp>
-      <p:sp>
-        <p:nvSpPr>
-          <p:cNvPr id="5" name="TextBox 4"/>
+              <a:t>ANNUALIZED RETURNS</a:t>
+            </a:r>
+          </a:p>
+        </p:txBody>
+      </p:sp>
+      <p:sp>
+        <p:nvSpPr>
+          <p:cNvPr id="11" name="TextBox 10"/>
           <p:cNvSpPr txBox="1"/>
           <p:nvPr/>
         </p:nvSpPr>
         <p:spPr>
           <a:xfrm>
-            <a:off x="3167844" y="5697252"/>
-            <a:ext cx="2844316" cy="923330"/>
+            <a:off x="4319464" y="764704"/>
+            <a:ext cx="4824536" cy="738664"/>
           </a:xfrm>
           <a:prstGeom prst="rect">
             <a:avLst/>
@@ -11053,63 +11557,17 @@
           <a:p>
             <a:pPr algn="ctr"/>
             <a:r>
-              <a:rPr lang="en-US" b="1" dirty="0" smtClean="0">
+              <a:rPr lang="en-US" sz="2200" dirty="0" smtClean="0">
                 <a:solidFill>
                   <a:schemeClr val="bg1">
                     <a:lumMod val="10000"/>
                   </a:schemeClr>
                 </a:solidFill>
               </a:rPr>
-              <a:t>Monte Carlo Simulation </a:t>
-            </a:r>
-            <a:r>
-              <a:rPr lang="en-US" b="1" i="1" dirty="0" smtClean="0">
-                <a:solidFill>
-                  <a:schemeClr val="bg1">
-                    <a:lumMod val="10000"/>
-                  </a:schemeClr>
-                </a:solidFill>
-              </a:rPr>
-              <a:t>10 Years</a:t>
-            </a:r>
-          </a:p>
-          <a:p>
-            <a:endParaRPr lang="en-US" dirty="0"/>
-          </a:p>
-        </p:txBody>
-      </p:sp>
-      <p:sp>
-        <p:nvSpPr>
-          <p:cNvPr id="11" name="TextBox 10"/>
-          <p:cNvSpPr txBox="1"/>
-          <p:nvPr/>
-        </p:nvSpPr>
-        <p:spPr>
-          <a:xfrm>
-            <a:off x="3815916" y="656692"/>
-            <a:ext cx="5112568" cy="400110"/>
-          </a:xfrm>
-          <a:prstGeom prst="rect">
-            <a:avLst/>
-          </a:prstGeom>
-          <a:noFill/>
-        </p:spPr>
-        <p:txBody>
-          <a:bodyPr wrap="square" rtlCol="0">
-            <a:spAutoFit/>
-          </a:bodyPr>
-          <a:lstStyle/>
-          <a:p>
-            <a:r>
-              <a:rPr lang="en-US" sz="2000" dirty="0" smtClean="0">
-                <a:solidFill>
-                  <a:schemeClr val="bg1">
-                    <a:lumMod val="10000"/>
-                  </a:schemeClr>
-                </a:solidFill>
-              </a:rPr>
-              <a:t>•  EEM  •  VOO  •  VTI  •  VTV  •  VUG  •</a:t>
-            </a:r>
+              <a:t>•  Comparison Across Portfolios  •</a:t>
+            </a:r>
+          </a:p>
+          <a:p>
             <a:endParaRPr lang="en-US" sz="2000" dirty="0">
               <a:solidFill>
                 <a:schemeClr val="bg1">
@@ -11122,7 +11580,7 @@
       </p:sp>
       <p:pic>
         <p:nvPicPr>
-          <p:cNvPr id="52226" name="Picture 2" descr="mc_10_cum_return_dist_etf.png"/>
+          <p:cNvPr id="64514" name="Picture 2" descr="historical_avg_annual_return_consolidated.png"/>
           <p:cNvPicPr>
             <a:picLocks noChangeAspect="1" noChangeArrowheads="1"/>
           </p:cNvPicPr>
@@ -11137,8 +11595,8 @@
         </p:blipFill>
         <p:spPr bwMode="auto">
           <a:xfrm>
-            <a:off x="1472184" y="1664208"/>
-            <a:ext cx="6200775" cy="3771900"/>
+            <a:off x="287524" y="1563624"/>
+            <a:ext cx="8579765" cy="5229982"/>
           </a:xfrm>
           <a:prstGeom prst="rect">
             <a:avLst/>
@@ -11183,9 +11641,9 @@
       </p:grpSpPr>
       <p:sp>
         <p:nvSpPr>
-          <p:cNvPr id="7170" name="Rectangle 2"/>
+          <p:cNvPr id="6" name="Title 5"/>
           <p:cNvSpPr>
-            <a:spLocks noGrp="1" noChangeArrowheads="1"/>
+            <a:spLocks noGrp="1"/>
           </p:cNvSpPr>
           <p:nvPr>
             <p:ph type="title"/>
@@ -11193,110 +11651,26 @@
         </p:nvSpPr>
         <p:spPr>
           <a:xfrm>
-            <a:off x="0" y="152636"/>
-            <a:ext cx="4211960" cy="764704"/>
+            <a:off x="2411760" y="188640"/>
+            <a:ext cx="3960440" cy="792162"/>
           </a:xfrm>
         </p:spPr>
         <p:txBody>
           <a:bodyPr/>
           <a:lstStyle/>
           <a:p>
-            <a:pPr algn="ctr" eaLnBrk="1" hangingPunct="1"/>
-            <a:r>
-              <a:rPr lang="en-US" altLang="en-US" sz="4500" b="1" dirty="0" smtClean="0">
+            <a:pPr algn="ctr"/>
+            <a:r>
+              <a:rPr lang="en-US" sz="4200" b="1" dirty="0" smtClean="0">
                 <a:solidFill>
                   <a:schemeClr val="bg1">
                     <a:lumMod val="10000"/>
                   </a:schemeClr>
                 </a:solidFill>
               </a:rPr>
-              <a:t>REAL ESTATE</a:t>
-            </a:r>
-          </a:p>
-        </p:txBody>
-      </p:sp>
-      <p:sp>
-        <p:nvSpPr>
-          <p:cNvPr id="5" name="TextBox 4"/>
-          <p:cNvSpPr txBox="1"/>
-          <p:nvPr/>
-        </p:nvSpPr>
-        <p:spPr>
-          <a:xfrm>
-            <a:off x="3167844" y="5697252"/>
-            <a:ext cx="2844316" cy="923330"/>
-          </a:xfrm>
-          <a:prstGeom prst="rect">
-            <a:avLst/>
-          </a:prstGeom>
-          <a:noFill/>
-        </p:spPr>
-        <p:txBody>
-          <a:bodyPr wrap="square" rtlCol="0">
-            <a:spAutoFit/>
-          </a:bodyPr>
-          <a:lstStyle/>
-          <a:p>
-            <a:pPr algn="ctr"/>
-            <a:r>
-              <a:rPr lang="en-US" b="1" dirty="0" smtClean="0">
-                <a:solidFill>
-                  <a:schemeClr val="bg1">
-                    <a:lumMod val="10000"/>
-                  </a:schemeClr>
-                </a:solidFill>
-              </a:rPr>
-              <a:t>Monte Carlo Simulation </a:t>
-            </a:r>
-            <a:r>
-              <a:rPr lang="en-US" b="1" i="1" dirty="0" smtClean="0">
-                <a:solidFill>
-                  <a:schemeClr val="bg1">
-                    <a:lumMod val="10000"/>
-                  </a:schemeClr>
-                </a:solidFill>
-              </a:rPr>
-              <a:t>10 Years</a:t>
-            </a:r>
-          </a:p>
-          <a:p>
-            <a:endParaRPr lang="en-US" dirty="0"/>
-          </a:p>
-        </p:txBody>
-      </p:sp>
-      <p:sp>
-        <p:nvSpPr>
-          <p:cNvPr id="11" name="TextBox 10"/>
-          <p:cNvSpPr txBox="1"/>
-          <p:nvPr/>
-        </p:nvSpPr>
-        <p:spPr>
-          <a:xfrm>
-            <a:off x="4247964" y="656692"/>
-            <a:ext cx="4716524" cy="400110"/>
-          </a:xfrm>
-          <a:prstGeom prst="rect">
-            <a:avLst/>
-          </a:prstGeom>
-          <a:noFill/>
-        </p:spPr>
-        <p:txBody>
-          <a:bodyPr wrap="square" rtlCol="0">
-            <a:spAutoFit/>
-          </a:bodyPr>
-          <a:lstStyle/>
-          <a:p>
-            <a:r>
-              <a:rPr lang="en-US" sz="2000" dirty="0" smtClean="0">
-                <a:solidFill>
-                  <a:schemeClr val="bg1">
-                    <a:lumMod val="10000"/>
-                  </a:schemeClr>
-                </a:solidFill>
-              </a:rPr>
-              <a:t>•  AMT  • PLD  • CCI  •  EQIX  •  PSA  •</a:t>
-            </a:r>
-            <a:endParaRPr lang="en-US" sz="2000" dirty="0">
+              <a:t>THE FUTURE</a:t>
+            </a:r>
+            <a:endParaRPr lang="en-US" sz="4200" b="1" dirty="0">
               <a:solidFill>
                 <a:schemeClr val="bg1">
                   <a:lumMod val="10000"/>
@@ -11306,32 +11680,148 @@
           </a:p>
         </p:txBody>
       </p:sp>
-      <p:pic>
-        <p:nvPicPr>
-          <p:cNvPr id="49154" name="Picture 2" descr="mc_10_cum_return_dist_real_estate.png"/>
-          <p:cNvPicPr>
-            <a:picLocks noChangeAspect="1" noChangeArrowheads="1"/>
-          </p:cNvPicPr>
+      <p:sp>
+        <p:nvSpPr>
+          <p:cNvPr id="7" name="Content Placeholder 6"/>
+          <p:cNvSpPr>
+            <a:spLocks noGrp="1"/>
+          </p:cNvSpPr>
+          <p:nvPr>
+            <p:ph idx="1"/>
+          </p:nvPr>
+        </p:nvSpPr>
+        <p:spPr>
+          <a:xfrm>
+            <a:off x="2591780" y="2960948"/>
+            <a:ext cx="3744416" cy="1476164"/>
+          </a:xfrm>
+        </p:spPr>
+        <p:txBody>
+          <a:bodyPr/>
+          <a:lstStyle/>
+          <a:p>
+            <a:r>
+              <a:rPr lang="en-US" sz="2200" dirty="0" smtClean="0">
+                <a:solidFill>
+                  <a:schemeClr val="bg1">
+                    <a:lumMod val="10000"/>
+                  </a:schemeClr>
+                </a:solidFill>
+              </a:rPr>
+              <a:t>Portfolios by Asset </a:t>
+            </a:r>
+            <a:r>
+              <a:rPr lang="en-US" sz="2200" dirty="0" smtClean="0">
+                <a:solidFill>
+                  <a:schemeClr val="bg1">
+                    <a:lumMod val="10000"/>
+                  </a:schemeClr>
+                </a:solidFill>
+              </a:rPr>
+              <a:t>Class</a:t>
+            </a:r>
+            <a:endParaRPr lang="en-US" sz="2200" dirty="0" smtClean="0">
+              <a:solidFill>
+                <a:schemeClr val="bg1">
+                  <a:lumMod val="10000"/>
+                </a:schemeClr>
+              </a:solidFill>
+            </a:endParaRPr>
+          </a:p>
+          <a:p>
+            <a:pPr lvl="1"/>
+            <a:r>
+              <a:rPr lang="en-US" sz="1800" dirty="0" smtClean="0">
+                <a:solidFill>
+                  <a:schemeClr val="bg1">
+                    <a:lumMod val="10000"/>
+                  </a:schemeClr>
+                </a:solidFill>
+              </a:rPr>
+              <a:t>10 Year </a:t>
+            </a:r>
+            <a:r>
+              <a:rPr lang="en-US" sz="1800" dirty="0" smtClean="0">
+                <a:solidFill>
+                  <a:schemeClr val="bg1">
+                    <a:lumMod val="10000"/>
+                  </a:schemeClr>
+                </a:solidFill>
+              </a:rPr>
+              <a:t>Forecast</a:t>
+            </a:r>
+            <a:endParaRPr lang="en-US" sz="1800" dirty="0" smtClean="0">
+              <a:solidFill>
+                <a:schemeClr val="bg1">
+                  <a:lumMod val="10000"/>
+                </a:schemeClr>
+              </a:solidFill>
+            </a:endParaRPr>
+          </a:p>
+          <a:p>
+            <a:pPr lvl="1"/>
+            <a:r>
+              <a:rPr lang="en-US" sz="1800" dirty="0" smtClean="0">
+                <a:solidFill>
+                  <a:schemeClr val="bg1">
+                    <a:lumMod val="10000"/>
+                  </a:schemeClr>
+                </a:solidFill>
+              </a:rPr>
+              <a:t>1000 Simulations</a:t>
+            </a:r>
+            <a:endParaRPr lang="en-US" sz="1800" dirty="0">
+              <a:solidFill>
+                <a:schemeClr val="bg1">
+                  <a:lumMod val="10000"/>
+                </a:schemeClr>
+              </a:solidFill>
+            </a:endParaRPr>
+          </a:p>
+        </p:txBody>
+      </p:sp>
+      <p:sp>
+        <p:nvSpPr>
+          <p:cNvPr id="9" name="TextBox 8"/>
+          <p:cNvSpPr txBox="1"/>
           <p:nvPr/>
-        </p:nvPicPr>
-        <p:blipFill>
-          <a:blip r:embed="rId3" cstate="print"/>
-          <a:srcRect/>
-          <a:stretch>
-            <a:fillRect/>
-          </a:stretch>
-        </p:blipFill>
-        <p:spPr bwMode="auto">
+        </p:nvSpPr>
+        <p:spPr>
           <a:xfrm>
-            <a:off x="1472184" y="1664208"/>
-            <a:ext cx="6200775" cy="3771900"/>
+            <a:off x="1835696" y="2024844"/>
+            <a:ext cx="5472608" cy="646331"/>
           </a:xfrm>
           <a:prstGeom prst="rect">
             <a:avLst/>
           </a:prstGeom>
           <a:noFill/>
         </p:spPr>
-      </p:pic>
+        <p:txBody>
+          <a:bodyPr wrap="square" rtlCol="0">
+            <a:spAutoFit/>
+          </a:bodyPr>
+          <a:lstStyle/>
+          <a:p>
+            <a:r>
+              <a:rPr lang="en-US" sz="3600" dirty="0" smtClean="0">
+                <a:solidFill>
+                  <a:schemeClr val="bg1">
+                    <a:lumMod val="10000"/>
+                  </a:schemeClr>
+                </a:solidFill>
+              </a:rPr>
+              <a:t>Monte Carlo Simulations</a:t>
+            </a:r>
+            <a:endParaRPr lang="en-US" sz="3600" dirty="0">
+              <a:solidFill>
+                <a:schemeClr val="bg1">
+                  <a:lumMod val="10000"/>
+                </a:schemeClr>
+              </a:solidFill>
+            </a:endParaRPr>
+          </a:p>
+        </p:txBody>
+      </p:sp>
     </p:spTree>
   </p:cSld>
   <p:clrMapOvr>
@@ -11379,7 +11869,7 @@
         </p:nvSpPr>
         <p:spPr>
           <a:xfrm>
-            <a:off x="971600" y="224644"/>
+            <a:off x="1115616" y="152636"/>
             <a:ext cx="2880320" cy="764704"/>
           </a:xfrm>
         </p:spPr>
@@ -11396,121 +11886,14 @@
                   </a:schemeClr>
                 </a:solidFill>
               </a:rPr>
-              <a:t>STOCKS</a:t>
-            </a:r>
-          </a:p>
-        </p:txBody>
-      </p:sp>
-      <p:sp>
-        <p:nvSpPr>
-          <p:cNvPr id="5" name="TextBox 4"/>
-          <p:cNvSpPr txBox="1"/>
-          <p:nvPr/>
-        </p:nvSpPr>
-        <p:spPr>
-          <a:xfrm>
-            <a:off x="3167844" y="5697252"/>
-            <a:ext cx="2844316" cy="923330"/>
-          </a:xfrm>
-          <a:prstGeom prst="rect">
-            <a:avLst/>
-          </a:prstGeom>
-          <a:noFill/>
-        </p:spPr>
-        <p:txBody>
-          <a:bodyPr wrap="square" rtlCol="0">
-            <a:spAutoFit/>
-          </a:bodyPr>
-          <a:lstStyle/>
-          <a:p>
-            <a:pPr algn="ctr"/>
-            <a:r>
-              <a:rPr lang="en-US" b="1" dirty="0" smtClean="0">
-                <a:solidFill>
-                  <a:schemeClr val="bg1">
-                    <a:lumMod val="10000"/>
-                  </a:schemeClr>
-                </a:solidFill>
-              </a:rPr>
-              <a:t>Monte Carlo Simulation </a:t>
-            </a:r>
-            <a:r>
-              <a:rPr lang="en-US" b="1" i="1" dirty="0" smtClean="0">
-                <a:solidFill>
-                  <a:schemeClr val="bg1">
-                    <a:lumMod val="10000"/>
-                  </a:schemeClr>
-                </a:solidFill>
-              </a:rPr>
-              <a:t>10 Years</a:t>
-            </a:r>
-          </a:p>
-          <a:p>
-            <a:endParaRPr lang="en-US" dirty="0"/>
-          </a:p>
-        </p:txBody>
-      </p:sp>
-      <p:sp>
-        <p:nvSpPr>
-          <p:cNvPr id="11" name="TextBox 10"/>
-          <p:cNvSpPr txBox="1"/>
-          <p:nvPr/>
-        </p:nvSpPr>
-        <p:spPr>
-          <a:xfrm>
-            <a:off x="3815916" y="440668"/>
-            <a:ext cx="5328084" cy="1015663"/>
-          </a:xfrm>
-          <a:prstGeom prst="rect">
-            <a:avLst/>
-          </a:prstGeom>
-          <a:noFill/>
-        </p:spPr>
-        <p:txBody>
-          <a:bodyPr wrap="square" rtlCol="0">
-            <a:spAutoFit/>
-          </a:bodyPr>
-          <a:lstStyle/>
-          <a:p>
-            <a:pPr algn="ctr"/>
-            <a:r>
-              <a:rPr lang="en-US" sz="2000" dirty="0" smtClean="0">
-                <a:solidFill>
-                  <a:schemeClr val="bg1">
-                    <a:lumMod val="10000"/>
-                  </a:schemeClr>
-                </a:solidFill>
-              </a:rPr>
-              <a:t>•  FB  •  AMZN  •  AAPL  •  XOM  •  JPM  •</a:t>
-            </a:r>
-          </a:p>
-          <a:p>
-            <a:pPr algn="ctr"/>
-            <a:r>
-              <a:rPr lang="en-US" sz="2000" dirty="0" smtClean="0">
-                <a:solidFill>
-                  <a:schemeClr val="bg1">
-                    <a:lumMod val="10000"/>
-                  </a:schemeClr>
-                </a:solidFill>
-              </a:rPr>
-              <a:t>•  JNJ  •  HON  •  LIN  •  AMT  •  PG  •  NEE •</a:t>
-            </a:r>
-          </a:p>
-          <a:p>
-            <a:endParaRPr lang="en-US" sz="2000" dirty="0">
-              <a:solidFill>
-                <a:schemeClr val="bg1">
-                  <a:lumMod val="10000"/>
-                </a:schemeClr>
-              </a:solidFill>
-            </a:endParaRPr>
+              <a:t>BONDS</a:t>
+            </a:r>
           </a:p>
         </p:txBody>
       </p:sp>
       <p:pic>
         <p:nvPicPr>
-          <p:cNvPr id="58370" name="Picture 2" descr="mc_10_cum_return_dist_stocks.png"/>
+          <p:cNvPr id="19458" name="Picture 2" descr="mc_10_cum_return_dist_bonds.png"/>
           <p:cNvPicPr>
             <a:picLocks noChangeAspect="1" noChangeArrowheads="1"/>
           </p:cNvPicPr>
@@ -11525,8 +11908,8 @@
         </p:blipFill>
         <p:spPr bwMode="auto">
           <a:xfrm>
-            <a:off x="1472184" y="1664208"/>
-            <a:ext cx="6200775" cy="3771900"/>
+            <a:off x="1475656" y="1664804"/>
+            <a:ext cx="6186488" cy="3771902"/>
           </a:xfrm>
           <a:prstGeom prst="rect">
             <a:avLst/>
@@ -11534,6 +11917,97 @@
           <a:noFill/>
         </p:spPr>
       </p:pic>
+      <p:sp>
+        <p:nvSpPr>
+          <p:cNvPr id="5" name="TextBox 4"/>
+          <p:cNvSpPr txBox="1"/>
+          <p:nvPr/>
+        </p:nvSpPr>
+        <p:spPr>
+          <a:xfrm>
+            <a:off x="3167844" y="5697252"/>
+            <a:ext cx="2844316" cy="923330"/>
+          </a:xfrm>
+          <a:prstGeom prst="rect">
+            <a:avLst/>
+          </a:prstGeom>
+          <a:noFill/>
+        </p:spPr>
+        <p:txBody>
+          <a:bodyPr wrap="square" rtlCol="0">
+            <a:spAutoFit/>
+          </a:bodyPr>
+          <a:lstStyle/>
+          <a:p>
+            <a:pPr algn="ctr"/>
+            <a:r>
+              <a:rPr lang="en-US" b="1" dirty="0" smtClean="0">
+                <a:solidFill>
+                  <a:schemeClr val="bg1">
+                    <a:lumMod val="10000"/>
+                  </a:schemeClr>
+                </a:solidFill>
+              </a:rPr>
+              <a:t>Monte Carlo Simulation </a:t>
+            </a:r>
+            <a:r>
+              <a:rPr lang="en-US" b="1" i="1" dirty="0" smtClean="0">
+                <a:solidFill>
+                  <a:schemeClr val="bg1">
+                    <a:lumMod val="10000"/>
+                  </a:schemeClr>
+                </a:solidFill>
+              </a:rPr>
+              <a:t>10 Years</a:t>
+            </a:r>
+          </a:p>
+          <a:p>
+            <a:endParaRPr lang="en-US" dirty="0"/>
+          </a:p>
+        </p:txBody>
+      </p:sp>
+      <p:sp>
+        <p:nvSpPr>
+          <p:cNvPr id="11" name="TextBox 10"/>
+          <p:cNvSpPr txBox="1"/>
+          <p:nvPr/>
+        </p:nvSpPr>
+        <p:spPr>
+          <a:xfrm>
+            <a:off x="3815916" y="656692"/>
+            <a:ext cx="5112568" cy="400110"/>
+          </a:xfrm>
+          <a:prstGeom prst="rect">
+            <a:avLst/>
+          </a:prstGeom>
+          <a:noFill/>
+        </p:spPr>
+        <p:txBody>
+          <a:bodyPr wrap="square" rtlCol="0">
+            <a:spAutoFit/>
+          </a:bodyPr>
+          <a:lstStyle/>
+          <a:p>
+            <a:r>
+              <a:rPr lang="en-US" sz="2000" dirty="0" smtClean="0">
+                <a:solidFill>
+                  <a:schemeClr val="bg1">
+                    <a:lumMod val="10000"/>
+                  </a:schemeClr>
+                </a:solidFill>
+              </a:rPr>
+              <a:t>•  BLV  •  BND  •  EDV  •  VCLT  •   VGLT  •</a:t>
+            </a:r>
+            <a:endParaRPr lang="en-US" sz="2000" dirty="0">
+              <a:solidFill>
+                <a:schemeClr val="bg1">
+                  <a:lumMod val="10000"/>
+                </a:schemeClr>
+              </a:solidFill>
+            </a:endParaRPr>
+          </a:p>
+        </p:txBody>
+      </p:sp>
     </p:spTree>
   </p:cSld>
   <p:clrMapOvr>
@@ -11581,7 +12055,7 @@
         </p:nvSpPr>
         <p:spPr>
           <a:xfrm>
-            <a:off x="1115616" y="224644"/>
+            <a:off x="1115616" y="152636"/>
             <a:ext cx="2880320" cy="764704"/>
           </a:xfrm>
         </p:spPr>
@@ -11598,7 +12072,7 @@
                   </a:schemeClr>
                 </a:solidFill>
               </a:rPr>
-              <a:t>CRYPTO</a:t>
+              <a:t>ETF</a:t>
             </a:r>
           </a:p>
         </p:txBody>
@@ -11682,7 +12156,7 @@
                   </a:schemeClr>
                 </a:solidFill>
               </a:rPr>
-              <a:t>•  BTC  •  ETH  •  BNB  •  DASH  •  LTC  •</a:t>
+              <a:t>•  EEM  •  VOO  •  VTI  •  VTV  •  VUG  •</a:t>
             </a:r>
             <a:endParaRPr lang="en-US" sz="2000" dirty="0">
               <a:solidFill>
@@ -11696,7 +12170,7 @@
       </p:sp>
       <p:pic>
         <p:nvPicPr>
-          <p:cNvPr id="60418" name="Picture 2" descr="mc_10_cum_return_dist_cryptocurrency.png"/>
+          <p:cNvPr id="52226" name="Picture 2" descr="mc_10_cum_return_dist_etf.png"/>
           <p:cNvPicPr>
             <a:picLocks noChangeAspect="1" noChangeArrowheads="1"/>
           </p:cNvPicPr>
@@ -11712,7 +12186,7 @@
         <p:spPr bwMode="auto">
           <a:xfrm>
             <a:off x="1472184" y="1664208"/>
-            <a:ext cx="6386513" cy="3771900"/>
+            <a:ext cx="6200775" cy="3771900"/>
           </a:xfrm>
           <a:prstGeom prst="rect">
             <a:avLst/>
@@ -11767,8 +12241,8 @@
         </p:nvSpPr>
         <p:spPr>
           <a:xfrm>
-            <a:off x="0" y="224644"/>
-            <a:ext cx="3959932" cy="764704"/>
+            <a:off x="0" y="152636"/>
+            <a:ext cx="4211960" cy="764704"/>
           </a:xfrm>
         </p:spPr>
         <p:txBody>
@@ -11784,7 +12258,7 @@
                   </a:schemeClr>
                 </a:solidFill>
               </a:rPr>
-              <a:t>DIVERSIFIED</a:t>
+              <a:t>REAL ESTATE</a:t>
             </a:r>
           </a:p>
         </p:txBody>
@@ -11846,8 +12320,8 @@
         </p:nvSpPr>
         <p:spPr>
           <a:xfrm>
-            <a:off x="3815916" y="440668"/>
-            <a:ext cx="5328084" cy="1015663"/>
+            <a:off x="4247964" y="656692"/>
+            <a:ext cx="4716524" cy="400110"/>
           </a:xfrm>
           <a:prstGeom prst="rect">
             <a:avLst/>
@@ -11860,7 +12334,6 @@
           </a:bodyPr>
           <a:lstStyle/>
           <a:p>
-            <a:pPr algn="ctr"/>
             <a:r>
               <a:rPr lang="en-US" sz="2000" dirty="0" smtClean="0">
                 <a:solidFill>
@@ -11869,23 +12342,8 @@
                   </a:schemeClr>
                 </a:solidFill>
               </a:rPr>
-              <a:t>•  VOO  •  MSFT  •  AAPL  •  BND  •  AMT  •</a:t>
-            </a:r>
-          </a:p>
-          <a:p>
-            <a:pPr algn="ctr"/>
-            <a:r>
-              <a:rPr lang="en-US" sz="2000" dirty="0" smtClean="0">
-                <a:solidFill>
-                  <a:schemeClr val="bg1">
-                    <a:lumMod val="10000"/>
-                  </a:schemeClr>
-                </a:solidFill>
-              </a:rPr>
-              <a:t>•  VUG  •  TSLA  •  AMZN  •  EDV  •  PLD  •</a:t>
-            </a:r>
-          </a:p>
-          <a:p>
+              <a:t>•  AMT  • PLD  • CCI  •  EQIX  •  PSA  •</a:t>
+            </a:r>
             <a:endParaRPr lang="en-US" sz="2000" dirty="0">
               <a:solidFill>
                 <a:schemeClr val="bg1">
@@ -11898,7 +12356,7 @@
       </p:sp>
       <p:pic>
         <p:nvPicPr>
-          <p:cNvPr id="62466" name="Picture 2" descr="mc_10_cum_return_dist_diversified.png"/>
+          <p:cNvPr id="49154" name="Picture 2" descr="mc_10_cum_return_dist_real_estate.png"/>
           <p:cNvPicPr>
             <a:picLocks noChangeAspect="1" noChangeArrowheads="1"/>
           </p:cNvPicPr>
@@ -12382,7 +12840,7 @@
   </a:extraClrSchemeLst>
   <a:extLst>
     <a:ext uri="{05A4C25C-085E-4340-85A3-A5531E510DB2}">
-      <thm15:themeFamily xmlns="" xmlns:thm15="http://schemas.microsoft.com/office/thememl/2012/main" name="Office Theme" id="{62F939B6-93AF-4DB8-9C6B-D6C7DFDC589F}" vid="{4A3C46E8-61CC-4603-A589-7422A47A8E4A}"/>
+      <thm15:themeFamily xmlns:thm15="http://schemas.microsoft.com/office/thememl/2012/main" xmlns="" name="Office Theme" id="{62F939B6-93AF-4DB8-9C6B-D6C7DFDC589F}" vid="{4A3C46E8-61CC-4603-A589-7422A47A8E4A}"/>
     </a:ext>
   </a:extLst>
 </a:theme>
@@ -12643,7 +13101,7 @@
   <a:extraClrSchemeLst/>
   <a:extLst>
     <a:ext uri="{05A4C25C-085E-4340-85A3-A5531E510DB2}">
-      <thm15:themeFamily xmlns="" xmlns:thm15="http://schemas.microsoft.com/office/thememl/2012/main" name="Office Theme" id="{62F939B6-93AF-4DB8-9C6B-D6C7DFDC589F}" vid="{4A3C46E8-61CC-4603-A589-7422A47A8E4A}"/>
+      <thm15:themeFamily xmlns:thm15="http://schemas.microsoft.com/office/thememl/2012/main" xmlns="" name="Office Theme" id="{62F939B6-93AF-4DB8-9C6B-D6C7DFDC589F}" vid="{4A3C46E8-61CC-4603-A589-7422A47A8E4A}"/>
     </a:ext>
   </a:extLst>
 </a:theme>
@@ -12904,7 +13362,7 @@
   <a:extraClrSchemeLst/>
   <a:extLst>
     <a:ext uri="{05A4C25C-085E-4340-85A3-A5531E510DB2}">
-      <thm15:themeFamily xmlns="" xmlns:thm15="http://schemas.microsoft.com/office/thememl/2012/main" name="Office Theme" id="{62F939B6-93AF-4DB8-9C6B-D6C7DFDC589F}" vid="{4A3C46E8-61CC-4603-A589-7422A47A8E4A}"/>
+      <thm15:themeFamily xmlns:thm15="http://schemas.microsoft.com/office/thememl/2012/main" xmlns="" name="Office Theme" id="{62F939B6-93AF-4DB8-9C6B-D6C7DFDC589F}" vid="{4A3C46E8-61CC-4603-A589-7422A47A8E4A}"/>
     </a:ext>
   </a:extLst>
 </a:theme>

</xml_diff>

<commit_message>
Adjust formatting of tabular data chart
Adjusted the formatting of the tabular data chart by applying colors and
bolding to the data that will have a focus on the presenter.
</commit_message>
<xml_diff>
--- a/presentation/P1- Challening the Status Quo.pptx
+++ b/presentation/P1- Challening the Status Quo.pptx
@@ -157,7 +157,7 @@
   </p:defaultTextStyle>
   <p:extLst>
     <p:ext uri="{EFAFB233-063F-42B5-8137-9DF3F51BA10A}">
-      <p15:sldGuideLst xmlns:p15="http://schemas.microsoft.com/office/powerpoint/2012/main" xmlns="">
+      <p15:sldGuideLst xmlns:p15="http://schemas.microsoft.com/office/powerpoint/2012/main">
         <p15:guide id="1" orient="horz" pos="2160">
           <p15:clr>
             <a:srgbClr val="A4A3A4"/>
@@ -171,7 +171,7 @@
       </p15:sldGuideLst>
     </p:ext>
     <p:ext uri="{2D200454-40CA-4A62-9FC3-DE9A4176ACB9}">
-      <p15:notesGuideLst xmlns:p15="http://schemas.microsoft.com/office/powerpoint/2012/main" xmlns=""/>
+      <p15:notesGuideLst xmlns:p15="http://schemas.microsoft.com/office/powerpoint/2012/main"/>
     </p:ext>
   </p:extLst>
 </p:presentation>
@@ -227,14 +227,14 @@
           <a:effectLst/>
           <a:extLst>
             <a:ext uri="{909E8E84-426E-40DD-AFC4-6F175D3DCCD1}">
-              <a14:hiddenFill xmlns:a14="http://schemas.microsoft.com/office/drawing/2010/main" xmlns="">
+              <a14:hiddenFill xmlns:a14="http://schemas.microsoft.com/office/drawing/2010/main">
                 <a:solidFill>
                   <a:schemeClr val="accent1"/>
                 </a:solidFill>
               </a14:hiddenFill>
             </a:ext>
             <a:ext uri="{91240B29-F687-4F45-9708-019B960494DF}">
-              <a14:hiddenLine xmlns:a14="http://schemas.microsoft.com/office/drawing/2010/main" xmlns="" w="9525">
+              <a14:hiddenLine xmlns:a14="http://schemas.microsoft.com/office/drawing/2010/main" w="9525">
                 <a:solidFill>
                   <a:schemeClr val="tx1"/>
                 </a:solidFill>
@@ -244,7 +244,7 @@
               </a14:hiddenLine>
             </a:ext>
             <a:ext uri="{AF507438-7753-43E0-B8FC-AC1667EBCBE1}">
-              <a14:hiddenEffects xmlns:a14="http://schemas.microsoft.com/office/drawing/2010/main" xmlns="">
+              <a14:hiddenEffects xmlns:a14="http://schemas.microsoft.com/office/drawing/2010/main">
                 <a:effectLst>
                   <a:outerShdw dist="35921" dir="2700000" algn="ctr" rotWithShape="0">
                     <a:schemeClr val="bg2"/>
@@ -298,14 +298,14 @@
           <a:effectLst/>
           <a:extLst>
             <a:ext uri="{909E8E84-426E-40DD-AFC4-6F175D3DCCD1}">
-              <a14:hiddenFill xmlns:a14="http://schemas.microsoft.com/office/drawing/2010/main" xmlns="">
+              <a14:hiddenFill xmlns:a14="http://schemas.microsoft.com/office/drawing/2010/main">
                 <a:solidFill>
                   <a:schemeClr val="accent1"/>
                 </a:solidFill>
               </a14:hiddenFill>
             </a:ext>
             <a:ext uri="{91240B29-F687-4F45-9708-019B960494DF}">
-              <a14:hiddenLine xmlns:a14="http://schemas.microsoft.com/office/drawing/2010/main" xmlns="" w="9525">
+              <a14:hiddenLine xmlns:a14="http://schemas.microsoft.com/office/drawing/2010/main" w="9525">
                 <a:solidFill>
                   <a:schemeClr val="tx1"/>
                 </a:solidFill>
@@ -315,7 +315,7 @@
               </a14:hiddenLine>
             </a:ext>
             <a:ext uri="{AF507438-7753-43E0-B8FC-AC1667EBCBE1}">
-              <a14:hiddenEffects xmlns:a14="http://schemas.microsoft.com/office/drawing/2010/main" xmlns="">
+              <a14:hiddenEffects xmlns:a14="http://schemas.microsoft.com/office/drawing/2010/main">
                 <a:effectLst>
                   <a:outerShdw dist="35921" dir="2700000" algn="ctr" rotWithShape="0">
                     <a:schemeClr val="bg2"/>
@@ -369,14 +369,14 @@
           <a:effectLst/>
           <a:extLst>
             <a:ext uri="{909E8E84-426E-40DD-AFC4-6F175D3DCCD1}">
-              <a14:hiddenFill xmlns:a14="http://schemas.microsoft.com/office/drawing/2010/main" xmlns="">
+              <a14:hiddenFill xmlns:a14="http://schemas.microsoft.com/office/drawing/2010/main">
                 <a:solidFill>
                   <a:schemeClr val="accent1"/>
                 </a:solidFill>
               </a14:hiddenFill>
             </a:ext>
             <a:ext uri="{91240B29-F687-4F45-9708-019B960494DF}">
-              <a14:hiddenLine xmlns:a14="http://schemas.microsoft.com/office/drawing/2010/main" xmlns="" w="9525">
+              <a14:hiddenLine xmlns:a14="http://schemas.microsoft.com/office/drawing/2010/main" w="9525">
                 <a:solidFill>
                   <a:schemeClr val="tx1"/>
                 </a:solidFill>
@@ -386,7 +386,7 @@
               </a14:hiddenLine>
             </a:ext>
             <a:ext uri="{AF507438-7753-43E0-B8FC-AC1667EBCBE1}">
-              <a14:hiddenEffects xmlns:a14="http://schemas.microsoft.com/office/drawing/2010/main" xmlns="">
+              <a14:hiddenEffects xmlns:a14="http://schemas.microsoft.com/office/drawing/2010/main">
                 <a:effectLst>
                   <a:outerShdw dist="35921" dir="2700000" algn="ctr" rotWithShape="0">
                     <a:schemeClr val="bg2"/>
@@ -440,14 +440,14 @@
           <a:effectLst/>
           <a:extLst>
             <a:ext uri="{909E8E84-426E-40DD-AFC4-6F175D3DCCD1}">
-              <a14:hiddenFill xmlns:a14="http://schemas.microsoft.com/office/drawing/2010/main" xmlns="">
+              <a14:hiddenFill xmlns:a14="http://schemas.microsoft.com/office/drawing/2010/main">
                 <a:solidFill>
                   <a:schemeClr val="accent1"/>
                 </a:solidFill>
               </a14:hiddenFill>
             </a:ext>
             <a:ext uri="{91240B29-F687-4F45-9708-019B960494DF}">
-              <a14:hiddenLine xmlns:a14="http://schemas.microsoft.com/office/drawing/2010/main" xmlns="" w="9525">
+              <a14:hiddenLine xmlns:a14="http://schemas.microsoft.com/office/drawing/2010/main" w="9525">
                 <a:solidFill>
                   <a:schemeClr val="tx1"/>
                 </a:solidFill>
@@ -457,7 +457,7 @@
               </a14:hiddenLine>
             </a:ext>
             <a:ext uri="{AF507438-7753-43E0-B8FC-AC1667EBCBE1}">
-              <a14:hiddenEffects xmlns:a14="http://schemas.microsoft.com/office/drawing/2010/main" xmlns="">
+              <a14:hiddenEffects xmlns:a14="http://schemas.microsoft.com/office/drawing/2010/main">
                 <a:effectLst>
                   <a:outerShdw dist="35921" dir="2700000" algn="ctr" rotWithShape="0">
                     <a:schemeClr val="bg2"/>
@@ -496,7 +496,7 @@
     </p:spTree>
     <p:extLst>
       <p:ext uri="{BB962C8B-B14F-4D97-AF65-F5344CB8AC3E}">
-        <p14:creationId xmlns:p14="http://schemas.microsoft.com/office/powerpoint/2010/main" xmlns="" val="1079346047"/>
+        <p14:creationId xmlns:p14="http://schemas.microsoft.com/office/powerpoint/2010/main" val="1079346047"/>
       </p:ext>
     </p:extLst>
   </p:cSld>
@@ -554,14 +554,14 @@
           <a:effectLst/>
           <a:extLst>
             <a:ext uri="{909E8E84-426E-40DD-AFC4-6F175D3DCCD1}">
-              <a14:hiddenFill xmlns:a14="http://schemas.microsoft.com/office/drawing/2010/main" xmlns="">
+              <a14:hiddenFill xmlns:a14="http://schemas.microsoft.com/office/drawing/2010/main">
                 <a:solidFill>
                   <a:schemeClr val="accent1"/>
                 </a:solidFill>
               </a14:hiddenFill>
             </a:ext>
             <a:ext uri="{91240B29-F687-4F45-9708-019B960494DF}">
-              <a14:hiddenLine xmlns:a14="http://schemas.microsoft.com/office/drawing/2010/main" xmlns="" w="9525">
+              <a14:hiddenLine xmlns:a14="http://schemas.microsoft.com/office/drawing/2010/main" w="9525">
                 <a:solidFill>
                   <a:schemeClr val="tx1"/>
                 </a:solidFill>
@@ -571,7 +571,7 @@
               </a14:hiddenLine>
             </a:ext>
             <a:ext uri="{AF507438-7753-43E0-B8FC-AC1667EBCBE1}">
-              <a14:hiddenEffects xmlns:a14="http://schemas.microsoft.com/office/drawing/2010/main" xmlns="">
+              <a14:hiddenEffects xmlns:a14="http://schemas.microsoft.com/office/drawing/2010/main">
                 <a:effectLst>
                   <a:outerShdw dist="35921" dir="2700000" algn="ctr" rotWithShape="0">
                     <a:schemeClr val="bg2"/>
@@ -625,14 +625,14 @@
           <a:effectLst/>
           <a:extLst>
             <a:ext uri="{909E8E84-426E-40DD-AFC4-6F175D3DCCD1}">
-              <a14:hiddenFill xmlns:a14="http://schemas.microsoft.com/office/drawing/2010/main" xmlns="">
+              <a14:hiddenFill xmlns:a14="http://schemas.microsoft.com/office/drawing/2010/main">
                 <a:solidFill>
                   <a:schemeClr val="accent1"/>
                 </a:solidFill>
               </a14:hiddenFill>
             </a:ext>
             <a:ext uri="{91240B29-F687-4F45-9708-019B960494DF}">
-              <a14:hiddenLine xmlns:a14="http://schemas.microsoft.com/office/drawing/2010/main" xmlns="" w="9525">
+              <a14:hiddenLine xmlns:a14="http://schemas.microsoft.com/office/drawing/2010/main" w="9525">
                 <a:solidFill>
                   <a:schemeClr val="tx1"/>
                 </a:solidFill>
@@ -642,7 +642,7 @@
               </a14:hiddenLine>
             </a:ext>
             <a:ext uri="{AF507438-7753-43E0-B8FC-AC1667EBCBE1}">
-              <a14:hiddenEffects xmlns:a14="http://schemas.microsoft.com/office/drawing/2010/main" xmlns="">
+              <a14:hiddenEffects xmlns:a14="http://schemas.microsoft.com/office/drawing/2010/main">
                 <a:effectLst>
                   <a:outerShdw dist="35921" dir="2700000" algn="ctr" rotWithShape="0">
                     <a:schemeClr val="bg2"/>
@@ -701,14 +701,14 @@
           <a:effectLst/>
           <a:extLst>
             <a:ext uri="{909E8E84-426E-40DD-AFC4-6F175D3DCCD1}">
-              <a14:hiddenFill xmlns:a14="http://schemas.microsoft.com/office/drawing/2010/main" xmlns="">
+              <a14:hiddenFill xmlns:a14="http://schemas.microsoft.com/office/drawing/2010/main">
                 <a:solidFill>
                   <a:srgbClr val="FFFFFF"/>
                 </a:solidFill>
               </a14:hiddenFill>
             </a:ext>
             <a:ext uri="{AF507438-7753-43E0-B8FC-AC1667EBCBE1}">
-              <a14:hiddenEffects xmlns:a14="http://schemas.microsoft.com/office/drawing/2010/main" xmlns="">
+              <a14:hiddenEffects xmlns:a14="http://schemas.microsoft.com/office/drawing/2010/main">
                 <a:effectLst>
                   <a:outerShdw dist="35921" dir="2700000" algn="ctr" rotWithShape="0">
                     <a:srgbClr val="808080"/>
@@ -717,7 +717,7 @@
               </a14:hiddenEffects>
             </a:ext>
             <a:ext uri="{53640926-AAD7-44D8-BBD7-CCE9431645EC}">
-              <a14:shadowObscured xmlns:a14="http://schemas.microsoft.com/office/drawing/2010/main" xmlns="" val="1"/>
+              <a14:shadowObscured xmlns:a14="http://schemas.microsoft.com/office/drawing/2010/main" val="1"/>
             </a:ext>
           </a:extLst>
         </p:spPr>
@@ -747,14 +747,14 @@
           <a:effectLst/>
           <a:extLst>
             <a:ext uri="{909E8E84-426E-40DD-AFC4-6F175D3DCCD1}">
-              <a14:hiddenFill xmlns:a14="http://schemas.microsoft.com/office/drawing/2010/main" xmlns="">
+              <a14:hiddenFill xmlns:a14="http://schemas.microsoft.com/office/drawing/2010/main">
                 <a:solidFill>
                   <a:schemeClr val="accent1"/>
                 </a:solidFill>
               </a14:hiddenFill>
             </a:ext>
             <a:ext uri="{91240B29-F687-4F45-9708-019B960494DF}">
-              <a14:hiddenLine xmlns:a14="http://schemas.microsoft.com/office/drawing/2010/main" xmlns="" w="9525">
+              <a14:hiddenLine xmlns:a14="http://schemas.microsoft.com/office/drawing/2010/main" w="9525">
                 <a:solidFill>
                   <a:schemeClr val="tx1"/>
                 </a:solidFill>
@@ -764,7 +764,7 @@
               </a14:hiddenLine>
             </a:ext>
             <a:ext uri="{AF507438-7753-43E0-B8FC-AC1667EBCBE1}">
-              <a14:hiddenEffects xmlns:a14="http://schemas.microsoft.com/office/drawing/2010/main" xmlns="">
+              <a14:hiddenEffects xmlns:a14="http://schemas.microsoft.com/office/drawing/2010/main">
                 <a:effectLst>
                   <a:outerShdw dist="35921" dir="2700000" algn="ctr" rotWithShape="0">
                     <a:schemeClr val="bg2"/>
@@ -843,14 +843,14 @@
           <a:effectLst/>
           <a:extLst>
             <a:ext uri="{909E8E84-426E-40DD-AFC4-6F175D3DCCD1}">
-              <a14:hiddenFill xmlns:a14="http://schemas.microsoft.com/office/drawing/2010/main" xmlns="">
+              <a14:hiddenFill xmlns:a14="http://schemas.microsoft.com/office/drawing/2010/main">
                 <a:solidFill>
                   <a:schemeClr val="accent1"/>
                 </a:solidFill>
               </a14:hiddenFill>
             </a:ext>
             <a:ext uri="{91240B29-F687-4F45-9708-019B960494DF}">
-              <a14:hiddenLine xmlns:a14="http://schemas.microsoft.com/office/drawing/2010/main" xmlns="" w="9525">
+              <a14:hiddenLine xmlns:a14="http://schemas.microsoft.com/office/drawing/2010/main" w="9525">
                 <a:solidFill>
                   <a:schemeClr val="tx1"/>
                 </a:solidFill>
@@ -860,7 +860,7 @@
               </a14:hiddenLine>
             </a:ext>
             <a:ext uri="{AF507438-7753-43E0-B8FC-AC1667EBCBE1}">
-              <a14:hiddenEffects xmlns:a14="http://schemas.microsoft.com/office/drawing/2010/main" xmlns="">
+              <a14:hiddenEffects xmlns:a14="http://schemas.microsoft.com/office/drawing/2010/main">
                 <a:effectLst>
                   <a:outerShdw dist="35921" dir="2700000" algn="ctr" rotWithShape="0">
                     <a:schemeClr val="bg2"/>
@@ -914,14 +914,14 @@
           <a:effectLst/>
           <a:extLst>
             <a:ext uri="{909E8E84-426E-40DD-AFC4-6F175D3DCCD1}">
-              <a14:hiddenFill xmlns:a14="http://schemas.microsoft.com/office/drawing/2010/main" xmlns="">
+              <a14:hiddenFill xmlns:a14="http://schemas.microsoft.com/office/drawing/2010/main">
                 <a:solidFill>
                   <a:schemeClr val="accent1"/>
                 </a:solidFill>
               </a14:hiddenFill>
             </a:ext>
             <a:ext uri="{91240B29-F687-4F45-9708-019B960494DF}">
-              <a14:hiddenLine xmlns:a14="http://schemas.microsoft.com/office/drawing/2010/main" xmlns="" w="9525">
+              <a14:hiddenLine xmlns:a14="http://schemas.microsoft.com/office/drawing/2010/main" w="9525">
                 <a:solidFill>
                   <a:schemeClr val="tx1"/>
                 </a:solidFill>
@@ -931,7 +931,7 @@
               </a14:hiddenLine>
             </a:ext>
             <a:ext uri="{AF507438-7753-43E0-B8FC-AC1667EBCBE1}">
-              <a14:hiddenEffects xmlns:a14="http://schemas.microsoft.com/office/drawing/2010/main" xmlns="">
+              <a14:hiddenEffects xmlns:a14="http://schemas.microsoft.com/office/drawing/2010/main">
                 <a:effectLst>
                   <a:outerShdw dist="35921" dir="2700000" algn="ctr" rotWithShape="0">
                     <a:schemeClr val="bg2"/>
@@ -970,7 +970,7 @@
     </p:spTree>
     <p:extLst>
       <p:ext uri="{BB962C8B-B14F-4D97-AF65-F5344CB8AC3E}">
-        <p14:creationId xmlns:p14="http://schemas.microsoft.com/office/powerpoint/2010/main" xmlns="" val="1711053471"/>
+        <p14:creationId xmlns:p14="http://schemas.microsoft.com/office/powerpoint/2010/main" val="1711053471"/>
       </p:ext>
     </p:extLst>
   </p:cSld>
@@ -1288,7 +1288,7 @@
     </p:spTree>
     <p:extLst>
       <p:ext uri="{BB962C8B-B14F-4D97-AF65-F5344CB8AC3E}">
-        <p14:creationId xmlns:p14="http://schemas.microsoft.com/office/powerpoint/2010/main" xmlns="" val="2433924881"/>
+        <p14:creationId xmlns:p14="http://schemas.microsoft.com/office/powerpoint/2010/main" val="2433924881"/>
       </p:ext>
     </p:extLst>
   </p:cSld>
@@ -1486,7 +1486,7 @@
     </p:spTree>
     <p:extLst>
       <p:ext uri="{BB962C8B-B14F-4D97-AF65-F5344CB8AC3E}">
-        <p14:creationId xmlns:p14="http://schemas.microsoft.com/office/powerpoint/2010/main" xmlns="" val="1680665394"/>
+        <p14:creationId xmlns:p14="http://schemas.microsoft.com/office/powerpoint/2010/main" val="1680665394"/>
       </p:ext>
     </p:extLst>
   </p:cSld>
@@ -1684,7 +1684,7 @@
     </p:spTree>
     <p:extLst>
       <p:ext uri="{BB962C8B-B14F-4D97-AF65-F5344CB8AC3E}">
-        <p14:creationId xmlns:p14="http://schemas.microsoft.com/office/powerpoint/2010/main" xmlns="" val="1680665394"/>
+        <p14:creationId xmlns:p14="http://schemas.microsoft.com/office/powerpoint/2010/main" val="1680665394"/>
       </p:ext>
     </p:extLst>
   </p:cSld>
@@ -1882,7 +1882,7 @@
     </p:spTree>
     <p:extLst>
       <p:ext uri="{BB962C8B-B14F-4D97-AF65-F5344CB8AC3E}">
-        <p14:creationId xmlns:p14="http://schemas.microsoft.com/office/powerpoint/2010/main" xmlns="" val="1680665394"/>
+        <p14:creationId xmlns:p14="http://schemas.microsoft.com/office/powerpoint/2010/main" val="1680665394"/>
       </p:ext>
     </p:extLst>
   </p:cSld>
@@ -2080,7 +2080,7 @@
     </p:spTree>
     <p:extLst>
       <p:ext uri="{BB962C8B-B14F-4D97-AF65-F5344CB8AC3E}">
-        <p14:creationId xmlns:p14="http://schemas.microsoft.com/office/powerpoint/2010/main" xmlns="" val="1680665394"/>
+        <p14:creationId xmlns:p14="http://schemas.microsoft.com/office/powerpoint/2010/main" val="1680665394"/>
       </p:ext>
     </p:extLst>
   </p:cSld>
@@ -2278,7 +2278,7 @@
     </p:spTree>
     <p:extLst>
       <p:ext uri="{BB962C8B-B14F-4D97-AF65-F5344CB8AC3E}">
-        <p14:creationId xmlns:p14="http://schemas.microsoft.com/office/powerpoint/2010/main" xmlns="" val="1680665394"/>
+        <p14:creationId xmlns:p14="http://schemas.microsoft.com/office/powerpoint/2010/main" val="1680665394"/>
       </p:ext>
     </p:extLst>
   </p:cSld>
@@ -2476,7 +2476,7 @@
     </p:spTree>
     <p:extLst>
       <p:ext uri="{BB962C8B-B14F-4D97-AF65-F5344CB8AC3E}">
-        <p14:creationId xmlns:p14="http://schemas.microsoft.com/office/powerpoint/2010/main" xmlns="" val="1680665394"/>
+        <p14:creationId xmlns:p14="http://schemas.microsoft.com/office/powerpoint/2010/main" val="1680665394"/>
       </p:ext>
     </p:extLst>
   </p:cSld>
@@ -2674,7 +2674,7 @@
     </p:spTree>
     <p:extLst>
       <p:ext uri="{BB962C8B-B14F-4D97-AF65-F5344CB8AC3E}">
-        <p14:creationId xmlns:p14="http://schemas.microsoft.com/office/powerpoint/2010/main" xmlns="" val="1680665394"/>
+        <p14:creationId xmlns:p14="http://schemas.microsoft.com/office/powerpoint/2010/main" val="1680665394"/>
       </p:ext>
     </p:extLst>
   </p:cSld>
@@ -2872,7 +2872,7 @@
     </p:spTree>
     <p:extLst>
       <p:ext uri="{BB962C8B-B14F-4D97-AF65-F5344CB8AC3E}">
-        <p14:creationId xmlns:p14="http://schemas.microsoft.com/office/powerpoint/2010/main" xmlns="" val="1680665394"/>
+        <p14:creationId xmlns:p14="http://schemas.microsoft.com/office/powerpoint/2010/main" val="1680665394"/>
       </p:ext>
     </p:extLst>
   </p:cSld>
@@ -3070,7 +3070,7 @@
     </p:spTree>
     <p:extLst>
       <p:ext uri="{BB962C8B-B14F-4D97-AF65-F5344CB8AC3E}">
-        <p14:creationId xmlns:p14="http://schemas.microsoft.com/office/powerpoint/2010/main" xmlns="" val="1680665394"/>
+        <p14:creationId xmlns:p14="http://schemas.microsoft.com/office/powerpoint/2010/main" val="1680665394"/>
       </p:ext>
     </p:extLst>
   </p:cSld>
@@ -3127,7 +3127,7 @@
           <a:effectLst/>
           <a:extLst>
             <a:ext uri="{AF507438-7753-43E0-B8FC-AC1667EBCBE1}">
-              <a14:hiddenEffects xmlns:a14="http://schemas.microsoft.com/office/drawing/2010/main" xmlns="">
+              <a14:hiddenEffects xmlns:a14="http://schemas.microsoft.com/office/drawing/2010/main">
                 <a:effectLst>
                   <a:outerShdw dist="35921" dir="2700000" algn="ctr" rotWithShape="0">
                     <a:schemeClr val="bg2"/>
@@ -3323,7 +3323,7 @@
           </a:ln>
           <a:extLst>
             <a:ext uri="{91240B29-F687-4F45-9708-019B960494DF}">
-              <a14:hiddenLine xmlns:a14="http://schemas.microsoft.com/office/drawing/2010/main" xmlns="" w="9525">
+              <a14:hiddenLine xmlns:a14="http://schemas.microsoft.com/office/drawing/2010/main" w="9525">
                 <a:solidFill>
                   <a:srgbClr val="000000"/>
                 </a:solidFill>
@@ -3463,14 +3463,14 @@
           </a:prstGeom>
           <a:extLst>
             <a:ext uri="{909E8E84-426E-40DD-AFC4-6F175D3DCCD1}">
-              <a14:hiddenFill xmlns:a14="http://schemas.microsoft.com/office/drawing/2010/main" xmlns="">
+              <a14:hiddenFill xmlns:a14="http://schemas.microsoft.com/office/drawing/2010/main">
                 <a:solidFill>
                   <a:schemeClr val="accent1"/>
                 </a:solidFill>
               </a14:hiddenFill>
             </a:ext>
             <a:ext uri="{91240B29-F687-4F45-9708-019B960494DF}">
-              <a14:hiddenLine xmlns:a14="http://schemas.microsoft.com/office/drawing/2010/main" xmlns="" w="9525">
+              <a14:hiddenLine xmlns:a14="http://schemas.microsoft.com/office/drawing/2010/main" w="9525">
                 <a:solidFill>
                   <a:schemeClr val="tx1"/>
                 </a:solidFill>
@@ -3480,7 +3480,7 @@
               </a14:hiddenLine>
             </a:ext>
             <a:ext uri="{AF507438-7753-43E0-B8FC-AC1667EBCBE1}">
-              <a14:hiddenEffects xmlns:a14="http://schemas.microsoft.com/office/drawing/2010/main" xmlns="">
+              <a14:hiddenEffects xmlns:a14="http://schemas.microsoft.com/office/drawing/2010/main">
                 <a:effectLst>
                   <a:outerShdw dist="35921" dir="2700000" algn="ctr" rotWithShape="0">
                     <a:schemeClr val="bg2"/>
@@ -3550,7 +3550,7 @@
     </p:spTree>
     <p:extLst>
       <p:ext uri="{BB962C8B-B14F-4D97-AF65-F5344CB8AC3E}">
-        <p14:creationId xmlns:p14="http://schemas.microsoft.com/office/powerpoint/2010/main" xmlns="" val="3862339717"/>
+        <p14:creationId xmlns:p14="http://schemas.microsoft.com/office/powerpoint/2010/main" val="3862339717"/>
       </p:ext>
     </p:extLst>
   </p:cSld>
@@ -3721,7 +3721,7 @@
     </p:spTree>
     <p:extLst>
       <p:ext uri="{BB962C8B-B14F-4D97-AF65-F5344CB8AC3E}">
-        <p14:creationId xmlns:p14="http://schemas.microsoft.com/office/powerpoint/2010/main" xmlns="" val="3616501732"/>
+        <p14:creationId xmlns:p14="http://schemas.microsoft.com/office/powerpoint/2010/main" val="3616501732"/>
       </p:ext>
     </p:extLst>
   </p:cSld>
@@ -3902,7 +3902,7 @@
     </p:spTree>
     <p:extLst>
       <p:ext uri="{BB962C8B-B14F-4D97-AF65-F5344CB8AC3E}">
-        <p14:creationId xmlns:p14="http://schemas.microsoft.com/office/powerpoint/2010/main" xmlns="" val="4183861666"/>
+        <p14:creationId xmlns:p14="http://schemas.microsoft.com/office/powerpoint/2010/main" val="4183861666"/>
       </p:ext>
     </p:extLst>
   </p:cSld>
@@ -4051,7 +4051,7 @@
     </p:spTree>
     <p:extLst>
       <p:ext uri="{BB962C8B-B14F-4D97-AF65-F5344CB8AC3E}">
-        <p14:creationId xmlns:p14="http://schemas.microsoft.com/office/powerpoint/2010/main" xmlns="" val="1998572866"/>
+        <p14:creationId xmlns:p14="http://schemas.microsoft.com/office/powerpoint/2010/main" val="1998572866"/>
       </p:ext>
     </p:extLst>
   </p:cSld>
@@ -4200,7 +4200,7 @@
     </p:spTree>
     <p:extLst>
       <p:ext uri="{BB962C8B-B14F-4D97-AF65-F5344CB8AC3E}">
-        <p14:creationId xmlns:p14="http://schemas.microsoft.com/office/powerpoint/2010/main" xmlns="" val="4186681241"/>
+        <p14:creationId xmlns:p14="http://schemas.microsoft.com/office/powerpoint/2010/main" val="4186681241"/>
       </p:ext>
     </p:extLst>
   </p:cSld>
@@ -4438,7 +4438,7 @@
     </p:spTree>
     <p:extLst>
       <p:ext uri="{BB962C8B-B14F-4D97-AF65-F5344CB8AC3E}">
-        <p14:creationId xmlns:p14="http://schemas.microsoft.com/office/powerpoint/2010/main" xmlns="" val="2973065096"/>
+        <p14:creationId xmlns:p14="http://schemas.microsoft.com/office/powerpoint/2010/main" val="2973065096"/>
       </p:ext>
     </p:extLst>
   </p:cSld>
@@ -4609,7 +4609,7 @@
     </p:spTree>
     <p:extLst>
       <p:ext uri="{BB962C8B-B14F-4D97-AF65-F5344CB8AC3E}">
-        <p14:creationId xmlns:p14="http://schemas.microsoft.com/office/powerpoint/2010/main" xmlns="" val="2023945706"/>
+        <p14:creationId xmlns:p14="http://schemas.microsoft.com/office/powerpoint/2010/main" val="2023945706"/>
       </p:ext>
     </p:extLst>
   </p:cSld>
@@ -4802,7 +4802,7 @@
     </p:spTree>
     <p:extLst>
       <p:ext uri="{BB962C8B-B14F-4D97-AF65-F5344CB8AC3E}">
-        <p14:creationId xmlns:p14="http://schemas.microsoft.com/office/powerpoint/2010/main" xmlns="" val="3910440067"/>
+        <p14:creationId xmlns:p14="http://schemas.microsoft.com/office/powerpoint/2010/main" val="3910440067"/>
       </p:ext>
     </p:extLst>
   </p:cSld>
@@ -5035,7 +5035,7 @@
     </p:spTree>
     <p:extLst>
       <p:ext uri="{BB962C8B-B14F-4D97-AF65-F5344CB8AC3E}">
-        <p14:creationId xmlns:p14="http://schemas.microsoft.com/office/powerpoint/2010/main" xmlns="" val="2263429059"/>
+        <p14:creationId xmlns:p14="http://schemas.microsoft.com/office/powerpoint/2010/main" val="2263429059"/>
       </p:ext>
     </p:extLst>
   </p:cSld>
@@ -5403,7 +5403,7 @@
     </p:spTree>
     <p:extLst>
       <p:ext uri="{BB962C8B-B14F-4D97-AF65-F5344CB8AC3E}">
-        <p14:creationId xmlns:p14="http://schemas.microsoft.com/office/powerpoint/2010/main" xmlns="" val="1912727455"/>
+        <p14:creationId xmlns:p14="http://schemas.microsoft.com/office/powerpoint/2010/main" val="1912727455"/>
       </p:ext>
     </p:extLst>
   </p:cSld>
@@ -5522,7 +5522,7 @@
     </p:spTree>
     <p:extLst>
       <p:ext uri="{BB962C8B-B14F-4D97-AF65-F5344CB8AC3E}">
-        <p14:creationId xmlns:p14="http://schemas.microsoft.com/office/powerpoint/2010/main" xmlns="" val="4269111437"/>
+        <p14:creationId xmlns:p14="http://schemas.microsoft.com/office/powerpoint/2010/main" val="4269111437"/>
       </p:ext>
     </p:extLst>
   </p:cSld>
@@ -5618,7 +5618,7 @@
     </p:spTree>
     <p:extLst>
       <p:ext uri="{BB962C8B-B14F-4D97-AF65-F5344CB8AC3E}">
-        <p14:creationId xmlns:p14="http://schemas.microsoft.com/office/powerpoint/2010/main" xmlns="" val="292276621"/>
+        <p14:creationId xmlns:p14="http://schemas.microsoft.com/office/powerpoint/2010/main" val="292276621"/>
       </p:ext>
     </p:extLst>
   </p:cSld>
@@ -5896,7 +5896,7 @@
     </p:spTree>
     <p:extLst>
       <p:ext uri="{BB962C8B-B14F-4D97-AF65-F5344CB8AC3E}">
-        <p14:creationId xmlns:p14="http://schemas.microsoft.com/office/powerpoint/2010/main" xmlns="" val="570490551"/>
+        <p14:creationId xmlns:p14="http://schemas.microsoft.com/office/powerpoint/2010/main" val="570490551"/>
       </p:ext>
     </p:extLst>
   </p:cSld>
@@ -6151,7 +6151,7 @@
     </p:spTree>
     <p:extLst>
       <p:ext uri="{BB962C8B-B14F-4D97-AF65-F5344CB8AC3E}">
-        <p14:creationId xmlns:p14="http://schemas.microsoft.com/office/powerpoint/2010/main" xmlns="" val="2425261388"/>
+        <p14:creationId xmlns:p14="http://schemas.microsoft.com/office/powerpoint/2010/main" val="2425261388"/>
       </p:ext>
     </p:extLst>
   </p:cSld>
@@ -6219,7 +6219,7 @@
           <a:effectLst/>
           <a:extLst>
             <a:ext uri="{AF507438-7753-43E0-B8FC-AC1667EBCBE1}">
-              <a14:hiddenEffects xmlns:a14="http://schemas.microsoft.com/office/drawing/2010/main" xmlns="">
+              <a14:hiddenEffects xmlns:a14="http://schemas.microsoft.com/office/drawing/2010/main">
                 <a:effectLst>
                   <a:outerShdw dist="35921" dir="2700000" algn="ctr" rotWithShape="0">
                     <a:schemeClr val="bg2"/>
@@ -6369,14 +6369,14 @@
           <a:effectLst/>
           <a:extLst>
             <a:ext uri="{909E8E84-426E-40DD-AFC4-6F175D3DCCD1}">
-              <a14:hiddenFill xmlns:a14="http://schemas.microsoft.com/office/drawing/2010/main" xmlns="">
+              <a14:hiddenFill xmlns:a14="http://schemas.microsoft.com/office/drawing/2010/main">
                 <a:solidFill>
                   <a:schemeClr val="accent1"/>
                 </a:solidFill>
               </a14:hiddenFill>
             </a:ext>
             <a:ext uri="{91240B29-F687-4F45-9708-019B960494DF}">
-              <a14:hiddenLine xmlns:a14="http://schemas.microsoft.com/office/drawing/2010/main" xmlns="" w="9525">
+              <a14:hiddenLine xmlns:a14="http://schemas.microsoft.com/office/drawing/2010/main" w="9525">
                 <a:solidFill>
                   <a:schemeClr val="tx1"/>
                 </a:solidFill>
@@ -6386,7 +6386,7 @@
               </a14:hiddenLine>
             </a:ext>
             <a:ext uri="{AF507438-7753-43E0-B8FC-AC1667EBCBE1}">
-              <a14:hiddenEffects xmlns:a14="http://schemas.microsoft.com/office/drawing/2010/main" xmlns="">
+              <a14:hiddenEffects xmlns:a14="http://schemas.microsoft.com/office/drawing/2010/main">
                 <a:effectLst>
                   <a:outerShdw dist="35921" dir="2700000" algn="ctr" rotWithShape="0">
                     <a:schemeClr val="bg2"/>
@@ -6465,14 +6465,14 @@
           <a:effectLst/>
           <a:extLst>
             <a:ext uri="{909E8E84-426E-40DD-AFC4-6F175D3DCCD1}">
-              <a14:hiddenFill xmlns:a14="http://schemas.microsoft.com/office/drawing/2010/main" xmlns="">
+              <a14:hiddenFill xmlns:a14="http://schemas.microsoft.com/office/drawing/2010/main">
                 <a:solidFill>
                   <a:schemeClr val="accent1"/>
                 </a:solidFill>
               </a14:hiddenFill>
             </a:ext>
             <a:ext uri="{91240B29-F687-4F45-9708-019B960494DF}">
-              <a14:hiddenLine xmlns:a14="http://schemas.microsoft.com/office/drawing/2010/main" xmlns="" w="9525">
+              <a14:hiddenLine xmlns:a14="http://schemas.microsoft.com/office/drawing/2010/main" w="9525">
                 <a:solidFill>
                   <a:schemeClr val="tx1"/>
                 </a:solidFill>
@@ -6482,7 +6482,7 @@
               </a14:hiddenLine>
             </a:ext>
             <a:ext uri="{AF507438-7753-43E0-B8FC-AC1667EBCBE1}">
-              <a14:hiddenEffects xmlns:a14="http://schemas.microsoft.com/office/drawing/2010/main" xmlns="">
+              <a14:hiddenEffects xmlns:a14="http://schemas.microsoft.com/office/drawing/2010/main">
                 <a:effectLst>
                   <a:outerShdw dist="35921" dir="2700000" algn="ctr" rotWithShape="0">
                     <a:schemeClr val="bg2"/>
@@ -6533,14 +6533,14 @@
           <a:effectLst/>
           <a:extLst>
             <a:ext uri="{909E8E84-426E-40DD-AFC4-6F175D3DCCD1}">
-              <a14:hiddenFill xmlns:a14="http://schemas.microsoft.com/office/drawing/2010/main" xmlns="">
+              <a14:hiddenFill xmlns:a14="http://schemas.microsoft.com/office/drawing/2010/main">
                 <a:solidFill>
                   <a:schemeClr val="accent1"/>
                 </a:solidFill>
               </a14:hiddenFill>
             </a:ext>
             <a:ext uri="{91240B29-F687-4F45-9708-019B960494DF}">
-              <a14:hiddenLine xmlns:a14="http://schemas.microsoft.com/office/drawing/2010/main" xmlns="" w="9525">
+              <a14:hiddenLine xmlns:a14="http://schemas.microsoft.com/office/drawing/2010/main" w="9525">
                 <a:solidFill>
                   <a:schemeClr val="tx1"/>
                 </a:solidFill>
@@ -6550,7 +6550,7 @@
               </a14:hiddenLine>
             </a:ext>
             <a:ext uri="{AF507438-7753-43E0-B8FC-AC1667EBCBE1}">
-              <a14:hiddenEffects xmlns:a14="http://schemas.microsoft.com/office/drawing/2010/main" xmlns="">
+              <a14:hiddenEffects xmlns:a14="http://schemas.microsoft.com/office/drawing/2010/main">
                 <a:effectLst>
                   <a:outerShdw dist="35921" dir="2700000" algn="ctr" rotWithShape="0">
                     <a:schemeClr val="bg2"/>
@@ -6604,14 +6604,14 @@
           <a:effectLst/>
           <a:extLst>
             <a:ext uri="{909E8E84-426E-40DD-AFC4-6F175D3DCCD1}">
-              <a14:hiddenFill xmlns:a14="http://schemas.microsoft.com/office/drawing/2010/main" xmlns="">
+              <a14:hiddenFill xmlns:a14="http://schemas.microsoft.com/office/drawing/2010/main">
                 <a:solidFill>
                   <a:schemeClr val="accent1"/>
                 </a:solidFill>
               </a14:hiddenFill>
             </a:ext>
             <a:ext uri="{91240B29-F687-4F45-9708-019B960494DF}">
-              <a14:hiddenLine xmlns:a14="http://schemas.microsoft.com/office/drawing/2010/main" xmlns="" w="9525">
+              <a14:hiddenLine xmlns:a14="http://schemas.microsoft.com/office/drawing/2010/main" w="9525">
                 <a:solidFill>
                   <a:schemeClr val="tx1"/>
                 </a:solidFill>
@@ -6621,7 +6621,7 @@
               </a14:hiddenLine>
             </a:ext>
             <a:ext uri="{AF507438-7753-43E0-B8FC-AC1667EBCBE1}">
-              <a14:hiddenEffects xmlns:a14="http://schemas.microsoft.com/office/drawing/2010/main" xmlns="">
+              <a14:hiddenEffects xmlns:a14="http://schemas.microsoft.com/office/drawing/2010/main">
                 <a:effectLst>
                   <a:outerShdw dist="35921" dir="2700000" algn="ctr" rotWithShape="0">
                     <a:schemeClr val="bg2"/>
@@ -7934,27 +7934,7 @@
                   </a:schemeClr>
                 </a:solidFill>
               </a:rPr>
-              <a:t>What are the expected returns </a:t>
-            </a:r>
-            <a:r>
-              <a:rPr lang="en-US" sz="2200" dirty="0" smtClean="0">
-                <a:solidFill>
-                  <a:schemeClr val="bg1">
-                    <a:lumMod val="10000"/>
-                  </a:schemeClr>
-                </a:solidFill>
-              </a:rPr>
-              <a:t>in </a:t>
-            </a:r>
-            <a:r>
-              <a:rPr lang="en-US" sz="2200" dirty="0" smtClean="0">
-                <a:solidFill>
-                  <a:schemeClr val="bg1">
-                    <a:lumMod val="10000"/>
-                  </a:schemeClr>
-                </a:solidFill>
-              </a:rPr>
-              <a:t>10 years?</a:t>
+              <a:t>What are the expected returns in 10 years?</a:t>
             </a:r>
           </a:p>
           <a:p>
@@ -8015,11 +7995,17 @@
           <p:cNvGraphicFramePr>
             <a:graphicFrameLocks noGrp="1"/>
           </p:cNvGraphicFramePr>
-          <p:nvPr/>
+          <p:nvPr>
+            <p:extLst>
+              <p:ext uri="{D42A27DB-BD31-4B8C-83A1-F6EECF244321}">
+                <p14:modId xmlns:p14="http://schemas.microsoft.com/office/powerpoint/2010/main" val="2435967195"/>
+              </p:ext>
+            </p:extLst>
+          </p:nvPr>
         </p:nvGraphicFramePr>
         <p:xfrm>
-          <a:off x="395536" y="4113076"/>
-          <a:ext cx="8460942" cy="1112520"/>
+          <a:off x="287523" y="4113076"/>
+          <a:ext cx="8630619" cy="1112520"/>
         </p:xfrm>
         <a:graphic>
           <a:graphicData uri="http://schemas.openxmlformats.org/drawingml/2006/table">
@@ -8028,13 +8014,13 @@
                 <a:tableStyleId>{5C22544A-7EE6-4342-B048-85BDC9FD1C3A}</a:tableStyleId>
               </a:tblPr>
               <a:tblGrid>
-                <a:gridCol w="1009742"/>
-                <a:gridCol w="1258509"/>
-                <a:gridCol w="1224136"/>
-                <a:gridCol w="1260140"/>
-                <a:gridCol w="1188132"/>
-                <a:gridCol w="1311577"/>
-                <a:gridCol w="1208706"/>
+                <a:gridCol w="1116125"/>
+                <a:gridCol w="1197614"/>
+                <a:gridCol w="1248685"/>
+                <a:gridCol w="1285411"/>
+                <a:gridCol w="1211959"/>
+                <a:gridCol w="1337879"/>
+                <a:gridCol w="1232946"/>
               </a:tblGrid>
               <a:tr h="370840">
                 <a:tc>
@@ -8078,14 +8064,14 @@
                     <a:p>
                       <a:pPr algn="ctr"/>
                       <a:r>
-                        <a:rPr lang="en-US" sz="1200" b="0" dirty="0" smtClean="0">
+                        <a:rPr lang="en-US" sz="1200" b="1" dirty="0" smtClean="0">
                           <a:solidFill>
                             <a:srgbClr val="BB0000"/>
                           </a:solidFill>
                         </a:rPr>
                         <a:t>Bonds</a:t>
                       </a:r>
-                      <a:endParaRPr lang="en-US" sz="1200" b="0" dirty="0">
+                      <a:endParaRPr lang="en-US" sz="1200" b="1" dirty="0">
                         <a:solidFill>
                           <a:srgbClr val="BB0000"/>
                         </a:solidFill>
@@ -8130,14 +8116,182 @@
                     <a:p>
                       <a:pPr algn="ctr"/>
                       <a:r>
-                        <a:rPr lang="en-US" sz="1200" b="0" dirty="0" smtClean="0">
+                        <a:rPr lang="en-US" sz="1200" b="1" dirty="0" smtClean="0">
+                          <a:solidFill>
+                            <a:schemeClr val="bg1">
+                              <a:lumMod val="10000"/>
+                            </a:schemeClr>
+                          </a:solidFill>
+                        </a:rPr>
+                        <a:t>ETF</a:t>
+                      </a:r>
+                      <a:endParaRPr lang="en-US" sz="1200" b="1" dirty="0">
+                        <a:solidFill>
+                          <a:schemeClr val="bg1">
+                            <a:lumMod val="10000"/>
+                          </a:schemeClr>
+                        </a:solidFill>
+                      </a:endParaRPr>
+                    </a:p>
+                  </a:txBody>
+                  <a:tcPr>
+                    <a:lnL w="12700" cap="flat" cmpd="sng" algn="ctr">
+                      <a:solidFill>
+                        <a:schemeClr val="tx1"/>
+                      </a:solidFill>
+                      <a:prstDash val="solid"/>
+                      <a:round/>
+                      <a:headEnd type="none" w="med" len="med"/>
+                      <a:tailEnd type="none" w="med" len="med"/>
+                    </a:lnL>
+                    <a:lnR w="12700" cap="flat" cmpd="sng" algn="ctr">
+                      <a:solidFill>
+                        <a:schemeClr val="tx1"/>
+                      </a:solidFill>
+                      <a:prstDash val="solid"/>
+                      <a:round/>
+                      <a:headEnd type="none" w="med" len="med"/>
+                      <a:tailEnd type="none" w="med" len="med"/>
+                    </a:lnR>
+                    <a:lnB w="12700" cap="flat" cmpd="sng" algn="ctr">
+                      <a:solidFill>
+                        <a:schemeClr val="tx1"/>
+                      </a:solidFill>
+                      <a:prstDash val="solid"/>
+                      <a:round/>
+                      <a:headEnd type="none" w="med" len="med"/>
+                      <a:tailEnd type="none" w="med" len="med"/>
+                    </a:lnB>
+                    <a:noFill/>
+                  </a:tcPr>
+                </a:tc>
+                <a:tc>
+                  <a:txBody>
+                    <a:bodyPr/>
+                    <a:lstStyle/>
+                    <a:p>
+                      <a:pPr algn="ctr"/>
+                      <a:r>
+                        <a:rPr lang="en-US" sz="1200" b="1" dirty="0" smtClean="0">
+                          <a:solidFill>
+                            <a:schemeClr val="bg1">
+                              <a:lumMod val="10000"/>
+                            </a:schemeClr>
+                          </a:solidFill>
+                        </a:rPr>
+                        <a:t>Real Estate</a:t>
+                      </a:r>
+                      <a:endParaRPr lang="en-US" sz="1200" b="1" dirty="0">
+                        <a:solidFill>
+                          <a:schemeClr val="bg1">
+                            <a:lumMod val="10000"/>
+                          </a:schemeClr>
+                        </a:solidFill>
+                      </a:endParaRPr>
+                    </a:p>
+                  </a:txBody>
+                  <a:tcPr>
+                    <a:lnL w="12700" cap="flat" cmpd="sng" algn="ctr">
+                      <a:solidFill>
+                        <a:schemeClr val="tx1"/>
+                      </a:solidFill>
+                      <a:prstDash val="solid"/>
+                      <a:round/>
+                      <a:headEnd type="none" w="med" len="med"/>
+                      <a:tailEnd type="none" w="med" len="med"/>
+                    </a:lnL>
+                    <a:lnR w="12700" cap="flat" cmpd="sng" algn="ctr">
+                      <a:solidFill>
+                        <a:schemeClr val="tx1"/>
+                      </a:solidFill>
+                      <a:prstDash val="solid"/>
+                      <a:round/>
+                      <a:headEnd type="none" w="med" len="med"/>
+                      <a:tailEnd type="none" w="med" len="med"/>
+                    </a:lnR>
+                    <a:lnB w="12700" cap="flat" cmpd="sng" algn="ctr">
+                      <a:solidFill>
+                        <a:schemeClr val="tx1"/>
+                      </a:solidFill>
+                      <a:prstDash val="solid"/>
+                      <a:round/>
+                      <a:headEnd type="none" w="med" len="med"/>
+                      <a:tailEnd type="none" w="med" len="med"/>
+                    </a:lnB>
+                    <a:noFill/>
+                  </a:tcPr>
+                </a:tc>
+                <a:tc>
+                  <a:txBody>
+                    <a:bodyPr/>
+                    <a:lstStyle/>
+                    <a:p>
+                      <a:pPr algn="ctr"/>
+                      <a:r>
+                        <a:rPr lang="en-US" sz="1200" b="1" dirty="0" smtClean="0">
+                          <a:solidFill>
+                            <a:schemeClr val="bg1">
+                              <a:lumMod val="10000"/>
+                            </a:schemeClr>
+                          </a:solidFill>
+                        </a:rPr>
+                        <a:t>Stocks</a:t>
+                      </a:r>
+                      <a:endParaRPr lang="en-US" sz="1200" b="1" dirty="0">
+                        <a:solidFill>
+                          <a:schemeClr val="bg1">
+                            <a:lumMod val="10000"/>
+                          </a:schemeClr>
+                        </a:solidFill>
+                      </a:endParaRPr>
+                    </a:p>
+                  </a:txBody>
+                  <a:tcPr>
+                    <a:lnL w="12700" cap="flat" cmpd="sng" algn="ctr">
+                      <a:solidFill>
+                        <a:schemeClr val="tx1"/>
+                      </a:solidFill>
+                      <a:prstDash val="solid"/>
+                      <a:round/>
+                      <a:headEnd type="none" w="med" len="med"/>
+                      <a:tailEnd type="none" w="med" len="med"/>
+                    </a:lnL>
+                    <a:lnR w="12700" cap="flat" cmpd="sng" algn="ctr">
+                      <a:solidFill>
+                        <a:schemeClr val="tx1"/>
+                      </a:solidFill>
+                      <a:prstDash val="solid"/>
+                      <a:round/>
+                      <a:headEnd type="none" w="med" len="med"/>
+                      <a:tailEnd type="none" w="med" len="med"/>
+                    </a:lnR>
+                    <a:lnB w="12700" cap="flat" cmpd="sng" algn="ctr">
+                      <a:solidFill>
+                        <a:schemeClr val="tx1"/>
+                      </a:solidFill>
+                      <a:prstDash val="solid"/>
+                      <a:round/>
+                      <a:headEnd type="none" w="med" len="med"/>
+                      <a:tailEnd type="none" w="med" len="med"/>
+                    </a:lnB>
+                    <a:noFill/>
+                  </a:tcPr>
+                </a:tc>
+                <a:tc>
+                  <a:txBody>
+                    <a:bodyPr/>
+                    <a:lstStyle/>
+                    <a:p>
+                      <a:pPr algn="ctr"/>
+                      <a:r>
+                        <a:rPr lang="en-US" sz="1200" b="1" dirty="0" smtClean="0">
                           <a:solidFill>
                             <a:srgbClr val="BB0000"/>
                           </a:solidFill>
                         </a:rPr>
-                        <a:t>ETF</a:t>
+                        <a:t>Crypto</a:t>
                       </a:r>
-                      <a:endParaRPr lang="en-US" sz="1200" b="0" dirty="0">
+                      <a:endParaRPr lang="en-US" sz="1200" b="1" dirty="0">
                         <a:solidFill>
                           <a:srgbClr val="BB0000"/>
                         </a:solidFill>
@@ -8182,170 +8336,14 @@
                     <a:p>
                       <a:pPr algn="ctr"/>
                       <a:r>
-                        <a:rPr lang="en-US" sz="1200" b="0" dirty="0" smtClean="0">
-                          <a:solidFill>
-                            <a:srgbClr val="BB0000"/>
-                          </a:solidFill>
-                        </a:rPr>
-                        <a:t>Real Estate</a:t>
-                      </a:r>
-                      <a:endParaRPr lang="en-US" sz="1200" b="0" dirty="0">
-                        <a:solidFill>
-                          <a:srgbClr val="BB0000"/>
-                        </a:solidFill>
-                      </a:endParaRPr>
-                    </a:p>
-                  </a:txBody>
-                  <a:tcPr>
-                    <a:lnL w="12700" cap="flat" cmpd="sng" algn="ctr">
-                      <a:solidFill>
-                        <a:schemeClr val="tx1"/>
-                      </a:solidFill>
-                      <a:prstDash val="solid"/>
-                      <a:round/>
-                      <a:headEnd type="none" w="med" len="med"/>
-                      <a:tailEnd type="none" w="med" len="med"/>
-                    </a:lnL>
-                    <a:lnR w="12700" cap="flat" cmpd="sng" algn="ctr">
-                      <a:solidFill>
-                        <a:schemeClr val="tx1"/>
-                      </a:solidFill>
-                      <a:prstDash val="solid"/>
-                      <a:round/>
-                      <a:headEnd type="none" w="med" len="med"/>
-                      <a:tailEnd type="none" w="med" len="med"/>
-                    </a:lnR>
-                    <a:lnB w="12700" cap="flat" cmpd="sng" algn="ctr">
-                      <a:solidFill>
-                        <a:schemeClr val="tx1"/>
-                      </a:solidFill>
-                      <a:prstDash val="solid"/>
-                      <a:round/>
-                      <a:headEnd type="none" w="med" len="med"/>
-                      <a:tailEnd type="none" w="med" len="med"/>
-                    </a:lnB>
-                    <a:noFill/>
-                  </a:tcPr>
-                </a:tc>
-                <a:tc>
-                  <a:txBody>
-                    <a:bodyPr/>
-                    <a:lstStyle/>
-                    <a:p>
-                      <a:pPr algn="ctr"/>
-                      <a:r>
-                        <a:rPr lang="en-US" sz="1200" b="0" dirty="0" smtClean="0">
-                          <a:solidFill>
-                            <a:srgbClr val="BB0000"/>
-                          </a:solidFill>
-                        </a:rPr>
-                        <a:t>Stocks</a:t>
-                      </a:r>
-                      <a:endParaRPr lang="en-US" sz="1200" b="0" dirty="0">
-                        <a:solidFill>
-                          <a:srgbClr val="BB0000"/>
-                        </a:solidFill>
-                      </a:endParaRPr>
-                    </a:p>
-                  </a:txBody>
-                  <a:tcPr>
-                    <a:lnL w="12700" cap="flat" cmpd="sng" algn="ctr">
-                      <a:solidFill>
-                        <a:schemeClr val="tx1"/>
-                      </a:solidFill>
-                      <a:prstDash val="solid"/>
-                      <a:round/>
-                      <a:headEnd type="none" w="med" len="med"/>
-                      <a:tailEnd type="none" w="med" len="med"/>
-                    </a:lnL>
-                    <a:lnR w="12700" cap="flat" cmpd="sng" algn="ctr">
-                      <a:solidFill>
-                        <a:schemeClr val="tx1"/>
-                      </a:solidFill>
-                      <a:prstDash val="solid"/>
-                      <a:round/>
-                      <a:headEnd type="none" w="med" len="med"/>
-                      <a:tailEnd type="none" w="med" len="med"/>
-                    </a:lnR>
-                    <a:lnB w="12700" cap="flat" cmpd="sng" algn="ctr">
-                      <a:solidFill>
-                        <a:schemeClr val="tx1"/>
-                      </a:solidFill>
-                      <a:prstDash val="solid"/>
-                      <a:round/>
-                      <a:headEnd type="none" w="med" len="med"/>
-                      <a:tailEnd type="none" w="med" len="med"/>
-                    </a:lnB>
-                    <a:noFill/>
-                  </a:tcPr>
-                </a:tc>
-                <a:tc>
-                  <a:txBody>
-                    <a:bodyPr/>
-                    <a:lstStyle/>
-                    <a:p>
-                      <a:pPr algn="ctr"/>
-                      <a:r>
-                        <a:rPr lang="en-US" sz="1200" b="0" dirty="0" smtClean="0">
-                          <a:solidFill>
-                            <a:srgbClr val="BB0000"/>
-                          </a:solidFill>
-                        </a:rPr>
-                        <a:t>Crypto</a:t>
-                      </a:r>
-                      <a:endParaRPr lang="en-US" sz="1200" b="0" dirty="0">
-                        <a:solidFill>
-                          <a:srgbClr val="BB0000"/>
-                        </a:solidFill>
-                      </a:endParaRPr>
-                    </a:p>
-                  </a:txBody>
-                  <a:tcPr>
-                    <a:lnL w="12700" cap="flat" cmpd="sng" algn="ctr">
-                      <a:solidFill>
-                        <a:schemeClr val="tx1"/>
-                      </a:solidFill>
-                      <a:prstDash val="solid"/>
-                      <a:round/>
-                      <a:headEnd type="none" w="med" len="med"/>
-                      <a:tailEnd type="none" w="med" len="med"/>
-                    </a:lnL>
-                    <a:lnR w="12700" cap="flat" cmpd="sng" algn="ctr">
-                      <a:solidFill>
-                        <a:schemeClr val="tx1"/>
-                      </a:solidFill>
-                      <a:prstDash val="solid"/>
-                      <a:round/>
-                      <a:headEnd type="none" w="med" len="med"/>
-                      <a:tailEnd type="none" w="med" len="med"/>
-                    </a:lnR>
-                    <a:lnB w="12700" cap="flat" cmpd="sng" algn="ctr">
-                      <a:solidFill>
-                        <a:schemeClr val="tx1"/>
-                      </a:solidFill>
-                      <a:prstDash val="solid"/>
-                      <a:round/>
-                      <a:headEnd type="none" w="med" len="med"/>
-                      <a:tailEnd type="none" w="med" len="med"/>
-                    </a:lnB>
-                    <a:noFill/>
-                  </a:tcPr>
-                </a:tc>
-                <a:tc>
-                  <a:txBody>
-                    <a:bodyPr/>
-                    <a:lstStyle/>
-                    <a:p>
-                      <a:pPr algn="ctr"/>
-                      <a:r>
-                        <a:rPr lang="en-US" sz="1200" b="0" dirty="0" smtClean="0">
+                        <a:rPr lang="en-US" sz="1200" b="1" dirty="0" smtClean="0">
                           <a:solidFill>
                             <a:srgbClr val="BB0000"/>
                           </a:solidFill>
                         </a:rPr>
                         <a:t>Diversified</a:t>
                       </a:r>
-                      <a:endParaRPr lang="en-US" sz="1200" b="0" dirty="0">
+                      <a:endParaRPr lang="en-US" sz="1200" b="1" dirty="0">
                         <a:solidFill>
                           <a:srgbClr val="BB0000"/>
                         </a:solidFill>
@@ -8382,16 +8380,20 @@
                     <a:lstStyle/>
                     <a:p>
                       <a:r>
-                        <a:rPr lang="en-US" sz="1200" b="0" dirty="0" smtClean="0">
+                        <a:rPr lang="en-US" sz="1200" b="1" dirty="0" smtClean="0">
                           <a:solidFill>
-                            <a:srgbClr val="BB0000"/>
+                            <a:schemeClr val="bg1">
+                              <a:lumMod val="10000"/>
+                            </a:schemeClr>
                           </a:solidFill>
                         </a:rPr>
                         <a:t>Lower Limit</a:t>
                       </a:r>
-                      <a:endParaRPr lang="en-US" sz="1200" b="0" dirty="0">
+                      <a:endParaRPr lang="en-US" sz="1200" b="1" dirty="0">
                         <a:solidFill>
-                          <a:srgbClr val="BB0000"/>
+                          <a:schemeClr val="bg1">
+                            <a:lumMod val="10000"/>
+                          </a:schemeClr>
                         </a:solidFill>
                       </a:endParaRPr>
                     </a:p>
@@ -8495,16 +8497,20 @@
                     <a:p>
                       <a:pPr algn="ctr"/>
                       <a:r>
-                        <a:rPr lang="en-US" sz="1500" b="1" dirty="0" smtClean="0">
+                        <a:rPr lang="en-US" sz="1500" b="0" dirty="0" smtClean="0">
                           <a:solidFill>
-                            <a:srgbClr val="BB0000"/>
+                            <a:schemeClr val="bg1">
+                              <a:lumMod val="10000"/>
+                            </a:schemeClr>
                           </a:solidFill>
                         </a:rPr>
                         <a:t>$21,339</a:t>
                       </a:r>
-                      <a:endParaRPr lang="en-US" sz="1500" b="1" dirty="0">
+                      <a:endParaRPr lang="en-US" sz="1500" b="0" dirty="0">
                         <a:solidFill>
-                          <a:srgbClr val="BB0000"/>
+                          <a:schemeClr val="bg1">
+                            <a:lumMod val="10000"/>
+                          </a:schemeClr>
                         </a:solidFill>
                       </a:endParaRPr>
                     </a:p>
@@ -8556,16 +8562,20 @@
                     <a:p>
                       <a:pPr algn="ctr"/>
                       <a:r>
-                        <a:rPr lang="en-US" sz="1500" b="1" dirty="0" smtClean="0">
+                        <a:rPr lang="en-US" sz="1500" b="0" dirty="0" smtClean="0">
                           <a:solidFill>
-                            <a:srgbClr val="BB0000"/>
+                            <a:schemeClr val="bg1">
+                              <a:lumMod val="10000"/>
+                            </a:schemeClr>
                           </a:solidFill>
                         </a:rPr>
                         <a:t>$30,437</a:t>
                       </a:r>
-                      <a:endParaRPr lang="en-US" sz="1500" b="1" dirty="0">
+                      <a:endParaRPr lang="en-US" sz="1500" b="0" dirty="0">
                         <a:solidFill>
-                          <a:srgbClr val="BB0000"/>
+                          <a:schemeClr val="bg1">
+                            <a:lumMod val="10000"/>
+                          </a:schemeClr>
                         </a:solidFill>
                       </a:endParaRPr>
                     </a:p>
@@ -8617,16 +8627,20 @@
                     <a:p>
                       <a:pPr algn="ctr"/>
                       <a:r>
-                        <a:rPr lang="en-US" sz="1500" b="1" dirty="0" smtClean="0">
+                        <a:rPr lang="en-US" sz="1500" b="0" dirty="0" smtClean="0">
                           <a:solidFill>
-                            <a:srgbClr val="BB0000"/>
+                            <a:schemeClr val="bg1">
+                              <a:lumMod val="10000"/>
+                            </a:schemeClr>
                           </a:solidFill>
                         </a:rPr>
                         <a:t>$25,038</a:t>
                       </a:r>
-                      <a:endParaRPr lang="en-US" sz="1500" b="1" dirty="0">
+                      <a:endParaRPr lang="en-US" sz="1500" b="0" dirty="0">
                         <a:solidFill>
-                          <a:srgbClr val="BB0000"/>
+                          <a:schemeClr val="bg1">
+                            <a:lumMod val="10000"/>
+                          </a:schemeClr>
                         </a:solidFill>
                       </a:endParaRPr>
                     </a:p>
@@ -8792,16 +8806,20 @@
                     <a:lstStyle/>
                     <a:p>
                       <a:r>
-                        <a:rPr lang="en-US" sz="1200" b="0" dirty="0" smtClean="0">
+                        <a:rPr lang="en-US" sz="1200" b="1" dirty="0" smtClean="0">
                           <a:solidFill>
-                            <a:srgbClr val="BB0000"/>
+                            <a:schemeClr val="bg1">
+                              <a:lumMod val="10000"/>
+                            </a:schemeClr>
                           </a:solidFill>
                         </a:rPr>
                         <a:t>Upper Limit</a:t>
                       </a:r>
-                      <a:endParaRPr lang="en-US" sz="1200" b="0" dirty="0">
+                      <a:endParaRPr lang="en-US" sz="1200" b="1" dirty="0">
                         <a:solidFill>
-                          <a:srgbClr val="BB0000"/>
+                          <a:schemeClr val="bg1">
+                            <a:lumMod val="10000"/>
+                          </a:schemeClr>
                         </a:solidFill>
                       </a:endParaRPr>
                     </a:p>
@@ -8887,16 +8905,20 @@
                     <a:p>
                       <a:pPr algn="ctr"/>
                       <a:r>
-                        <a:rPr lang="en-US" sz="1500" b="1" dirty="0" smtClean="0">
+                        <a:rPr lang="en-US" sz="1500" b="0" dirty="0" smtClean="0">
                           <a:solidFill>
-                            <a:srgbClr val="BB0000"/>
+                            <a:schemeClr val="bg1">
+                              <a:lumMod val="10000"/>
+                            </a:schemeClr>
                           </a:solidFill>
                         </a:rPr>
                         <a:t>$77,468</a:t>
                       </a:r>
-                      <a:endParaRPr lang="en-US" sz="1500" b="1" dirty="0">
+                      <a:endParaRPr lang="en-US" sz="1500" b="0" dirty="0">
                         <a:solidFill>
-                          <a:srgbClr val="BB0000"/>
+                          <a:schemeClr val="bg1">
+                            <a:lumMod val="10000"/>
+                          </a:schemeClr>
                         </a:solidFill>
                       </a:endParaRPr>
                     </a:p>
@@ -8939,16 +8961,20 @@
                     <a:p>
                       <a:pPr algn="ctr"/>
                       <a:r>
-                        <a:rPr lang="en-US" sz="1500" b="1" dirty="0" smtClean="0">
+                        <a:rPr lang="en-US" sz="1500" b="0" dirty="0" smtClean="0">
                           <a:solidFill>
-                            <a:srgbClr val="BB0000"/>
+                            <a:schemeClr val="bg1">
+                              <a:lumMod val="10000"/>
+                            </a:schemeClr>
                           </a:solidFill>
                         </a:rPr>
                         <a:t>$134,200</a:t>
                       </a:r>
-                      <a:endParaRPr lang="en-US" sz="1500" b="1" dirty="0">
+                      <a:endParaRPr lang="en-US" sz="1500" b="0" dirty="0">
                         <a:solidFill>
-                          <a:srgbClr val="BB0000"/>
+                          <a:schemeClr val="bg1">
+                            <a:lumMod val="10000"/>
+                          </a:schemeClr>
                         </a:solidFill>
                       </a:endParaRPr>
                     </a:p>
@@ -8991,16 +9017,20 @@
                     <a:p>
                       <a:pPr algn="ctr"/>
                       <a:r>
-                        <a:rPr lang="en-US" sz="1500" b="1" dirty="0" smtClean="0">
+                        <a:rPr lang="en-US" sz="1500" b="0" dirty="0" smtClean="0">
                           <a:solidFill>
-                            <a:srgbClr val="BB0000"/>
+                            <a:schemeClr val="bg1">
+                              <a:lumMod val="10000"/>
+                            </a:schemeClr>
                           </a:solidFill>
                         </a:rPr>
                         <a:t>$88,352</a:t>
                       </a:r>
-                      <a:endParaRPr lang="en-US" sz="1500" b="1" dirty="0">
+                      <a:endParaRPr lang="en-US" sz="1500" b="0" dirty="0">
                         <a:solidFill>
-                          <a:srgbClr val="BB0000"/>
+                          <a:schemeClr val="bg1">
+                            <a:lumMod val="10000"/>
+                          </a:schemeClr>
                         </a:solidFill>
                       </a:endParaRPr>
                     </a:p>
@@ -10603,17 +10633,7 @@
                   </a:schemeClr>
                 </a:solidFill>
               </a:rPr>
-              <a:t>THE </a:t>
-            </a:r>
-            <a:r>
-              <a:rPr lang="en-US" sz="4200" b="1" dirty="0" smtClean="0">
-                <a:solidFill>
-                  <a:schemeClr val="bg1">
-                    <a:lumMod val="10000"/>
-                  </a:schemeClr>
-                </a:solidFill>
-              </a:rPr>
-              <a:t>CHAMP</a:t>
+              <a:t>THE CHAMP</a:t>
             </a:r>
             <a:endParaRPr lang="en-US" sz="4200" b="1" dirty="0">
               <a:solidFill>
@@ -11162,13 +11182,6 @@
               </a:rPr>
               <a:t>Portfolios by Asset Class</a:t>
             </a:r>
-            <a:endParaRPr lang="en-US" sz="2200" dirty="0" smtClean="0">
-              <a:solidFill>
-                <a:schemeClr val="bg1">
-                  <a:lumMod val="10000"/>
-                </a:schemeClr>
-              </a:solidFill>
-            </a:endParaRPr>
           </a:p>
           <a:p>
             <a:pPr lvl="1"/>
@@ -11193,17 +11206,7 @@
                   </a:schemeClr>
                 </a:solidFill>
               </a:rPr>
-              <a:t>Average </a:t>
-            </a:r>
-            <a:r>
-              <a:rPr lang="en-US" sz="1800" dirty="0" smtClean="0">
-                <a:solidFill>
-                  <a:schemeClr val="bg1">
-                    <a:lumMod val="10000"/>
-                  </a:schemeClr>
-                </a:solidFill>
-              </a:rPr>
-              <a:t>Annual Returns</a:t>
+              <a:t>Average Annual Returns</a:t>
             </a:r>
             <a:endParaRPr lang="en-US" sz="1800" dirty="0">
               <a:solidFill>
@@ -11246,25 +11249,8 @@
                   </a:schemeClr>
                 </a:solidFill>
               </a:rPr>
-              <a:t>•  Jan 1 2018 – Nov 5 </a:t>
-            </a:r>
-            <a:r>
-              <a:rPr lang="en-US" sz="2200" dirty="0" smtClean="0">
-                <a:solidFill>
-                  <a:schemeClr val="bg1">
-                    <a:lumMod val="10000"/>
-                  </a:schemeClr>
-                </a:solidFill>
-              </a:rPr>
-              <a:t>2021  •</a:t>
-            </a:r>
-            <a:endParaRPr lang="en-US" sz="2200" dirty="0" smtClean="0">
-              <a:solidFill>
-                <a:schemeClr val="bg1">
-                  <a:lumMod val="10000"/>
-                </a:schemeClr>
-              </a:solidFill>
-            </a:endParaRPr>
+              <a:t>•  Jan 1 2018 – Nov 5 2021  •</a:t>
+            </a:r>
           </a:p>
           <a:p>
             <a:endParaRPr lang="en-US" sz="2000" dirty="0">
@@ -11322,7 +11308,7 @@
     </p:spTree>
     <p:extLst>
       <p:ext uri="{BB962C8B-B14F-4D97-AF65-F5344CB8AC3E}">
-        <p14:creationId xmlns:p14="http://schemas.microsoft.com/office/powerpoint/2010/main" xmlns="" val="3204545569"/>
+        <p14:creationId xmlns:p14="http://schemas.microsoft.com/office/powerpoint/2010/main" val="3204545569"/>
       </p:ext>
     </p:extLst>
   </p:cSld>
@@ -11708,55 +11694,21 @@
                   </a:schemeClr>
                 </a:solidFill>
               </a:rPr>
-              <a:t>Portfolios by Asset </a:t>
-            </a:r>
-            <a:r>
-              <a:rPr lang="en-US" sz="2200" dirty="0" smtClean="0">
+              <a:t>Portfolios by Asset Class</a:t>
+            </a:r>
+          </a:p>
+          <a:p>
+            <a:pPr lvl="1"/>
+            <a:r>
+              <a:rPr lang="en-US" sz="1800" dirty="0" smtClean="0">
                 <a:solidFill>
                   <a:schemeClr val="bg1">
                     <a:lumMod val="10000"/>
                   </a:schemeClr>
                 </a:solidFill>
               </a:rPr>
-              <a:t>Class</a:t>
-            </a:r>
-            <a:endParaRPr lang="en-US" sz="2200" dirty="0" smtClean="0">
-              <a:solidFill>
-                <a:schemeClr val="bg1">
-                  <a:lumMod val="10000"/>
-                </a:schemeClr>
-              </a:solidFill>
-            </a:endParaRPr>
-          </a:p>
-          <a:p>
-            <a:pPr lvl="1"/>
-            <a:r>
-              <a:rPr lang="en-US" sz="1800" dirty="0" smtClean="0">
-                <a:solidFill>
-                  <a:schemeClr val="bg1">
-                    <a:lumMod val="10000"/>
-                  </a:schemeClr>
-                </a:solidFill>
-              </a:rPr>
-              <a:t>10 Year </a:t>
-            </a:r>
-            <a:r>
-              <a:rPr lang="en-US" sz="1800" dirty="0" smtClean="0">
-                <a:solidFill>
-                  <a:schemeClr val="bg1">
-                    <a:lumMod val="10000"/>
-                  </a:schemeClr>
-                </a:solidFill>
-              </a:rPr>
-              <a:t>Forecast</a:t>
-            </a:r>
-            <a:endParaRPr lang="en-US" sz="1800" dirty="0" smtClean="0">
-              <a:solidFill>
-                <a:schemeClr val="bg1">
-                  <a:lumMod val="10000"/>
-                </a:schemeClr>
-              </a:solidFill>
-            </a:endParaRPr>
+              <a:t>10 Year Forecast</a:t>
+            </a:r>
           </a:p>
           <a:p>
             <a:pPr lvl="1"/>
@@ -12840,7 +12792,7 @@
   </a:extraClrSchemeLst>
   <a:extLst>
     <a:ext uri="{05A4C25C-085E-4340-85A3-A5531E510DB2}">
-      <thm15:themeFamily xmlns:thm15="http://schemas.microsoft.com/office/thememl/2012/main" xmlns="" name="Office Theme" id="{62F939B6-93AF-4DB8-9C6B-D6C7DFDC589F}" vid="{4A3C46E8-61CC-4603-A589-7422A47A8E4A}"/>
+      <thm15:themeFamily xmlns:thm15="http://schemas.microsoft.com/office/thememl/2012/main" name="Office Theme" id="{62F939B6-93AF-4DB8-9C6B-D6C7DFDC589F}" vid="{4A3C46E8-61CC-4603-A589-7422A47A8E4A}"/>
     </a:ext>
   </a:extLst>
 </a:theme>
@@ -13101,7 +13053,7 @@
   <a:extraClrSchemeLst/>
   <a:extLst>
     <a:ext uri="{05A4C25C-085E-4340-85A3-A5531E510DB2}">
-      <thm15:themeFamily xmlns:thm15="http://schemas.microsoft.com/office/thememl/2012/main" xmlns="" name="Office Theme" id="{62F939B6-93AF-4DB8-9C6B-D6C7DFDC589F}" vid="{4A3C46E8-61CC-4603-A589-7422A47A8E4A}"/>
+      <thm15:themeFamily xmlns:thm15="http://schemas.microsoft.com/office/thememl/2012/main" name="Office Theme" id="{62F939B6-93AF-4DB8-9C6B-D6C7DFDC589F}" vid="{4A3C46E8-61CC-4603-A589-7422A47A8E4A}"/>
     </a:ext>
   </a:extLst>
 </a:theme>
@@ -13362,7 +13314,7 @@
   <a:extraClrSchemeLst/>
   <a:extLst>
     <a:ext uri="{05A4C25C-085E-4340-85A3-A5531E510DB2}">
-      <thm15:themeFamily xmlns:thm15="http://schemas.microsoft.com/office/thememl/2012/main" xmlns="" name="Office Theme" id="{62F939B6-93AF-4DB8-9C6B-D6C7DFDC589F}" vid="{4A3C46E8-61CC-4603-A589-7422A47A8E4A}"/>
+      <thm15:themeFamily xmlns:thm15="http://schemas.microsoft.com/office/thememl/2012/main" name="Office Theme" id="{62F939B6-93AF-4DB8-9C6B-D6C7DFDC589F}" vid="{4A3C46E8-61CC-4603-A589-7422A47A8E4A}"/>
     </a:ext>
   </a:extLst>
 </a:theme>

</xml_diff>